<commit_message>
Added ogbl to security curriculum
</commit_message>
<xml_diff>
--- a/security/00-Introduction/Introduction.pptx
+++ b/security/00-Introduction/Introduction.pptx
@@ -168,7 +168,7 @@
           <a:noFill/>
           <a:extLst>
             <a:ext uri="{909E8E84-426E-40dd-AFC4-6F175D3DCCD1}">
-              <a14:hiddenFill xmlns="" xmlns:a14="http://schemas.microsoft.com/office/drawing/2010/main">
+              <a14:hiddenFill xmlns:a14="http://schemas.microsoft.com/office/drawing/2010/main" xmlns="">
                 <a:solidFill>
                   <a:srgbClr val="FFFFFF"/>
                 </a:solidFill>
@@ -228,7 +228,7 @@
             </a:ln>
             <a:extLst>
               <a:ext uri="{91240B29-F687-4f45-9708-019B960494DF}">
-                <a14:hiddenLine xmlns="" xmlns:a14="http://schemas.microsoft.com/office/drawing/2010/main" w="9525">
+                <a14:hiddenLine xmlns:a14="http://schemas.microsoft.com/office/drawing/2010/main" xmlns="" w="9525">
                   <a:solidFill>
                     <a:srgbClr val="000000"/>
                   </a:solidFill>
@@ -318,7 +318,7 @@
             </a:ln>
             <a:extLst>
               <a:ext uri="{91240B29-F687-4f45-9708-019B960494DF}">
-                <a14:hiddenLine xmlns="" xmlns:a14="http://schemas.microsoft.com/office/drawing/2010/main" w="9525">
+                <a14:hiddenLine xmlns:a14="http://schemas.microsoft.com/office/drawing/2010/main" xmlns="" w="9525">
                   <a:solidFill>
                     <a:srgbClr val="000000"/>
                   </a:solidFill>
@@ -408,7 +408,7 @@
             </a:ln>
             <a:extLst>
               <a:ext uri="{91240B29-F687-4f45-9708-019B960494DF}">
-                <a14:hiddenLine xmlns="" xmlns:a14="http://schemas.microsoft.com/office/drawing/2010/main" w="9525">
+                <a14:hiddenLine xmlns:a14="http://schemas.microsoft.com/office/drawing/2010/main" xmlns="" w="9525">
                   <a:solidFill>
                     <a:srgbClr val="000000"/>
                   </a:solidFill>
@@ -442,7 +442,7 @@
             </a:ln>
             <a:extLst>
               <a:ext uri="{91240B29-F687-4f45-9708-019B960494DF}">
-                <a14:hiddenLine xmlns="" xmlns:a14="http://schemas.microsoft.com/office/drawing/2010/main" w="9525">
+                <a14:hiddenLine xmlns:a14="http://schemas.microsoft.com/office/drawing/2010/main" xmlns="" w="9525">
                   <a:solidFill>
                     <a:srgbClr val="000000"/>
                   </a:solidFill>
@@ -532,7 +532,7 @@
             </a:ln>
             <a:extLst>
               <a:ext uri="{91240B29-F687-4f45-9708-019B960494DF}">
-                <a14:hiddenLine xmlns="" xmlns:a14="http://schemas.microsoft.com/office/drawing/2010/main" w="9525">
+                <a14:hiddenLine xmlns:a14="http://schemas.microsoft.com/office/drawing/2010/main" xmlns="" w="9525">
                   <a:solidFill>
                     <a:srgbClr val="000000"/>
                   </a:solidFill>
@@ -594,7 +594,7 @@
             </a:ln>
             <a:extLst>
               <a:ext uri="{91240B29-F687-4f45-9708-019B960494DF}">
-                <a14:hiddenLine xmlns="" xmlns:a14="http://schemas.microsoft.com/office/drawing/2010/main" w="9525">
+                <a14:hiddenLine xmlns:a14="http://schemas.microsoft.com/office/drawing/2010/main" xmlns="" w="9525">
                   <a:solidFill>
                     <a:srgbClr val="000000"/>
                   </a:solidFill>
@@ -656,7 +656,7 @@
             </a:ln>
             <a:extLst>
               <a:ext uri="{91240B29-F687-4f45-9708-019B960494DF}">
-                <a14:hiddenLine xmlns="" xmlns:a14="http://schemas.microsoft.com/office/drawing/2010/main" w="9525">
+                <a14:hiddenLine xmlns:a14="http://schemas.microsoft.com/office/drawing/2010/main" xmlns="" w="9525">
                   <a:solidFill>
                     <a:srgbClr val="000000"/>
                   </a:solidFill>
@@ -746,7 +746,7 @@
             </a:ln>
             <a:extLst>
               <a:ext uri="{91240B29-F687-4f45-9708-019B960494DF}">
-                <a14:hiddenLine xmlns="" xmlns:a14="http://schemas.microsoft.com/office/drawing/2010/main" w="9525">
+                <a14:hiddenLine xmlns:a14="http://schemas.microsoft.com/office/drawing/2010/main" xmlns="" w="9525">
                   <a:solidFill>
                     <a:srgbClr val="000000"/>
                   </a:solidFill>
@@ -808,7 +808,7 @@
             </a:ln>
             <a:extLst>
               <a:ext uri="{91240B29-F687-4f45-9708-019B960494DF}">
-                <a14:hiddenLine xmlns="" xmlns:a14="http://schemas.microsoft.com/office/drawing/2010/main" w="9525">
+                <a14:hiddenLine xmlns:a14="http://schemas.microsoft.com/office/drawing/2010/main" xmlns="" w="9525">
                   <a:solidFill>
                     <a:srgbClr val="000000"/>
                   </a:solidFill>
@@ -870,7 +870,7 @@
             </a:ln>
             <a:extLst>
               <a:ext uri="{91240B29-F687-4f45-9708-019B960494DF}">
-                <a14:hiddenLine xmlns="" xmlns:a14="http://schemas.microsoft.com/office/drawing/2010/main" w="9525">
+                <a14:hiddenLine xmlns:a14="http://schemas.microsoft.com/office/drawing/2010/main" xmlns="" w="9525">
                   <a:solidFill>
                     <a:srgbClr val="000000"/>
                   </a:solidFill>
@@ -960,7 +960,7 @@
             </a:ln>
             <a:extLst>
               <a:ext uri="{91240B29-F687-4f45-9708-019B960494DF}">
-                <a14:hiddenLine xmlns="" xmlns:a14="http://schemas.microsoft.com/office/drawing/2010/main" w="9525">
+                <a14:hiddenLine xmlns:a14="http://schemas.microsoft.com/office/drawing/2010/main" xmlns="" w="9525">
                   <a:solidFill>
                     <a:srgbClr val="000000"/>
                   </a:solidFill>
@@ -1050,7 +1050,7 @@
             </a:ln>
             <a:extLst>
               <a:ext uri="{91240B29-F687-4f45-9708-019B960494DF}">
-                <a14:hiddenLine xmlns="" xmlns:a14="http://schemas.microsoft.com/office/drawing/2010/main" w="9525">
+                <a14:hiddenLine xmlns:a14="http://schemas.microsoft.com/office/drawing/2010/main" xmlns="" w="9525">
                   <a:solidFill>
                     <a:srgbClr val="000000"/>
                   </a:solidFill>
@@ -1112,7 +1112,7 @@
             </a:ln>
             <a:extLst>
               <a:ext uri="{91240B29-F687-4f45-9708-019B960494DF}">
-                <a14:hiddenLine xmlns="" xmlns:a14="http://schemas.microsoft.com/office/drawing/2010/main" w="9525">
+                <a14:hiddenLine xmlns:a14="http://schemas.microsoft.com/office/drawing/2010/main" xmlns="" w="9525">
                   <a:solidFill>
                     <a:srgbClr val="000000"/>
                   </a:solidFill>
@@ -1222,7 +1222,7 @@
             </a:ln>
             <a:extLst>
               <a:ext uri="{91240B29-F687-4f45-9708-019B960494DF}">
-                <a14:hiddenLine xmlns="" xmlns:a14="http://schemas.microsoft.com/office/drawing/2010/main" w="9525">
+                <a14:hiddenLine xmlns:a14="http://schemas.microsoft.com/office/drawing/2010/main" xmlns="" w="9525">
                   <a:solidFill>
                     <a:srgbClr val="000000"/>
                   </a:solidFill>
@@ -1284,7 +1284,7 @@
             </a:ln>
             <a:extLst>
               <a:ext uri="{91240B29-F687-4f45-9708-019B960494DF}">
-                <a14:hiddenLine xmlns="" xmlns:a14="http://schemas.microsoft.com/office/drawing/2010/main" w="9525">
+                <a14:hiddenLine xmlns:a14="http://schemas.microsoft.com/office/drawing/2010/main" xmlns="" w="9525">
                   <a:solidFill>
                     <a:srgbClr val="000000"/>
                   </a:solidFill>
@@ -1374,7 +1374,7 @@
             </a:ln>
             <a:extLst>
               <a:ext uri="{91240B29-F687-4f45-9708-019B960494DF}">
-                <a14:hiddenLine xmlns="" xmlns:a14="http://schemas.microsoft.com/office/drawing/2010/main" w="9525">
+                <a14:hiddenLine xmlns:a14="http://schemas.microsoft.com/office/drawing/2010/main" xmlns="" w="9525">
                   <a:solidFill>
                     <a:srgbClr val="000000"/>
                   </a:solidFill>
@@ -1464,7 +1464,7 @@
             </a:ln>
             <a:extLst>
               <a:ext uri="{91240B29-F687-4f45-9708-019B960494DF}">
-                <a14:hiddenLine xmlns="" xmlns:a14="http://schemas.microsoft.com/office/drawing/2010/main" w="9525">
+                <a14:hiddenLine xmlns:a14="http://schemas.microsoft.com/office/drawing/2010/main" xmlns="" w="9525">
                   <a:solidFill>
                     <a:srgbClr val="000000"/>
                   </a:solidFill>
@@ -1526,7 +1526,7 @@
             </a:ln>
             <a:extLst>
               <a:ext uri="{91240B29-F687-4f45-9708-019B960494DF}">
-                <a14:hiddenLine xmlns="" xmlns:a14="http://schemas.microsoft.com/office/drawing/2010/main" w="9525">
+                <a14:hiddenLine xmlns:a14="http://schemas.microsoft.com/office/drawing/2010/main" xmlns="" w="9525">
                   <a:solidFill>
                     <a:srgbClr val="000000"/>
                   </a:solidFill>
@@ -1616,7 +1616,7 @@
             </a:ln>
             <a:extLst>
               <a:ext uri="{91240B29-F687-4f45-9708-019B960494DF}">
-                <a14:hiddenLine xmlns="" xmlns:a14="http://schemas.microsoft.com/office/drawing/2010/main" w="9525">
+                <a14:hiddenLine xmlns:a14="http://schemas.microsoft.com/office/drawing/2010/main" xmlns="" w="9525">
                   <a:solidFill>
                     <a:srgbClr val="000000"/>
                   </a:solidFill>
@@ -1706,7 +1706,7 @@
             </a:ln>
             <a:extLst>
               <a:ext uri="{91240B29-F687-4f45-9708-019B960494DF}">
-                <a14:hiddenLine xmlns="" xmlns:a14="http://schemas.microsoft.com/office/drawing/2010/main" w="9525">
+                <a14:hiddenLine xmlns:a14="http://schemas.microsoft.com/office/drawing/2010/main" xmlns="" w="9525">
                   <a:solidFill>
                     <a:srgbClr val="000000"/>
                   </a:solidFill>
@@ -1762,7 +1762,7 @@
             </a:ln>
             <a:extLst>
               <a:ext uri="{91240B29-F687-4f45-9708-019B960494DF}">
-                <a14:hiddenLine xmlns="" xmlns:a14="http://schemas.microsoft.com/office/drawing/2010/main" w="9525">
+                <a14:hiddenLine xmlns:a14="http://schemas.microsoft.com/office/drawing/2010/main" xmlns="" w="9525">
                   <a:solidFill>
                     <a:srgbClr val="000000"/>
                   </a:solidFill>
@@ -1852,7 +1852,7 @@
             </a:ln>
             <a:extLst>
               <a:ext uri="{91240B29-F687-4f45-9708-019B960494DF}">
-                <a14:hiddenLine xmlns="" xmlns:a14="http://schemas.microsoft.com/office/drawing/2010/main" w="9525">
+                <a14:hiddenLine xmlns:a14="http://schemas.microsoft.com/office/drawing/2010/main" xmlns="" w="9525">
                   <a:solidFill>
                     <a:srgbClr val="000000"/>
                   </a:solidFill>
@@ -1908,7 +1908,7 @@
             </a:ln>
             <a:extLst>
               <a:ext uri="{91240B29-F687-4f45-9708-019B960494DF}">
-                <a14:hiddenLine xmlns="" xmlns:a14="http://schemas.microsoft.com/office/drawing/2010/main" w="9525">
+                <a14:hiddenLine xmlns:a14="http://schemas.microsoft.com/office/drawing/2010/main" xmlns="" w="9525">
                   <a:solidFill>
                     <a:srgbClr val="000000"/>
                   </a:solidFill>
@@ -1998,7 +1998,7 @@
             </a:ln>
             <a:extLst>
               <a:ext uri="{91240B29-F687-4f45-9708-019B960494DF}">
-                <a14:hiddenLine xmlns="" xmlns:a14="http://schemas.microsoft.com/office/drawing/2010/main" w="9525">
+                <a14:hiddenLine xmlns:a14="http://schemas.microsoft.com/office/drawing/2010/main" xmlns="" w="9525">
                   <a:solidFill>
                     <a:srgbClr val="000000"/>
                   </a:solidFill>
@@ -2066,7 +2066,7 @@
             </a:ln>
             <a:extLst>
               <a:ext uri="{91240B29-F687-4f45-9708-019B960494DF}">
-                <a14:hiddenLine xmlns="" xmlns:a14="http://schemas.microsoft.com/office/drawing/2010/main" w="9525">
+                <a14:hiddenLine xmlns:a14="http://schemas.microsoft.com/office/drawing/2010/main" xmlns="" w="9525">
                   <a:solidFill>
                     <a:srgbClr val="000000"/>
                   </a:solidFill>
@@ -2156,7 +2156,7 @@
             </a:ln>
             <a:extLst>
               <a:ext uri="{91240B29-F687-4f45-9708-019B960494DF}">
-                <a14:hiddenLine xmlns="" xmlns:a14="http://schemas.microsoft.com/office/drawing/2010/main" w="9525">
+                <a14:hiddenLine xmlns:a14="http://schemas.microsoft.com/office/drawing/2010/main" xmlns="" w="9525">
                   <a:solidFill>
                     <a:srgbClr val="000000"/>
                   </a:solidFill>
@@ -2224,7 +2224,7 @@
             </a:ln>
             <a:extLst>
               <a:ext uri="{91240B29-F687-4f45-9708-019B960494DF}">
-                <a14:hiddenLine xmlns="" xmlns:a14="http://schemas.microsoft.com/office/drawing/2010/main" w="9525">
+                <a14:hiddenLine xmlns:a14="http://schemas.microsoft.com/office/drawing/2010/main" xmlns="" w="9525">
                   <a:solidFill>
                     <a:srgbClr val="000000"/>
                   </a:solidFill>
@@ -2314,7 +2314,7 @@
             </a:ln>
             <a:extLst>
               <a:ext uri="{91240B29-F687-4f45-9708-019B960494DF}">
-                <a14:hiddenLine xmlns="" xmlns:a14="http://schemas.microsoft.com/office/drawing/2010/main" w="9525">
+                <a14:hiddenLine xmlns:a14="http://schemas.microsoft.com/office/drawing/2010/main" xmlns="" w="9525">
                   <a:solidFill>
                     <a:srgbClr val="000000"/>
                   </a:solidFill>
@@ -2348,7 +2348,7 @@
             </a:ln>
             <a:extLst>
               <a:ext uri="{91240B29-F687-4f45-9708-019B960494DF}">
-                <a14:hiddenLine xmlns="" xmlns:a14="http://schemas.microsoft.com/office/drawing/2010/main" w="9525">
+                <a14:hiddenLine xmlns:a14="http://schemas.microsoft.com/office/drawing/2010/main" xmlns="" w="9525">
                   <a:solidFill>
                     <a:srgbClr val="000000"/>
                   </a:solidFill>
@@ -2438,7 +2438,7 @@
             </a:ln>
             <a:extLst>
               <a:ext uri="{91240B29-F687-4f45-9708-019B960494DF}">
-                <a14:hiddenLine xmlns="" xmlns:a14="http://schemas.microsoft.com/office/drawing/2010/main" w="9525">
+                <a14:hiddenLine xmlns:a14="http://schemas.microsoft.com/office/drawing/2010/main" xmlns="" w="9525">
                   <a:solidFill>
                     <a:srgbClr val="000000"/>
                   </a:solidFill>
@@ -2500,7 +2500,7 @@
             </a:ln>
             <a:extLst>
               <a:ext uri="{91240B29-F687-4f45-9708-019B960494DF}">
-                <a14:hiddenLine xmlns="" xmlns:a14="http://schemas.microsoft.com/office/drawing/2010/main" w="9525">
+                <a14:hiddenLine xmlns:a14="http://schemas.microsoft.com/office/drawing/2010/main" xmlns="" w="9525">
                   <a:solidFill>
                     <a:srgbClr val="000000"/>
                   </a:solidFill>
@@ -2562,7 +2562,7 @@
             </a:ln>
             <a:extLst>
               <a:ext uri="{91240B29-F687-4f45-9708-019B960494DF}">
-                <a14:hiddenLine xmlns="" xmlns:a14="http://schemas.microsoft.com/office/drawing/2010/main" w="9525">
+                <a14:hiddenLine xmlns:a14="http://schemas.microsoft.com/office/drawing/2010/main" xmlns="" w="9525">
                   <a:solidFill>
                     <a:srgbClr val="000000"/>
                   </a:solidFill>
@@ -2652,7 +2652,7 @@
             </a:ln>
             <a:extLst>
               <a:ext uri="{91240B29-F687-4f45-9708-019B960494DF}">
-                <a14:hiddenLine xmlns="" xmlns:a14="http://schemas.microsoft.com/office/drawing/2010/main" w="9525">
+                <a14:hiddenLine xmlns:a14="http://schemas.microsoft.com/office/drawing/2010/main" xmlns="" w="9525">
                   <a:solidFill>
                     <a:srgbClr val="000000"/>
                   </a:solidFill>
@@ -2720,7 +2720,7 @@
             </a:ln>
             <a:extLst>
               <a:ext uri="{91240B29-F687-4f45-9708-019B960494DF}">
-                <a14:hiddenLine xmlns="" xmlns:a14="http://schemas.microsoft.com/office/drawing/2010/main" w="9525">
+                <a14:hiddenLine xmlns:a14="http://schemas.microsoft.com/office/drawing/2010/main" xmlns="" w="9525">
                   <a:solidFill>
                     <a:srgbClr val="000000"/>
                   </a:solidFill>
@@ -2782,7 +2782,7 @@
             </a:ln>
             <a:extLst>
               <a:ext uri="{91240B29-F687-4f45-9708-019B960494DF}">
-                <a14:hiddenLine xmlns="" xmlns:a14="http://schemas.microsoft.com/office/drawing/2010/main" w="9525">
+                <a14:hiddenLine xmlns:a14="http://schemas.microsoft.com/office/drawing/2010/main" xmlns="" w="9525">
                   <a:solidFill>
                     <a:srgbClr val="000000"/>
                   </a:solidFill>
@@ -2872,7 +2872,7 @@
             </a:ln>
             <a:extLst>
               <a:ext uri="{91240B29-F687-4f45-9708-019B960494DF}">
-                <a14:hiddenLine xmlns="" xmlns:a14="http://schemas.microsoft.com/office/drawing/2010/main" w="9525">
+                <a14:hiddenLine xmlns:a14="http://schemas.microsoft.com/office/drawing/2010/main" xmlns="" w="9525">
                   <a:solidFill>
                     <a:srgbClr val="000000"/>
                   </a:solidFill>
@@ -2934,7 +2934,7 @@
             </a:ln>
             <a:extLst>
               <a:ext uri="{91240B29-F687-4f45-9708-019B960494DF}">
-                <a14:hiddenLine xmlns="" xmlns:a14="http://schemas.microsoft.com/office/drawing/2010/main" w="9525">
+                <a14:hiddenLine xmlns:a14="http://schemas.microsoft.com/office/drawing/2010/main" xmlns="" w="9525">
                   <a:solidFill>
                     <a:srgbClr val="000000"/>
                   </a:solidFill>
@@ -3024,7 +3024,7 @@
             </a:ln>
             <a:extLst>
               <a:ext uri="{91240B29-F687-4f45-9708-019B960494DF}">
-                <a14:hiddenLine xmlns="" xmlns:a14="http://schemas.microsoft.com/office/drawing/2010/main" w="9525">
+                <a14:hiddenLine xmlns:a14="http://schemas.microsoft.com/office/drawing/2010/main" xmlns="" w="9525">
                   <a:solidFill>
                     <a:srgbClr val="000000"/>
                   </a:solidFill>
@@ -3086,7 +3086,7 @@
             </a:ln>
             <a:extLst>
               <a:ext uri="{91240B29-F687-4f45-9708-019B960494DF}">
-                <a14:hiddenLine xmlns="" xmlns:a14="http://schemas.microsoft.com/office/drawing/2010/main" w="9525">
+                <a14:hiddenLine xmlns:a14="http://schemas.microsoft.com/office/drawing/2010/main" xmlns="" w="9525">
                   <a:solidFill>
                     <a:srgbClr val="000000"/>
                   </a:solidFill>
@@ -3176,7 +3176,7 @@
             </a:ln>
             <a:extLst>
               <a:ext uri="{91240B29-F687-4f45-9708-019B960494DF}">
-                <a14:hiddenLine xmlns="" xmlns:a14="http://schemas.microsoft.com/office/drawing/2010/main" w="9525">
+                <a14:hiddenLine xmlns:a14="http://schemas.microsoft.com/office/drawing/2010/main" xmlns="" w="9525">
                   <a:solidFill>
                     <a:srgbClr val="000000"/>
                   </a:solidFill>
@@ -3210,7 +3210,7 @@
             </a:ln>
             <a:extLst>
               <a:ext uri="{91240B29-F687-4f45-9708-019B960494DF}">
-                <a14:hiddenLine xmlns="" xmlns:a14="http://schemas.microsoft.com/office/drawing/2010/main" w="9525">
+                <a14:hiddenLine xmlns:a14="http://schemas.microsoft.com/office/drawing/2010/main" xmlns="" w="9525">
                   <a:solidFill>
                     <a:srgbClr val="000000"/>
                   </a:solidFill>
@@ -3275,7 +3275,7 @@
             </a:ln>
             <a:extLst>
               <a:ext uri="{91240B29-F687-4f45-9708-019B960494DF}">
-                <a14:hiddenLine xmlns="" xmlns:a14="http://schemas.microsoft.com/office/drawing/2010/main" w="9525">
+                <a14:hiddenLine xmlns:a14="http://schemas.microsoft.com/office/drawing/2010/main" xmlns="" w="9525">
                   <a:solidFill>
                     <a:srgbClr val="000000"/>
                   </a:solidFill>
@@ -3365,7 +3365,7 @@
             </a:ln>
             <a:extLst>
               <a:ext uri="{91240B29-F687-4f45-9708-019B960494DF}">
-                <a14:hiddenLine xmlns="" xmlns:a14="http://schemas.microsoft.com/office/drawing/2010/main" w="9525">
+                <a14:hiddenLine xmlns:a14="http://schemas.microsoft.com/office/drawing/2010/main" xmlns="" w="9525">
                   <a:solidFill>
                     <a:srgbClr val="000000"/>
                   </a:solidFill>
@@ -3427,7 +3427,7 @@
             </a:ln>
             <a:extLst>
               <a:ext uri="{91240B29-F687-4f45-9708-019B960494DF}">
-                <a14:hiddenLine xmlns="" xmlns:a14="http://schemas.microsoft.com/office/drawing/2010/main" w="9525">
+                <a14:hiddenLine xmlns:a14="http://schemas.microsoft.com/office/drawing/2010/main" xmlns="" w="9525">
                   <a:solidFill>
                     <a:srgbClr val="000000"/>
                   </a:solidFill>
@@ -3517,7 +3517,7 @@
             </a:ln>
             <a:extLst>
               <a:ext uri="{91240B29-F687-4f45-9708-019B960494DF}">
-                <a14:hiddenLine xmlns="" xmlns:a14="http://schemas.microsoft.com/office/drawing/2010/main" w="9525">
+                <a14:hiddenLine xmlns:a14="http://schemas.microsoft.com/office/drawing/2010/main" xmlns="" w="9525">
                   <a:solidFill>
                     <a:srgbClr val="000000"/>
                   </a:solidFill>
@@ -3607,7 +3607,7 @@
             </a:ln>
             <a:extLst>
               <a:ext uri="{91240B29-F687-4f45-9708-019B960494DF}">
-                <a14:hiddenLine xmlns="" xmlns:a14="http://schemas.microsoft.com/office/drawing/2010/main" w="9525">
+                <a14:hiddenLine xmlns:a14="http://schemas.microsoft.com/office/drawing/2010/main" xmlns="" w="9525">
                   <a:solidFill>
                     <a:srgbClr val="000000"/>
                   </a:solidFill>
@@ -3672,7 +3672,7 @@
             </a:ln>
             <a:extLst>
               <a:ext uri="{91240B29-F687-4f45-9708-019B960494DF}">
-                <a14:hiddenLine xmlns="" xmlns:a14="http://schemas.microsoft.com/office/drawing/2010/main" w="9525">
+                <a14:hiddenLine xmlns:a14="http://schemas.microsoft.com/office/drawing/2010/main" xmlns="" w="9525">
                   <a:solidFill>
                     <a:srgbClr val="000000"/>
                   </a:solidFill>
@@ -3734,7 +3734,7 @@
             </a:ln>
             <a:extLst>
               <a:ext uri="{91240B29-F687-4f45-9708-019B960494DF}">
-                <a14:hiddenLine xmlns="" xmlns:a14="http://schemas.microsoft.com/office/drawing/2010/main" w="9525">
+                <a14:hiddenLine xmlns:a14="http://schemas.microsoft.com/office/drawing/2010/main" xmlns="" w="9525">
                   <a:solidFill>
                     <a:srgbClr val="000000"/>
                   </a:solidFill>
@@ -3824,7 +3824,7 @@
             </a:ln>
             <a:extLst>
               <a:ext uri="{91240B29-F687-4f45-9708-019B960494DF}">
-                <a14:hiddenLine xmlns="" xmlns:a14="http://schemas.microsoft.com/office/drawing/2010/main" w="9525">
+                <a14:hiddenLine xmlns:a14="http://schemas.microsoft.com/office/drawing/2010/main" xmlns="" w="9525">
                   <a:solidFill>
                     <a:srgbClr val="000000"/>
                   </a:solidFill>
@@ -3914,7 +3914,7 @@
             </a:ln>
             <a:extLst>
               <a:ext uri="{91240B29-F687-4f45-9708-019B960494DF}">
-                <a14:hiddenLine xmlns="" xmlns:a14="http://schemas.microsoft.com/office/drawing/2010/main" w="9525">
+                <a14:hiddenLine xmlns:a14="http://schemas.microsoft.com/office/drawing/2010/main" xmlns="" w="9525">
                   <a:solidFill>
                     <a:srgbClr val="000000"/>
                   </a:solidFill>
@@ -3976,7 +3976,7 @@
             </a:ln>
             <a:extLst>
               <a:ext uri="{91240B29-F687-4f45-9708-019B960494DF}">
-                <a14:hiddenLine xmlns="" xmlns:a14="http://schemas.microsoft.com/office/drawing/2010/main" w="9525">
+                <a14:hiddenLine xmlns:a14="http://schemas.microsoft.com/office/drawing/2010/main" xmlns="" w="9525">
                   <a:solidFill>
                     <a:srgbClr val="000000"/>
                   </a:solidFill>
@@ -4096,7 +4096,7 @@
             </a:ln>
             <a:extLst>
               <a:ext uri="{91240B29-F687-4f45-9708-019B960494DF}">
-                <a14:hiddenLine xmlns="" xmlns:a14="http://schemas.microsoft.com/office/drawing/2010/main" w="9525">
+                <a14:hiddenLine xmlns:a14="http://schemas.microsoft.com/office/drawing/2010/main" xmlns="" w="9525">
                   <a:solidFill>
                     <a:srgbClr val="000000"/>
                   </a:solidFill>
@@ -4164,7 +4164,7 @@
             </a:ln>
             <a:extLst>
               <a:ext uri="{91240B29-F687-4f45-9708-019B960494DF}">
-                <a14:hiddenLine xmlns="" xmlns:a14="http://schemas.microsoft.com/office/drawing/2010/main" w="9525">
+                <a14:hiddenLine xmlns:a14="http://schemas.microsoft.com/office/drawing/2010/main" xmlns="" w="9525">
                   <a:solidFill>
                     <a:srgbClr val="000000"/>
                   </a:solidFill>
@@ -4254,7 +4254,7 @@
             </a:ln>
             <a:extLst>
               <a:ext uri="{91240B29-F687-4f45-9708-019B960494DF}">
-                <a14:hiddenLine xmlns="" xmlns:a14="http://schemas.microsoft.com/office/drawing/2010/main" w="9525">
+                <a14:hiddenLine xmlns:a14="http://schemas.microsoft.com/office/drawing/2010/main" xmlns="" w="9525">
                   <a:solidFill>
                     <a:srgbClr val="000000"/>
                   </a:solidFill>
@@ -9061,7 +9061,7 @@
           <a:noFill/>
           <a:extLst>
             <a:ext uri="{909E8E84-426E-40dd-AFC4-6F175D3DCCD1}">
-              <a14:hiddenFill xmlns="" xmlns:a14="http://schemas.microsoft.com/office/drawing/2010/main">
+              <a14:hiddenFill xmlns:a14="http://schemas.microsoft.com/office/drawing/2010/main" xmlns="">
                 <a:solidFill>
                   <a:srgbClr val="FFFFFF"/>
                 </a:solidFill>
@@ -9135,7 +9135,7 @@
               </a:ln>
               <a:extLst>
                 <a:ext uri="{91240B29-F687-4f45-9708-019B960494DF}">
-                  <a14:hiddenLine xmlns="" xmlns:a14="http://schemas.microsoft.com/office/drawing/2010/main" w="9525">
+                  <a14:hiddenLine xmlns:a14="http://schemas.microsoft.com/office/drawing/2010/main" xmlns="" w="9525">
                     <a:solidFill>
                       <a:srgbClr val="000000"/>
                     </a:solidFill>
@@ -9225,7 +9225,7 @@
               </a:ln>
               <a:extLst>
                 <a:ext uri="{91240B29-F687-4f45-9708-019B960494DF}">
-                  <a14:hiddenLine xmlns="" xmlns:a14="http://schemas.microsoft.com/office/drawing/2010/main" w="9525">
+                  <a14:hiddenLine xmlns:a14="http://schemas.microsoft.com/office/drawing/2010/main" xmlns="" w="9525">
                     <a:solidFill>
                       <a:srgbClr val="000000"/>
                     </a:solidFill>
@@ -9315,7 +9315,7 @@
               </a:ln>
               <a:extLst>
                 <a:ext uri="{91240B29-F687-4f45-9708-019B960494DF}">
-                  <a14:hiddenLine xmlns="" xmlns:a14="http://schemas.microsoft.com/office/drawing/2010/main" w="9525">
+                  <a14:hiddenLine xmlns:a14="http://schemas.microsoft.com/office/drawing/2010/main" xmlns="" w="9525">
                     <a:solidFill>
                       <a:srgbClr val="000000"/>
                     </a:solidFill>
@@ -9377,7 +9377,7 @@
               </a:ln>
               <a:extLst>
                 <a:ext uri="{91240B29-F687-4f45-9708-019B960494DF}">
-                  <a14:hiddenLine xmlns="" xmlns:a14="http://schemas.microsoft.com/office/drawing/2010/main" w="9525">
+                  <a14:hiddenLine xmlns:a14="http://schemas.microsoft.com/office/drawing/2010/main" xmlns="" w="9525">
                     <a:solidFill>
                       <a:srgbClr val="000000"/>
                     </a:solidFill>
@@ -9467,7 +9467,7 @@
               </a:ln>
               <a:extLst>
                 <a:ext uri="{91240B29-F687-4f45-9708-019B960494DF}">
-                  <a14:hiddenLine xmlns="" xmlns:a14="http://schemas.microsoft.com/office/drawing/2010/main" w="9525">
+                  <a14:hiddenLine xmlns:a14="http://schemas.microsoft.com/office/drawing/2010/main" xmlns="" w="9525">
                     <a:solidFill>
                       <a:srgbClr val="000000"/>
                     </a:solidFill>
@@ -9529,7 +9529,7 @@
               </a:ln>
               <a:extLst>
                 <a:ext uri="{91240B29-F687-4f45-9708-019B960494DF}">
-                  <a14:hiddenLine xmlns="" xmlns:a14="http://schemas.microsoft.com/office/drawing/2010/main" w="9525">
+                  <a14:hiddenLine xmlns:a14="http://schemas.microsoft.com/office/drawing/2010/main" xmlns="" w="9525">
                     <a:solidFill>
                       <a:srgbClr val="000000"/>
                     </a:solidFill>
@@ -9591,7 +9591,7 @@
               </a:ln>
               <a:extLst>
                 <a:ext uri="{91240B29-F687-4f45-9708-019B960494DF}">
-                  <a14:hiddenLine xmlns="" xmlns:a14="http://schemas.microsoft.com/office/drawing/2010/main" w="9525">
+                  <a14:hiddenLine xmlns:a14="http://schemas.microsoft.com/office/drawing/2010/main" xmlns="" w="9525">
                     <a:solidFill>
                       <a:srgbClr val="000000"/>
                     </a:solidFill>
@@ -9681,7 +9681,7 @@
               </a:ln>
               <a:extLst>
                 <a:ext uri="{91240B29-F687-4f45-9708-019B960494DF}">
-                  <a14:hiddenLine xmlns="" xmlns:a14="http://schemas.microsoft.com/office/drawing/2010/main" w="9525">
+                  <a14:hiddenLine xmlns:a14="http://schemas.microsoft.com/office/drawing/2010/main" xmlns="" w="9525">
                     <a:solidFill>
                       <a:srgbClr val="000000"/>
                     </a:solidFill>
@@ -9771,7 +9771,7 @@
               </a:ln>
               <a:extLst>
                 <a:ext uri="{91240B29-F687-4f45-9708-019B960494DF}">
-                  <a14:hiddenLine xmlns="" xmlns:a14="http://schemas.microsoft.com/office/drawing/2010/main" w="9525">
+                  <a14:hiddenLine xmlns:a14="http://schemas.microsoft.com/office/drawing/2010/main" xmlns="" w="9525">
                     <a:solidFill>
                       <a:srgbClr val="000000"/>
                     </a:solidFill>
@@ -9833,7 +9833,7 @@
               </a:ln>
               <a:extLst>
                 <a:ext uri="{91240B29-F687-4f45-9708-019B960494DF}">
-                  <a14:hiddenLine xmlns="" xmlns:a14="http://schemas.microsoft.com/office/drawing/2010/main" w="9525">
+                  <a14:hiddenLine xmlns:a14="http://schemas.microsoft.com/office/drawing/2010/main" xmlns="" w="9525">
                     <a:solidFill>
                       <a:srgbClr val="000000"/>
                     </a:solidFill>
@@ -9943,7 +9943,7 @@
               </a:ln>
               <a:extLst>
                 <a:ext uri="{91240B29-F687-4f45-9708-019B960494DF}">
-                  <a14:hiddenLine xmlns="" xmlns:a14="http://schemas.microsoft.com/office/drawing/2010/main" w="9525">
+                  <a14:hiddenLine xmlns:a14="http://schemas.microsoft.com/office/drawing/2010/main" xmlns="" w="9525">
                     <a:solidFill>
                       <a:srgbClr val="000000"/>
                     </a:solidFill>
@@ -10027,7 +10027,7 @@
               </a:ln>
               <a:extLst>
                 <a:ext uri="{91240B29-F687-4f45-9708-019B960494DF}">
-                  <a14:hiddenLine xmlns="" xmlns:a14="http://schemas.microsoft.com/office/drawing/2010/main" w="9525">
+                  <a14:hiddenLine xmlns:a14="http://schemas.microsoft.com/office/drawing/2010/main" xmlns="" w="9525">
                     <a:solidFill>
                       <a:srgbClr val="000000"/>
                     </a:solidFill>
@@ -10089,7 +10089,7 @@
               </a:ln>
               <a:extLst>
                 <a:ext uri="{91240B29-F687-4f45-9708-019B960494DF}">
-                  <a14:hiddenLine xmlns="" xmlns:a14="http://schemas.microsoft.com/office/drawing/2010/main" w="9525">
+                  <a14:hiddenLine xmlns:a14="http://schemas.microsoft.com/office/drawing/2010/main" xmlns="" w="9525">
                     <a:solidFill>
                       <a:srgbClr val="000000"/>
                     </a:solidFill>
@@ -10151,7 +10151,7 @@
               </a:ln>
               <a:extLst>
                 <a:ext uri="{91240B29-F687-4f45-9708-019B960494DF}">
-                  <a14:hiddenLine xmlns="" xmlns:a14="http://schemas.microsoft.com/office/drawing/2010/main" w="9525">
+                  <a14:hiddenLine xmlns:a14="http://schemas.microsoft.com/office/drawing/2010/main" xmlns="" w="9525">
                     <a:solidFill>
                       <a:srgbClr val="000000"/>
                     </a:solidFill>
@@ -10241,7 +10241,7 @@
               </a:ln>
               <a:extLst>
                 <a:ext uri="{91240B29-F687-4f45-9708-019B960494DF}">
-                  <a14:hiddenLine xmlns="" xmlns:a14="http://schemas.microsoft.com/office/drawing/2010/main" w="9525">
+                  <a14:hiddenLine xmlns:a14="http://schemas.microsoft.com/office/drawing/2010/main" xmlns="" w="9525">
                     <a:solidFill>
                       <a:srgbClr val="000000"/>
                     </a:solidFill>
@@ -10275,7 +10275,7 @@
               </a:ln>
               <a:extLst>
                 <a:ext uri="{91240B29-F687-4f45-9708-019B960494DF}">
-                  <a14:hiddenLine xmlns="" xmlns:a14="http://schemas.microsoft.com/office/drawing/2010/main" w="9525">
+                  <a14:hiddenLine xmlns:a14="http://schemas.microsoft.com/office/drawing/2010/main" xmlns="" w="9525">
                     <a:solidFill>
                       <a:srgbClr val="000000"/>
                     </a:solidFill>
@@ -10340,7 +10340,7 @@
               </a:ln>
               <a:extLst>
                 <a:ext uri="{91240B29-F687-4f45-9708-019B960494DF}">
-                  <a14:hiddenLine xmlns="" xmlns:a14="http://schemas.microsoft.com/office/drawing/2010/main" w="9525">
+                  <a14:hiddenLine xmlns:a14="http://schemas.microsoft.com/office/drawing/2010/main" xmlns="" w="9525">
                     <a:solidFill>
                       <a:srgbClr val="000000"/>
                     </a:solidFill>
@@ -10430,7 +10430,7 @@
               </a:ln>
               <a:extLst>
                 <a:ext uri="{91240B29-F687-4f45-9708-019B960494DF}">
-                  <a14:hiddenLine xmlns="" xmlns:a14="http://schemas.microsoft.com/office/drawing/2010/main" w="9525">
+                  <a14:hiddenLine xmlns:a14="http://schemas.microsoft.com/office/drawing/2010/main" xmlns="" w="9525">
                     <a:solidFill>
                       <a:srgbClr val="000000"/>
                     </a:solidFill>
@@ -10492,7 +10492,7 @@
               </a:ln>
               <a:extLst>
                 <a:ext uri="{91240B29-F687-4f45-9708-019B960494DF}">
-                  <a14:hiddenLine xmlns="" xmlns:a14="http://schemas.microsoft.com/office/drawing/2010/main" w="9525">
+                  <a14:hiddenLine xmlns:a14="http://schemas.microsoft.com/office/drawing/2010/main" xmlns="" w="9525">
                     <a:solidFill>
                       <a:srgbClr val="000000"/>
                     </a:solidFill>
@@ -10582,7 +10582,7 @@
               </a:ln>
               <a:extLst>
                 <a:ext uri="{91240B29-F687-4f45-9708-019B960494DF}">
-                  <a14:hiddenLine xmlns="" xmlns:a14="http://schemas.microsoft.com/office/drawing/2010/main" w="9525">
+                  <a14:hiddenLine xmlns:a14="http://schemas.microsoft.com/office/drawing/2010/main" xmlns="" w="9525">
                     <a:solidFill>
                       <a:srgbClr val="000000"/>
                     </a:solidFill>
@@ -10647,7 +10647,7 @@
               </a:ln>
               <a:extLst>
                 <a:ext uri="{91240B29-F687-4f45-9708-019B960494DF}">
-                  <a14:hiddenLine xmlns="" xmlns:a14="http://schemas.microsoft.com/office/drawing/2010/main" w="9525">
+                  <a14:hiddenLine xmlns:a14="http://schemas.microsoft.com/office/drawing/2010/main" xmlns="" w="9525">
                     <a:solidFill>
                       <a:srgbClr val="000000"/>
                     </a:solidFill>
@@ -10709,7 +10709,7 @@
               </a:ln>
               <a:extLst>
                 <a:ext uri="{91240B29-F687-4f45-9708-019B960494DF}">
-                  <a14:hiddenLine xmlns="" xmlns:a14="http://schemas.microsoft.com/office/drawing/2010/main" w="9525">
+                  <a14:hiddenLine xmlns:a14="http://schemas.microsoft.com/office/drawing/2010/main" xmlns="" w="9525">
                     <a:solidFill>
                       <a:srgbClr val="000000"/>
                     </a:solidFill>
@@ -10799,7 +10799,7 @@
               </a:ln>
               <a:extLst>
                 <a:ext uri="{91240B29-F687-4f45-9708-019B960494DF}">
-                  <a14:hiddenLine xmlns="" xmlns:a14="http://schemas.microsoft.com/office/drawing/2010/main" w="9525">
+                  <a14:hiddenLine xmlns:a14="http://schemas.microsoft.com/office/drawing/2010/main" xmlns="" w="9525">
                     <a:solidFill>
                       <a:srgbClr val="000000"/>
                     </a:solidFill>
@@ -10889,7 +10889,7 @@
               </a:ln>
               <a:extLst>
                 <a:ext uri="{91240B29-F687-4f45-9708-019B960494DF}">
-                  <a14:hiddenLine xmlns="" xmlns:a14="http://schemas.microsoft.com/office/drawing/2010/main" w="9525">
+                  <a14:hiddenLine xmlns:a14="http://schemas.microsoft.com/office/drawing/2010/main" xmlns="" w="9525">
                     <a:solidFill>
                       <a:srgbClr val="000000"/>
                     </a:solidFill>
@@ -10954,7 +10954,7 @@
               </a:ln>
               <a:extLst>
                 <a:ext uri="{91240B29-F687-4f45-9708-019B960494DF}">
-                  <a14:hiddenLine xmlns="" xmlns:a14="http://schemas.microsoft.com/office/drawing/2010/main" w="9525">
+                  <a14:hiddenLine xmlns:a14="http://schemas.microsoft.com/office/drawing/2010/main" xmlns="" w="9525">
                     <a:solidFill>
                       <a:srgbClr val="000000"/>
                     </a:solidFill>
@@ -11074,7 +11074,7 @@
               </a:ln>
               <a:extLst>
                 <a:ext uri="{91240B29-F687-4f45-9708-019B960494DF}">
-                  <a14:hiddenLine xmlns="" xmlns:a14="http://schemas.microsoft.com/office/drawing/2010/main" w="9525">
+                  <a14:hiddenLine xmlns:a14="http://schemas.microsoft.com/office/drawing/2010/main" xmlns="" w="9525">
                     <a:solidFill>
                       <a:srgbClr val="000000"/>
                     </a:solidFill>
@@ -11172,7 +11172,7 @@
               </a:ln>
               <a:extLst>
                 <a:ext uri="{91240B29-F687-4f45-9708-019B960494DF}">
-                  <a14:hiddenLine xmlns="" xmlns:a14="http://schemas.microsoft.com/office/drawing/2010/main" w="9525">
+                  <a14:hiddenLine xmlns:a14="http://schemas.microsoft.com/office/drawing/2010/main" xmlns="" w="9525">
                     <a:solidFill>
                       <a:srgbClr val="000000"/>
                     </a:solidFill>
@@ -11287,7 +11287,7 @@
               </a:ln>
               <a:extLst>
                 <a:ext uri="{91240B29-F687-4f45-9708-019B960494DF}">
-                  <a14:hiddenLine xmlns="" xmlns:a14="http://schemas.microsoft.com/office/drawing/2010/main" w="9525">
+                  <a14:hiddenLine xmlns:a14="http://schemas.microsoft.com/office/drawing/2010/main" xmlns="" w="9525">
                     <a:solidFill>
                       <a:srgbClr val="000000"/>
                     </a:solidFill>
@@ -11377,7 +11377,7 @@
               </a:ln>
               <a:extLst>
                 <a:ext uri="{91240B29-F687-4f45-9708-019B960494DF}">
-                  <a14:hiddenLine xmlns="" xmlns:a14="http://schemas.microsoft.com/office/drawing/2010/main" w="9525">
+                  <a14:hiddenLine xmlns:a14="http://schemas.microsoft.com/office/drawing/2010/main" xmlns="" w="9525">
                     <a:solidFill>
                       <a:srgbClr val="000000"/>
                     </a:solidFill>
@@ -11442,7 +11442,7 @@
               </a:ln>
               <a:extLst>
                 <a:ext uri="{91240B29-F687-4f45-9708-019B960494DF}">
-                  <a14:hiddenLine xmlns="" xmlns:a14="http://schemas.microsoft.com/office/drawing/2010/main" w="9525">
+                  <a14:hiddenLine xmlns:a14="http://schemas.microsoft.com/office/drawing/2010/main" xmlns="" w="9525">
                     <a:solidFill>
                       <a:srgbClr val="000000"/>
                     </a:solidFill>
@@ -11532,7 +11532,7 @@
               </a:ln>
               <a:extLst>
                 <a:ext uri="{91240B29-F687-4f45-9708-019B960494DF}">
-                  <a14:hiddenLine xmlns="" xmlns:a14="http://schemas.microsoft.com/office/drawing/2010/main" w="9525">
+                  <a14:hiddenLine xmlns:a14="http://schemas.microsoft.com/office/drawing/2010/main" xmlns="" w="9525">
                     <a:solidFill>
                       <a:srgbClr val="000000"/>
                     </a:solidFill>
@@ -11600,7 +11600,7 @@
               </a:ln>
               <a:extLst>
                 <a:ext uri="{91240B29-F687-4f45-9708-019B960494DF}">
-                  <a14:hiddenLine xmlns="" xmlns:a14="http://schemas.microsoft.com/office/drawing/2010/main" w="9525">
+                  <a14:hiddenLine xmlns:a14="http://schemas.microsoft.com/office/drawing/2010/main" xmlns="" w="9525">
                     <a:solidFill>
                       <a:srgbClr val="000000"/>
                     </a:solidFill>
@@ -11690,7 +11690,7 @@
               </a:ln>
               <a:extLst>
                 <a:ext uri="{91240B29-F687-4f45-9708-019B960494DF}">
-                  <a14:hiddenLine xmlns="" xmlns:a14="http://schemas.microsoft.com/office/drawing/2010/main" w="9525">
+                  <a14:hiddenLine xmlns:a14="http://schemas.microsoft.com/office/drawing/2010/main" xmlns="" w="9525">
                     <a:solidFill>
                       <a:srgbClr val="000000"/>
                     </a:solidFill>
@@ -11758,7 +11758,7 @@
               </a:ln>
               <a:extLst>
                 <a:ext uri="{91240B29-F687-4f45-9708-019B960494DF}">
-                  <a14:hiddenLine xmlns="" xmlns:a14="http://schemas.microsoft.com/office/drawing/2010/main" w="9525">
+                  <a14:hiddenLine xmlns:a14="http://schemas.microsoft.com/office/drawing/2010/main" xmlns="" w="9525">
                     <a:solidFill>
                       <a:srgbClr val="000000"/>
                     </a:solidFill>
@@ -11848,7 +11848,7 @@
               </a:ln>
               <a:extLst>
                 <a:ext uri="{91240B29-F687-4f45-9708-019B960494DF}">
-                  <a14:hiddenLine xmlns="" xmlns:a14="http://schemas.microsoft.com/office/drawing/2010/main" w="9525">
+                  <a14:hiddenLine xmlns:a14="http://schemas.microsoft.com/office/drawing/2010/main" xmlns="" w="9525">
                     <a:solidFill>
                       <a:srgbClr val="000000"/>
                     </a:solidFill>
@@ -11882,7 +11882,7 @@
               </a:ln>
               <a:extLst>
                 <a:ext uri="{91240B29-F687-4f45-9708-019B960494DF}">
-                  <a14:hiddenLine xmlns="" xmlns:a14="http://schemas.microsoft.com/office/drawing/2010/main" w="9525">
+                  <a14:hiddenLine xmlns:a14="http://schemas.microsoft.com/office/drawing/2010/main" xmlns="" w="9525">
                     <a:solidFill>
                       <a:srgbClr val="000000"/>
                     </a:solidFill>
@@ -12702,7 +12702,6 @@
               <a:rPr lang="en-US" b="1" dirty="0" smtClean="0"/>
               <a:t>master</a:t>
             </a:r>
-            <a:endParaRPr lang="en-US" b="1" dirty="0" smtClean="0"/>
           </a:p>
           <a:p>
             <a:r>
@@ -13218,8 +13217,13 @@
             <a:pPr lvl="1"/>
             <a:r>
               <a:rPr lang="en-US" dirty="0" smtClean="0"/>
-              <a:t>Milan Starcevic</a:t>
-            </a:r>
+              <a:t>Milan </a:t>
+            </a:r>
+            <a:r>
+              <a:rPr lang="en-US" dirty="0" smtClean="0"/>
+              <a:t>Starcevic</a:t>
+            </a:r>
+            <a:endParaRPr lang="en-US" dirty="0" smtClean="0"/>
           </a:p>
           <a:p>
             <a:pPr lvl="1"/>
@@ -13244,8 +13248,20 @@
             <a:pPr lvl="1"/>
             <a:r>
               <a:rPr lang="en-US" dirty="0" smtClean="0"/>
-              <a:t>Stefan Rankovic</a:t>
-            </a:r>
+              <a:t>Stefan </a:t>
+            </a:r>
+            <a:r>
+              <a:rPr lang="en-US" dirty="0" smtClean="0"/>
+              <a:t>Rankovic</a:t>
+            </a:r>
+          </a:p>
+          <a:p>
+            <a:pPr lvl="1"/>
+            <a:r>
+              <a:rPr lang="en-US" smtClean="0"/>
+              <a:t>Ognjen Blagojevic</a:t>
+            </a:r>
+            <a:endParaRPr lang="en-US" dirty="0" smtClean="0"/>
           </a:p>
         </p:txBody>
       </p:sp>

</xml_diff>

<commit_message>
Changed security theory lessons to reference the C# app
</commit_message>
<xml_diff>
--- a/security/00-Introduction/Introduction.pptx
+++ b/security/00-Introduction/Introduction.pptx
@@ -12,6 +12,7 @@
     <p:sldId id="260" r:id="rId6"/>
     <p:sldId id="261" r:id="rId7"/>
     <p:sldId id="262" r:id="rId8"/>
+    <p:sldId id="263" r:id="rId9"/>
   </p:sldIdLst>
   <p:sldSz cx="12192000" cy="6858000"/>
   <p:notesSz cx="6858000" cy="9144000"/>
@@ -168,7 +169,7 @@
           <a:noFill/>
           <a:extLst>
             <a:ext uri="{909E8E84-426E-40dd-AFC4-6F175D3DCCD1}">
-              <a14:hiddenFill xmlns:a14="http://schemas.microsoft.com/office/drawing/2010/main" xmlns="">
+              <a14:hiddenFill xmlns="" xmlns:a14="http://schemas.microsoft.com/office/drawing/2010/main">
                 <a:solidFill>
                   <a:srgbClr val="FFFFFF"/>
                 </a:solidFill>
@@ -228,7 +229,7 @@
             </a:ln>
             <a:extLst>
               <a:ext uri="{91240B29-F687-4f45-9708-019B960494DF}">
-                <a14:hiddenLine xmlns:a14="http://schemas.microsoft.com/office/drawing/2010/main" xmlns="" w="9525">
+                <a14:hiddenLine xmlns="" xmlns:a14="http://schemas.microsoft.com/office/drawing/2010/main" w="9525">
                   <a:solidFill>
                     <a:srgbClr val="000000"/>
                   </a:solidFill>
@@ -318,7 +319,7 @@
             </a:ln>
             <a:extLst>
               <a:ext uri="{91240B29-F687-4f45-9708-019B960494DF}">
-                <a14:hiddenLine xmlns:a14="http://schemas.microsoft.com/office/drawing/2010/main" xmlns="" w="9525">
+                <a14:hiddenLine xmlns="" xmlns:a14="http://schemas.microsoft.com/office/drawing/2010/main" w="9525">
                   <a:solidFill>
                     <a:srgbClr val="000000"/>
                   </a:solidFill>
@@ -408,7 +409,7 @@
             </a:ln>
             <a:extLst>
               <a:ext uri="{91240B29-F687-4f45-9708-019B960494DF}">
-                <a14:hiddenLine xmlns:a14="http://schemas.microsoft.com/office/drawing/2010/main" xmlns="" w="9525">
+                <a14:hiddenLine xmlns="" xmlns:a14="http://schemas.microsoft.com/office/drawing/2010/main" w="9525">
                   <a:solidFill>
                     <a:srgbClr val="000000"/>
                   </a:solidFill>
@@ -442,7 +443,7 @@
             </a:ln>
             <a:extLst>
               <a:ext uri="{91240B29-F687-4f45-9708-019B960494DF}">
-                <a14:hiddenLine xmlns:a14="http://schemas.microsoft.com/office/drawing/2010/main" xmlns="" w="9525">
+                <a14:hiddenLine xmlns="" xmlns:a14="http://schemas.microsoft.com/office/drawing/2010/main" w="9525">
                   <a:solidFill>
                     <a:srgbClr val="000000"/>
                   </a:solidFill>
@@ -532,7 +533,7 @@
             </a:ln>
             <a:extLst>
               <a:ext uri="{91240B29-F687-4f45-9708-019B960494DF}">
-                <a14:hiddenLine xmlns:a14="http://schemas.microsoft.com/office/drawing/2010/main" xmlns="" w="9525">
+                <a14:hiddenLine xmlns="" xmlns:a14="http://schemas.microsoft.com/office/drawing/2010/main" w="9525">
                   <a:solidFill>
                     <a:srgbClr val="000000"/>
                   </a:solidFill>
@@ -594,7 +595,7 @@
             </a:ln>
             <a:extLst>
               <a:ext uri="{91240B29-F687-4f45-9708-019B960494DF}">
-                <a14:hiddenLine xmlns:a14="http://schemas.microsoft.com/office/drawing/2010/main" xmlns="" w="9525">
+                <a14:hiddenLine xmlns="" xmlns:a14="http://schemas.microsoft.com/office/drawing/2010/main" w="9525">
                   <a:solidFill>
                     <a:srgbClr val="000000"/>
                   </a:solidFill>
@@ -656,7 +657,7 @@
             </a:ln>
             <a:extLst>
               <a:ext uri="{91240B29-F687-4f45-9708-019B960494DF}">
-                <a14:hiddenLine xmlns:a14="http://schemas.microsoft.com/office/drawing/2010/main" xmlns="" w="9525">
+                <a14:hiddenLine xmlns="" xmlns:a14="http://schemas.microsoft.com/office/drawing/2010/main" w="9525">
                   <a:solidFill>
                     <a:srgbClr val="000000"/>
                   </a:solidFill>
@@ -746,7 +747,7 @@
             </a:ln>
             <a:extLst>
               <a:ext uri="{91240B29-F687-4f45-9708-019B960494DF}">
-                <a14:hiddenLine xmlns:a14="http://schemas.microsoft.com/office/drawing/2010/main" xmlns="" w="9525">
+                <a14:hiddenLine xmlns="" xmlns:a14="http://schemas.microsoft.com/office/drawing/2010/main" w="9525">
                   <a:solidFill>
                     <a:srgbClr val="000000"/>
                   </a:solidFill>
@@ -808,7 +809,7 @@
             </a:ln>
             <a:extLst>
               <a:ext uri="{91240B29-F687-4f45-9708-019B960494DF}">
-                <a14:hiddenLine xmlns:a14="http://schemas.microsoft.com/office/drawing/2010/main" xmlns="" w="9525">
+                <a14:hiddenLine xmlns="" xmlns:a14="http://schemas.microsoft.com/office/drawing/2010/main" w="9525">
                   <a:solidFill>
                     <a:srgbClr val="000000"/>
                   </a:solidFill>
@@ -870,7 +871,7 @@
             </a:ln>
             <a:extLst>
               <a:ext uri="{91240B29-F687-4f45-9708-019B960494DF}">
-                <a14:hiddenLine xmlns:a14="http://schemas.microsoft.com/office/drawing/2010/main" xmlns="" w="9525">
+                <a14:hiddenLine xmlns="" xmlns:a14="http://schemas.microsoft.com/office/drawing/2010/main" w="9525">
                   <a:solidFill>
                     <a:srgbClr val="000000"/>
                   </a:solidFill>
@@ -960,7 +961,7 @@
             </a:ln>
             <a:extLst>
               <a:ext uri="{91240B29-F687-4f45-9708-019B960494DF}">
-                <a14:hiddenLine xmlns:a14="http://schemas.microsoft.com/office/drawing/2010/main" xmlns="" w="9525">
+                <a14:hiddenLine xmlns="" xmlns:a14="http://schemas.microsoft.com/office/drawing/2010/main" w="9525">
                   <a:solidFill>
                     <a:srgbClr val="000000"/>
                   </a:solidFill>
@@ -1050,7 +1051,7 @@
             </a:ln>
             <a:extLst>
               <a:ext uri="{91240B29-F687-4f45-9708-019B960494DF}">
-                <a14:hiddenLine xmlns:a14="http://schemas.microsoft.com/office/drawing/2010/main" xmlns="" w="9525">
+                <a14:hiddenLine xmlns="" xmlns:a14="http://schemas.microsoft.com/office/drawing/2010/main" w="9525">
                   <a:solidFill>
                     <a:srgbClr val="000000"/>
                   </a:solidFill>
@@ -1112,7 +1113,7 @@
             </a:ln>
             <a:extLst>
               <a:ext uri="{91240B29-F687-4f45-9708-019B960494DF}">
-                <a14:hiddenLine xmlns:a14="http://schemas.microsoft.com/office/drawing/2010/main" xmlns="" w="9525">
+                <a14:hiddenLine xmlns="" xmlns:a14="http://schemas.microsoft.com/office/drawing/2010/main" w="9525">
                   <a:solidFill>
                     <a:srgbClr val="000000"/>
                   </a:solidFill>
@@ -1222,7 +1223,7 @@
             </a:ln>
             <a:extLst>
               <a:ext uri="{91240B29-F687-4f45-9708-019B960494DF}">
-                <a14:hiddenLine xmlns:a14="http://schemas.microsoft.com/office/drawing/2010/main" xmlns="" w="9525">
+                <a14:hiddenLine xmlns="" xmlns:a14="http://schemas.microsoft.com/office/drawing/2010/main" w="9525">
                   <a:solidFill>
                     <a:srgbClr val="000000"/>
                   </a:solidFill>
@@ -1284,7 +1285,7 @@
             </a:ln>
             <a:extLst>
               <a:ext uri="{91240B29-F687-4f45-9708-019B960494DF}">
-                <a14:hiddenLine xmlns:a14="http://schemas.microsoft.com/office/drawing/2010/main" xmlns="" w="9525">
+                <a14:hiddenLine xmlns="" xmlns:a14="http://schemas.microsoft.com/office/drawing/2010/main" w="9525">
                   <a:solidFill>
                     <a:srgbClr val="000000"/>
                   </a:solidFill>
@@ -1374,7 +1375,7 @@
             </a:ln>
             <a:extLst>
               <a:ext uri="{91240B29-F687-4f45-9708-019B960494DF}">
-                <a14:hiddenLine xmlns:a14="http://schemas.microsoft.com/office/drawing/2010/main" xmlns="" w="9525">
+                <a14:hiddenLine xmlns="" xmlns:a14="http://schemas.microsoft.com/office/drawing/2010/main" w="9525">
                   <a:solidFill>
                     <a:srgbClr val="000000"/>
                   </a:solidFill>
@@ -1464,7 +1465,7 @@
             </a:ln>
             <a:extLst>
               <a:ext uri="{91240B29-F687-4f45-9708-019B960494DF}">
-                <a14:hiddenLine xmlns:a14="http://schemas.microsoft.com/office/drawing/2010/main" xmlns="" w="9525">
+                <a14:hiddenLine xmlns="" xmlns:a14="http://schemas.microsoft.com/office/drawing/2010/main" w="9525">
                   <a:solidFill>
                     <a:srgbClr val="000000"/>
                   </a:solidFill>
@@ -1526,7 +1527,7 @@
             </a:ln>
             <a:extLst>
               <a:ext uri="{91240B29-F687-4f45-9708-019B960494DF}">
-                <a14:hiddenLine xmlns:a14="http://schemas.microsoft.com/office/drawing/2010/main" xmlns="" w="9525">
+                <a14:hiddenLine xmlns="" xmlns:a14="http://schemas.microsoft.com/office/drawing/2010/main" w="9525">
                   <a:solidFill>
                     <a:srgbClr val="000000"/>
                   </a:solidFill>
@@ -1616,7 +1617,7 @@
             </a:ln>
             <a:extLst>
               <a:ext uri="{91240B29-F687-4f45-9708-019B960494DF}">
-                <a14:hiddenLine xmlns:a14="http://schemas.microsoft.com/office/drawing/2010/main" xmlns="" w="9525">
+                <a14:hiddenLine xmlns="" xmlns:a14="http://schemas.microsoft.com/office/drawing/2010/main" w="9525">
                   <a:solidFill>
                     <a:srgbClr val="000000"/>
                   </a:solidFill>
@@ -1706,7 +1707,7 @@
             </a:ln>
             <a:extLst>
               <a:ext uri="{91240B29-F687-4f45-9708-019B960494DF}">
-                <a14:hiddenLine xmlns:a14="http://schemas.microsoft.com/office/drawing/2010/main" xmlns="" w="9525">
+                <a14:hiddenLine xmlns="" xmlns:a14="http://schemas.microsoft.com/office/drawing/2010/main" w="9525">
                   <a:solidFill>
                     <a:srgbClr val="000000"/>
                   </a:solidFill>
@@ -1762,7 +1763,7 @@
             </a:ln>
             <a:extLst>
               <a:ext uri="{91240B29-F687-4f45-9708-019B960494DF}">
-                <a14:hiddenLine xmlns:a14="http://schemas.microsoft.com/office/drawing/2010/main" xmlns="" w="9525">
+                <a14:hiddenLine xmlns="" xmlns:a14="http://schemas.microsoft.com/office/drawing/2010/main" w="9525">
                   <a:solidFill>
                     <a:srgbClr val="000000"/>
                   </a:solidFill>
@@ -1852,7 +1853,7 @@
             </a:ln>
             <a:extLst>
               <a:ext uri="{91240B29-F687-4f45-9708-019B960494DF}">
-                <a14:hiddenLine xmlns:a14="http://schemas.microsoft.com/office/drawing/2010/main" xmlns="" w="9525">
+                <a14:hiddenLine xmlns="" xmlns:a14="http://schemas.microsoft.com/office/drawing/2010/main" w="9525">
                   <a:solidFill>
                     <a:srgbClr val="000000"/>
                   </a:solidFill>
@@ -1908,7 +1909,7 @@
             </a:ln>
             <a:extLst>
               <a:ext uri="{91240B29-F687-4f45-9708-019B960494DF}">
-                <a14:hiddenLine xmlns:a14="http://schemas.microsoft.com/office/drawing/2010/main" xmlns="" w="9525">
+                <a14:hiddenLine xmlns="" xmlns:a14="http://schemas.microsoft.com/office/drawing/2010/main" w="9525">
                   <a:solidFill>
                     <a:srgbClr val="000000"/>
                   </a:solidFill>
@@ -1998,7 +1999,7 @@
             </a:ln>
             <a:extLst>
               <a:ext uri="{91240B29-F687-4f45-9708-019B960494DF}">
-                <a14:hiddenLine xmlns:a14="http://schemas.microsoft.com/office/drawing/2010/main" xmlns="" w="9525">
+                <a14:hiddenLine xmlns="" xmlns:a14="http://schemas.microsoft.com/office/drawing/2010/main" w="9525">
                   <a:solidFill>
                     <a:srgbClr val="000000"/>
                   </a:solidFill>
@@ -2066,7 +2067,7 @@
             </a:ln>
             <a:extLst>
               <a:ext uri="{91240B29-F687-4f45-9708-019B960494DF}">
-                <a14:hiddenLine xmlns:a14="http://schemas.microsoft.com/office/drawing/2010/main" xmlns="" w="9525">
+                <a14:hiddenLine xmlns="" xmlns:a14="http://schemas.microsoft.com/office/drawing/2010/main" w="9525">
                   <a:solidFill>
                     <a:srgbClr val="000000"/>
                   </a:solidFill>
@@ -2156,7 +2157,7 @@
             </a:ln>
             <a:extLst>
               <a:ext uri="{91240B29-F687-4f45-9708-019B960494DF}">
-                <a14:hiddenLine xmlns:a14="http://schemas.microsoft.com/office/drawing/2010/main" xmlns="" w="9525">
+                <a14:hiddenLine xmlns="" xmlns:a14="http://schemas.microsoft.com/office/drawing/2010/main" w="9525">
                   <a:solidFill>
                     <a:srgbClr val="000000"/>
                   </a:solidFill>
@@ -2224,7 +2225,7 @@
             </a:ln>
             <a:extLst>
               <a:ext uri="{91240B29-F687-4f45-9708-019B960494DF}">
-                <a14:hiddenLine xmlns:a14="http://schemas.microsoft.com/office/drawing/2010/main" xmlns="" w="9525">
+                <a14:hiddenLine xmlns="" xmlns:a14="http://schemas.microsoft.com/office/drawing/2010/main" w="9525">
                   <a:solidFill>
                     <a:srgbClr val="000000"/>
                   </a:solidFill>
@@ -2314,7 +2315,7 @@
             </a:ln>
             <a:extLst>
               <a:ext uri="{91240B29-F687-4f45-9708-019B960494DF}">
-                <a14:hiddenLine xmlns:a14="http://schemas.microsoft.com/office/drawing/2010/main" xmlns="" w="9525">
+                <a14:hiddenLine xmlns="" xmlns:a14="http://schemas.microsoft.com/office/drawing/2010/main" w="9525">
                   <a:solidFill>
                     <a:srgbClr val="000000"/>
                   </a:solidFill>
@@ -2348,7 +2349,7 @@
             </a:ln>
             <a:extLst>
               <a:ext uri="{91240B29-F687-4f45-9708-019B960494DF}">
-                <a14:hiddenLine xmlns:a14="http://schemas.microsoft.com/office/drawing/2010/main" xmlns="" w="9525">
+                <a14:hiddenLine xmlns="" xmlns:a14="http://schemas.microsoft.com/office/drawing/2010/main" w="9525">
                   <a:solidFill>
                     <a:srgbClr val="000000"/>
                   </a:solidFill>
@@ -2438,7 +2439,7 @@
             </a:ln>
             <a:extLst>
               <a:ext uri="{91240B29-F687-4f45-9708-019B960494DF}">
-                <a14:hiddenLine xmlns:a14="http://schemas.microsoft.com/office/drawing/2010/main" xmlns="" w="9525">
+                <a14:hiddenLine xmlns="" xmlns:a14="http://schemas.microsoft.com/office/drawing/2010/main" w="9525">
                   <a:solidFill>
                     <a:srgbClr val="000000"/>
                   </a:solidFill>
@@ -2500,7 +2501,7 @@
             </a:ln>
             <a:extLst>
               <a:ext uri="{91240B29-F687-4f45-9708-019B960494DF}">
-                <a14:hiddenLine xmlns:a14="http://schemas.microsoft.com/office/drawing/2010/main" xmlns="" w="9525">
+                <a14:hiddenLine xmlns="" xmlns:a14="http://schemas.microsoft.com/office/drawing/2010/main" w="9525">
                   <a:solidFill>
                     <a:srgbClr val="000000"/>
                   </a:solidFill>
@@ -2562,7 +2563,7 @@
             </a:ln>
             <a:extLst>
               <a:ext uri="{91240B29-F687-4f45-9708-019B960494DF}">
-                <a14:hiddenLine xmlns:a14="http://schemas.microsoft.com/office/drawing/2010/main" xmlns="" w="9525">
+                <a14:hiddenLine xmlns="" xmlns:a14="http://schemas.microsoft.com/office/drawing/2010/main" w="9525">
                   <a:solidFill>
                     <a:srgbClr val="000000"/>
                   </a:solidFill>
@@ -2652,7 +2653,7 @@
             </a:ln>
             <a:extLst>
               <a:ext uri="{91240B29-F687-4f45-9708-019B960494DF}">
-                <a14:hiddenLine xmlns:a14="http://schemas.microsoft.com/office/drawing/2010/main" xmlns="" w="9525">
+                <a14:hiddenLine xmlns="" xmlns:a14="http://schemas.microsoft.com/office/drawing/2010/main" w="9525">
                   <a:solidFill>
                     <a:srgbClr val="000000"/>
                   </a:solidFill>
@@ -2720,7 +2721,7 @@
             </a:ln>
             <a:extLst>
               <a:ext uri="{91240B29-F687-4f45-9708-019B960494DF}">
-                <a14:hiddenLine xmlns:a14="http://schemas.microsoft.com/office/drawing/2010/main" xmlns="" w="9525">
+                <a14:hiddenLine xmlns="" xmlns:a14="http://schemas.microsoft.com/office/drawing/2010/main" w="9525">
                   <a:solidFill>
                     <a:srgbClr val="000000"/>
                   </a:solidFill>
@@ -2782,7 +2783,7 @@
             </a:ln>
             <a:extLst>
               <a:ext uri="{91240B29-F687-4f45-9708-019B960494DF}">
-                <a14:hiddenLine xmlns:a14="http://schemas.microsoft.com/office/drawing/2010/main" xmlns="" w="9525">
+                <a14:hiddenLine xmlns="" xmlns:a14="http://schemas.microsoft.com/office/drawing/2010/main" w="9525">
                   <a:solidFill>
                     <a:srgbClr val="000000"/>
                   </a:solidFill>
@@ -2872,7 +2873,7 @@
             </a:ln>
             <a:extLst>
               <a:ext uri="{91240B29-F687-4f45-9708-019B960494DF}">
-                <a14:hiddenLine xmlns:a14="http://schemas.microsoft.com/office/drawing/2010/main" xmlns="" w="9525">
+                <a14:hiddenLine xmlns="" xmlns:a14="http://schemas.microsoft.com/office/drawing/2010/main" w="9525">
                   <a:solidFill>
                     <a:srgbClr val="000000"/>
                   </a:solidFill>
@@ -2934,7 +2935,7 @@
             </a:ln>
             <a:extLst>
               <a:ext uri="{91240B29-F687-4f45-9708-019B960494DF}">
-                <a14:hiddenLine xmlns:a14="http://schemas.microsoft.com/office/drawing/2010/main" xmlns="" w="9525">
+                <a14:hiddenLine xmlns="" xmlns:a14="http://schemas.microsoft.com/office/drawing/2010/main" w="9525">
                   <a:solidFill>
                     <a:srgbClr val="000000"/>
                   </a:solidFill>
@@ -3024,7 +3025,7 @@
             </a:ln>
             <a:extLst>
               <a:ext uri="{91240B29-F687-4f45-9708-019B960494DF}">
-                <a14:hiddenLine xmlns:a14="http://schemas.microsoft.com/office/drawing/2010/main" xmlns="" w="9525">
+                <a14:hiddenLine xmlns="" xmlns:a14="http://schemas.microsoft.com/office/drawing/2010/main" w="9525">
                   <a:solidFill>
                     <a:srgbClr val="000000"/>
                   </a:solidFill>
@@ -3086,7 +3087,7 @@
             </a:ln>
             <a:extLst>
               <a:ext uri="{91240B29-F687-4f45-9708-019B960494DF}">
-                <a14:hiddenLine xmlns:a14="http://schemas.microsoft.com/office/drawing/2010/main" xmlns="" w="9525">
+                <a14:hiddenLine xmlns="" xmlns:a14="http://schemas.microsoft.com/office/drawing/2010/main" w="9525">
                   <a:solidFill>
                     <a:srgbClr val="000000"/>
                   </a:solidFill>
@@ -3176,7 +3177,7 @@
             </a:ln>
             <a:extLst>
               <a:ext uri="{91240B29-F687-4f45-9708-019B960494DF}">
-                <a14:hiddenLine xmlns:a14="http://schemas.microsoft.com/office/drawing/2010/main" xmlns="" w="9525">
+                <a14:hiddenLine xmlns="" xmlns:a14="http://schemas.microsoft.com/office/drawing/2010/main" w="9525">
                   <a:solidFill>
                     <a:srgbClr val="000000"/>
                   </a:solidFill>
@@ -3210,7 +3211,7 @@
             </a:ln>
             <a:extLst>
               <a:ext uri="{91240B29-F687-4f45-9708-019B960494DF}">
-                <a14:hiddenLine xmlns:a14="http://schemas.microsoft.com/office/drawing/2010/main" xmlns="" w="9525">
+                <a14:hiddenLine xmlns="" xmlns:a14="http://schemas.microsoft.com/office/drawing/2010/main" w="9525">
                   <a:solidFill>
                     <a:srgbClr val="000000"/>
                   </a:solidFill>
@@ -3275,7 +3276,7 @@
             </a:ln>
             <a:extLst>
               <a:ext uri="{91240B29-F687-4f45-9708-019B960494DF}">
-                <a14:hiddenLine xmlns:a14="http://schemas.microsoft.com/office/drawing/2010/main" xmlns="" w="9525">
+                <a14:hiddenLine xmlns="" xmlns:a14="http://schemas.microsoft.com/office/drawing/2010/main" w="9525">
                   <a:solidFill>
                     <a:srgbClr val="000000"/>
                   </a:solidFill>
@@ -3365,7 +3366,7 @@
             </a:ln>
             <a:extLst>
               <a:ext uri="{91240B29-F687-4f45-9708-019B960494DF}">
-                <a14:hiddenLine xmlns:a14="http://schemas.microsoft.com/office/drawing/2010/main" xmlns="" w="9525">
+                <a14:hiddenLine xmlns="" xmlns:a14="http://schemas.microsoft.com/office/drawing/2010/main" w="9525">
                   <a:solidFill>
                     <a:srgbClr val="000000"/>
                   </a:solidFill>
@@ -3427,7 +3428,7 @@
             </a:ln>
             <a:extLst>
               <a:ext uri="{91240B29-F687-4f45-9708-019B960494DF}">
-                <a14:hiddenLine xmlns:a14="http://schemas.microsoft.com/office/drawing/2010/main" xmlns="" w="9525">
+                <a14:hiddenLine xmlns="" xmlns:a14="http://schemas.microsoft.com/office/drawing/2010/main" w="9525">
                   <a:solidFill>
                     <a:srgbClr val="000000"/>
                   </a:solidFill>
@@ -3517,7 +3518,7 @@
             </a:ln>
             <a:extLst>
               <a:ext uri="{91240B29-F687-4f45-9708-019B960494DF}">
-                <a14:hiddenLine xmlns:a14="http://schemas.microsoft.com/office/drawing/2010/main" xmlns="" w="9525">
+                <a14:hiddenLine xmlns="" xmlns:a14="http://schemas.microsoft.com/office/drawing/2010/main" w="9525">
                   <a:solidFill>
                     <a:srgbClr val="000000"/>
                   </a:solidFill>
@@ -3607,7 +3608,7 @@
             </a:ln>
             <a:extLst>
               <a:ext uri="{91240B29-F687-4f45-9708-019B960494DF}">
-                <a14:hiddenLine xmlns:a14="http://schemas.microsoft.com/office/drawing/2010/main" xmlns="" w="9525">
+                <a14:hiddenLine xmlns="" xmlns:a14="http://schemas.microsoft.com/office/drawing/2010/main" w="9525">
                   <a:solidFill>
                     <a:srgbClr val="000000"/>
                   </a:solidFill>
@@ -3672,7 +3673,7 @@
             </a:ln>
             <a:extLst>
               <a:ext uri="{91240B29-F687-4f45-9708-019B960494DF}">
-                <a14:hiddenLine xmlns:a14="http://schemas.microsoft.com/office/drawing/2010/main" xmlns="" w="9525">
+                <a14:hiddenLine xmlns="" xmlns:a14="http://schemas.microsoft.com/office/drawing/2010/main" w="9525">
                   <a:solidFill>
                     <a:srgbClr val="000000"/>
                   </a:solidFill>
@@ -3734,7 +3735,7 @@
             </a:ln>
             <a:extLst>
               <a:ext uri="{91240B29-F687-4f45-9708-019B960494DF}">
-                <a14:hiddenLine xmlns:a14="http://schemas.microsoft.com/office/drawing/2010/main" xmlns="" w="9525">
+                <a14:hiddenLine xmlns="" xmlns:a14="http://schemas.microsoft.com/office/drawing/2010/main" w="9525">
                   <a:solidFill>
                     <a:srgbClr val="000000"/>
                   </a:solidFill>
@@ -3824,7 +3825,7 @@
             </a:ln>
             <a:extLst>
               <a:ext uri="{91240B29-F687-4f45-9708-019B960494DF}">
-                <a14:hiddenLine xmlns:a14="http://schemas.microsoft.com/office/drawing/2010/main" xmlns="" w="9525">
+                <a14:hiddenLine xmlns="" xmlns:a14="http://schemas.microsoft.com/office/drawing/2010/main" w="9525">
                   <a:solidFill>
                     <a:srgbClr val="000000"/>
                   </a:solidFill>
@@ -3914,7 +3915,7 @@
             </a:ln>
             <a:extLst>
               <a:ext uri="{91240B29-F687-4f45-9708-019B960494DF}">
-                <a14:hiddenLine xmlns:a14="http://schemas.microsoft.com/office/drawing/2010/main" xmlns="" w="9525">
+                <a14:hiddenLine xmlns="" xmlns:a14="http://schemas.microsoft.com/office/drawing/2010/main" w="9525">
                   <a:solidFill>
                     <a:srgbClr val="000000"/>
                   </a:solidFill>
@@ -3976,7 +3977,7 @@
             </a:ln>
             <a:extLst>
               <a:ext uri="{91240B29-F687-4f45-9708-019B960494DF}">
-                <a14:hiddenLine xmlns:a14="http://schemas.microsoft.com/office/drawing/2010/main" xmlns="" w="9525">
+                <a14:hiddenLine xmlns="" xmlns:a14="http://schemas.microsoft.com/office/drawing/2010/main" w="9525">
                   <a:solidFill>
                     <a:srgbClr val="000000"/>
                   </a:solidFill>
@@ -4096,7 +4097,7 @@
             </a:ln>
             <a:extLst>
               <a:ext uri="{91240B29-F687-4f45-9708-019B960494DF}">
-                <a14:hiddenLine xmlns:a14="http://schemas.microsoft.com/office/drawing/2010/main" xmlns="" w="9525">
+                <a14:hiddenLine xmlns="" xmlns:a14="http://schemas.microsoft.com/office/drawing/2010/main" w="9525">
                   <a:solidFill>
                     <a:srgbClr val="000000"/>
                   </a:solidFill>
@@ -4164,7 +4165,7 @@
             </a:ln>
             <a:extLst>
               <a:ext uri="{91240B29-F687-4f45-9708-019B960494DF}">
-                <a14:hiddenLine xmlns:a14="http://schemas.microsoft.com/office/drawing/2010/main" xmlns="" w="9525">
+                <a14:hiddenLine xmlns="" xmlns:a14="http://schemas.microsoft.com/office/drawing/2010/main" w="9525">
                   <a:solidFill>
                     <a:srgbClr val="000000"/>
                   </a:solidFill>
@@ -4254,7 +4255,7 @@
             </a:ln>
             <a:extLst>
               <a:ext uri="{91240B29-F687-4f45-9708-019B960494DF}">
-                <a14:hiddenLine xmlns:a14="http://schemas.microsoft.com/office/drawing/2010/main" xmlns="" w="9525">
+                <a14:hiddenLine xmlns="" xmlns:a14="http://schemas.microsoft.com/office/drawing/2010/main" w="9525">
                   <a:solidFill>
                     <a:srgbClr val="000000"/>
                   </a:solidFill>
@@ -4394,7 +4395,7 @@
           <a:p>
             <a:fld id="{B9BA6063-779C-4BB6-8BC7-C5993206073F}" type="datetimeFigureOut">
               <a:rPr lang="sr-Latn-CS" smtClean="0"/>
-              <a:t>13.10.2017.</a:t>
+              <a:t>10.11.2017.</a:t>
             </a:fld>
             <a:endParaRPr lang="sr-Latn-CS"/>
           </a:p>
@@ -4661,7 +4662,7 @@
           <a:p>
             <a:fld id="{B9BA6063-779C-4BB6-8BC7-C5993206073F}" type="datetimeFigureOut">
               <a:rPr lang="sr-Latn-CS" smtClean="0"/>
-              <a:t>13.10.2017.</a:t>
+              <a:t>10.11.2017.</a:t>
             </a:fld>
             <a:endParaRPr lang="sr-Latn-CS"/>
           </a:p>
@@ -4857,7 +4858,7 @@
           <a:p>
             <a:fld id="{B9BA6063-779C-4BB6-8BC7-C5993206073F}" type="datetimeFigureOut">
               <a:rPr lang="sr-Latn-CS" smtClean="0"/>
-              <a:t>13.10.2017.</a:t>
+              <a:t>10.11.2017.</a:t>
             </a:fld>
             <a:endParaRPr lang="sr-Latn-CS"/>
           </a:p>
@@ -5120,7 +5121,7 @@
           <a:p>
             <a:fld id="{B9BA6063-779C-4BB6-8BC7-C5993206073F}" type="datetimeFigureOut">
               <a:rPr lang="sr-Latn-CS" smtClean="0"/>
-              <a:t>13.10.2017.</a:t>
+              <a:t>10.11.2017.</a:t>
             </a:fld>
             <a:endParaRPr lang="sr-Latn-CS"/>
           </a:p>
@@ -5554,7 +5555,7 @@
           <a:p>
             <a:fld id="{B9BA6063-779C-4BB6-8BC7-C5993206073F}" type="datetimeFigureOut">
               <a:rPr lang="sr-Latn-CS" smtClean="0"/>
-              <a:t>13.10.2017.</a:t>
+              <a:t>10.11.2017.</a:t>
             </a:fld>
             <a:endParaRPr lang="sr-Latn-CS"/>
           </a:p>
@@ -6100,7 +6101,7 @@
           <a:p>
             <a:fld id="{B9BA6063-779C-4BB6-8BC7-C5993206073F}" type="datetimeFigureOut">
               <a:rPr lang="sr-Latn-CS" smtClean="0"/>
-              <a:t>13.10.2017.</a:t>
+              <a:t>10.11.2017.</a:t>
             </a:fld>
             <a:endParaRPr lang="sr-Latn-CS"/>
           </a:p>
@@ -6820,7 +6821,7 @@
           <a:p>
             <a:fld id="{B9BA6063-779C-4BB6-8BC7-C5993206073F}" type="datetimeFigureOut">
               <a:rPr lang="sr-Latn-CS" smtClean="0"/>
-              <a:t>13.10.2017.</a:t>
+              <a:t>10.11.2017.</a:t>
             </a:fld>
             <a:endParaRPr lang="sr-Latn-CS"/>
           </a:p>
@@ -6990,7 +6991,7 @@
           <a:p>
             <a:fld id="{B9BA6063-779C-4BB6-8BC7-C5993206073F}" type="datetimeFigureOut">
               <a:rPr lang="sr-Latn-CS" smtClean="0"/>
-              <a:t>13.10.2017.</a:t>
+              <a:t>10.11.2017.</a:t>
             </a:fld>
             <a:endParaRPr lang="sr-Latn-CS"/>
           </a:p>
@@ -7170,7 +7171,7 @@
           <a:p>
             <a:fld id="{B9BA6063-779C-4BB6-8BC7-C5993206073F}" type="datetimeFigureOut">
               <a:rPr lang="sr-Latn-CS" smtClean="0"/>
-              <a:t>13.10.2017.</a:t>
+              <a:t>10.11.2017.</a:t>
             </a:fld>
             <a:endParaRPr lang="sr-Latn-CS"/>
           </a:p>
@@ -7340,7 +7341,7 @@
           <a:p>
             <a:fld id="{B9BA6063-779C-4BB6-8BC7-C5993206073F}" type="datetimeFigureOut">
               <a:rPr lang="sr-Latn-CS" smtClean="0"/>
-              <a:t>13.10.2017.</a:t>
+              <a:t>10.11.2017.</a:t>
             </a:fld>
             <a:endParaRPr lang="sr-Latn-CS"/>
           </a:p>
@@ -7590,7 +7591,7 @@
           <a:p>
             <a:fld id="{B9BA6063-779C-4BB6-8BC7-C5993206073F}" type="datetimeFigureOut">
               <a:rPr lang="sr-Latn-CS" smtClean="0"/>
-              <a:t>13.10.2017.</a:t>
+              <a:t>10.11.2017.</a:t>
             </a:fld>
             <a:endParaRPr lang="sr-Latn-CS"/>
           </a:p>
@@ -7822,7 +7823,7 @@
           <a:p>
             <a:fld id="{B9BA6063-779C-4BB6-8BC7-C5993206073F}" type="datetimeFigureOut">
               <a:rPr lang="sr-Latn-CS" smtClean="0"/>
-              <a:t>13.10.2017.</a:t>
+              <a:t>10.11.2017.</a:t>
             </a:fld>
             <a:endParaRPr lang="sr-Latn-CS"/>
           </a:p>
@@ -8203,7 +8204,7 @@
           <a:p>
             <a:fld id="{B9BA6063-779C-4BB6-8BC7-C5993206073F}" type="datetimeFigureOut">
               <a:rPr lang="sr-Latn-CS" smtClean="0"/>
-              <a:t>13.10.2017.</a:t>
+              <a:t>10.11.2017.</a:t>
             </a:fld>
             <a:endParaRPr lang="sr-Latn-CS"/>
           </a:p>
@@ -8321,7 +8322,7 @@
           <a:p>
             <a:fld id="{B9BA6063-779C-4BB6-8BC7-C5993206073F}" type="datetimeFigureOut">
               <a:rPr lang="sr-Latn-CS" smtClean="0"/>
-              <a:t>13.10.2017.</a:t>
+              <a:t>10.11.2017.</a:t>
             </a:fld>
             <a:endParaRPr lang="sr-Latn-CS"/>
           </a:p>
@@ -8416,7 +8417,7 @@
           <a:p>
             <a:fld id="{B9BA6063-779C-4BB6-8BC7-C5993206073F}" type="datetimeFigureOut">
               <a:rPr lang="sr-Latn-CS" smtClean="0"/>
-              <a:t>13.10.2017.</a:t>
+              <a:t>10.11.2017.</a:t>
             </a:fld>
             <a:endParaRPr lang="sr-Latn-CS"/>
           </a:p>
@@ -8665,7 +8666,7 @@
           <a:p>
             <a:fld id="{B9BA6063-779C-4BB6-8BC7-C5993206073F}" type="datetimeFigureOut">
               <a:rPr lang="sr-Latn-CS" smtClean="0"/>
-              <a:t>13.10.2017.</a:t>
+              <a:t>10.11.2017.</a:t>
             </a:fld>
             <a:endParaRPr lang="sr-Latn-CS"/>
           </a:p>
@@ -8945,7 +8946,7 @@
           <a:p>
             <a:fld id="{B9BA6063-779C-4BB6-8BC7-C5993206073F}" type="datetimeFigureOut">
               <a:rPr lang="sr-Latn-CS" smtClean="0"/>
-              <a:t>13.10.2017.</a:t>
+              <a:t>10.11.2017.</a:t>
             </a:fld>
             <a:endParaRPr lang="sr-Latn-CS"/>
           </a:p>
@@ -9061,7 +9062,7 @@
           <a:noFill/>
           <a:extLst>
             <a:ext uri="{909E8E84-426E-40dd-AFC4-6F175D3DCCD1}">
-              <a14:hiddenFill xmlns:a14="http://schemas.microsoft.com/office/drawing/2010/main" xmlns="">
+              <a14:hiddenFill xmlns="" xmlns:a14="http://schemas.microsoft.com/office/drawing/2010/main">
                 <a:solidFill>
                   <a:srgbClr val="FFFFFF"/>
                 </a:solidFill>
@@ -9135,7 +9136,7 @@
               </a:ln>
               <a:extLst>
                 <a:ext uri="{91240B29-F687-4f45-9708-019B960494DF}">
-                  <a14:hiddenLine xmlns:a14="http://schemas.microsoft.com/office/drawing/2010/main" xmlns="" w="9525">
+                  <a14:hiddenLine xmlns="" xmlns:a14="http://schemas.microsoft.com/office/drawing/2010/main" w="9525">
                     <a:solidFill>
                       <a:srgbClr val="000000"/>
                     </a:solidFill>
@@ -9225,7 +9226,7 @@
               </a:ln>
               <a:extLst>
                 <a:ext uri="{91240B29-F687-4f45-9708-019B960494DF}">
-                  <a14:hiddenLine xmlns:a14="http://schemas.microsoft.com/office/drawing/2010/main" xmlns="" w="9525">
+                  <a14:hiddenLine xmlns="" xmlns:a14="http://schemas.microsoft.com/office/drawing/2010/main" w="9525">
                     <a:solidFill>
                       <a:srgbClr val="000000"/>
                     </a:solidFill>
@@ -9315,7 +9316,7 @@
               </a:ln>
               <a:extLst>
                 <a:ext uri="{91240B29-F687-4f45-9708-019B960494DF}">
-                  <a14:hiddenLine xmlns:a14="http://schemas.microsoft.com/office/drawing/2010/main" xmlns="" w="9525">
+                  <a14:hiddenLine xmlns="" xmlns:a14="http://schemas.microsoft.com/office/drawing/2010/main" w="9525">
                     <a:solidFill>
                       <a:srgbClr val="000000"/>
                     </a:solidFill>
@@ -9377,7 +9378,7 @@
               </a:ln>
               <a:extLst>
                 <a:ext uri="{91240B29-F687-4f45-9708-019B960494DF}">
-                  <a14:hiddenLine xmlns:a14="http://schemas.microsoft.com/office/drawing/2010/main" xmlns="" w="9525">
+                  <a14:hiddenLine xmlns="" xmlns:a14="http://schemas.microsoft.com/office/drawing/2010/main" w="9525">
                     <a:solidFill>
                       <a:srgbClr val="000000"/>
                     </a:solidFill>
@@ -9467,7 +9468,7 @@
               </a:ln>
               <a:extLst>
                 <a:ext uri="{91240B29-F687-4f45-9708-019B960494DF}">
-                  <a14:hiddenLine xmlns:a14="http://schemas.microsoft.com/office/drawing/2010/main" xmlns="" w="9525">
+                  <a14:hiddenLine xmlns="" xmlns:a14="http://schemas.microsoft.com/office/drawing/2010/main" w="9525">
                     <a:solidFill>
                       <a:srgbClr val="000000"/>
                     </a:solidFill>
@@ -9529,7 +9530,7 @@
               </a:ln>
               <a:extLst>
                 <a:ext uri="{91240B29-F687-4f45-9708-019B960494DF}">
-                  <a14:hiddenLine xmlns:a14="http://schemas.microsoft.com/office/drawing/2010/main" xmlns="" w="9525">
+                  <a14:hiddenLine xmlns="" xmlns:a14="http://schemas.microsoft.com/office/drawing/2010/main" w="9525">
                     <a:solidFill>
                       <a:srgbClr val="000000"/>
                     </a:solidFill>
@@ -9591,7 +9592,7 @@
               </a:ln>
               <a:extLst>
                 <a:ext uri="{91240B29-F687-4f45-9708-019B960494DF}">
-                  <a14:hiddenLine xmlns:a14="http://schemas.microsoft.com/office/drawing/2010/main" xmlns="" w="9525">
+                  <a14:hiddenLine xmlns="" xmlns:a14="http://schemas.microsoft.com/office/drawing/2010/main" w="9525">
                     <a:solidFill>
                       <a:srgbClr val="000000"/>
                     </a:solidFill>
@@ -9681,7 +9682,7 @@
               </a:ln>
               <a:extLst>
                 <a:ext uri="{91240B29-F687-4f45-9708-019B960494DF}">
-                  <a14:hiddenLine xmlns:a14="http://schemas.microsoft.com/office/drawing/2010/main" xmlns="" w="9525">
+                  <a14:hiddenLine xmlns="" xmlns:a14="http://schemas.microsoft.com/office/drawing/2010/main" w="9525">
                     <a:solidFill>
                       <a:srgbClr val="000000"/>
                     </a:solidFill>
@@ -9771,7 +9772,7 @@
               </a:ln>
               <a:extLst>
                 <a:ext uri="{91240B29-F687-4f45-9708-019B960494DF}">
-                  <a14:hiddenLine xmlns:a14="http://schemas.microsoft.com/office/drawing/2010/main" xmlns="" w="9525">
+                  <a14:hiddenLine xmlns="" xmlns:a14="http://schemas.microsoft.com/office/drawing/2010/main" w="9525">
                     <a:solidFill>
                       <a:srgbClr val="000000"/>
                     </a:solidFill>
@@ -9833,7 +9834,7 @@
               </a:ln>
               <a:extLst>
                 <a:ext uri="{91240B29-F687-4f45-9708-019B960494DF}">
-                  <a14:hiddenLine xmlns:a14="http://schemas.microsoft.com/office/drawing/2010/main" xmlns="" w="9525">
+                  <a14:hiddenLine xmlns="" xmlns:a14="http://schemas.microsoft.com/office/drawing/2010/main" w="9525">
                     <a:solidFill>
                       <a:srgbClr val="000000"/>
                     </a:solidFill>
@@ -9943,7 +9944,7 @@
               </a:ln>
               <a:extLst>
                 <a:ext uri="{91240B29-F687-4f45-9708-019B960494DF}">
-                  <a14:hiddenLine xmlns:a14="http://schemas.microsoft.com/office/drawing/2010/main" xmlns="" w="9525">
+                  <a14:hiddenLine xmlns="" xmlns:a14="http://schemas.microsoft.com/office/drawing/2010/main" w="9525">
                     <a:solidFill>
                       <a:srgbClr val="000000"/>
                     </a:solidFill>
@@ -10027,7 +10028,7 @@
               </a:ln>
               <a:extLst>
                 <a:ext uri="{91240B29-F687-4f45-9708-019B960494DF}">
-                  <a14:hiddenLine xmlns:a14="http://schemas.microsoft.com/office/drawing/2010/main" xmlns="" w="9525">
+                  <a14:hiddenLine xmlns="" xmlns:a14="http://schemas.microsoft.com/office/drawing/2010/main" w="9525">
                     <a:solidFill>
                       <a:srgbClr val="000000"/>
                     </a:solidFill>
@@ -10089,7 +10090,7 @@
               </a:ln>
               <a:extLst>
                 <a:ext uri="{91240B29-F687-4f45-9708-019B960494DF}">
-                  <a14:hiddenLine xmlns:a14="http://schemas.microsoft.com/office/drawing/2010/main" xmlns="" w="9525">
+                  <a14:hiddenLine xmlns="" xmlns:a14="http://schemas.microsoft.com/office/drawing/2010/main" w="9525">
                     <a:solidFill>
                       <a:srgbClr val="000000"/>
                     </a:solidFill>
@@ -10151,7 +10152,7 @@
               </a:ln>
               <a:extLst>
                 <a:ext uri="{91240B29-F687-4f45-9708-019B960494DF}">
-                  <a14:hiddenLine xmlns:a14="http://schemas.microsoft.com/office/drawing/2010/main" xmlns="" w="9525">
+                  <a14:hiddenLine xmlns="" xmlns:a14="http://schemas.microsoft.com/office/drawing/2010/main" w="9525">
                     <a:solidFill>
                       <a:srgbClr val="000000"/>
                     </a:solidFill>
@@ -10241,7 +10242,7 @@
               </a:ln>
               <a:extLst>
                 <a:ext uri="{91240B29-F687-4f45-9708-019B960494DF}">
-                  <a14:hiddenLine xmlns:a14="http://schemas.microsoft.com/office/drawing/2010/main" xmlns="" w="9525">
+                  <a14:hiddenLine xmlns="" xmlns:a14="http://schemas.microsoft.com/office/drawing/2010/main" w="9525">
                     <a:solidFill>
                       <a:srgbClr val="000000"/>
                     </a:solidFill>
@@ -10275,7 +10276,7 @@
               </a:ln>
               <a:extLst>
                 <a:ext uri="{91240B29-F687-4f45-9708-019B960494DF}">
-                  <a14:hiddenLine xmlns:a14="http://schemas.microsoft.com/office/drawing/2010/main" xmlns="" w="9525">
+                  <a14:hiddenLine xmlns="" xmlns:a14="http://schemas.microsoft.com/office/drawing/2010/main" w="9525">
                     <a:solidFill>
                       <a:srgbClr val="000000"/>
                     </a:solidFill>
@@ -10340,7 +10341,7 @@
               </a:ln>
               <a:extLst>
                 <a:ext uri="{91240B29-F687-4f45-9708-019B960494DF}">
-                  <a14:hiddenLine xmlns:a14="http://schemas.microsoft.com/office/drawing/2010/main" xmlns="" w="9525">
+                  <a14:hiddenLine xmlns="" xmlns:a14="http://schemas.microsoft.com/office/drawing/2010/main" w="9525">
                     <a:solidFill>
                       <a:srgbClr val="000000"/>
                     </a:solidFill>
@@ -10430,7 +10431,7 @@
               </a:ln>
               <a:extLst>
                 <a:ext uri="{91240B29-F687-4f45-9708-019B960494DF}">
-                  <a14:hiddenLine xmlns:a14="http://schemas.microsoft.com/office/drawing/2010/main" xmlns="" w="9525">
+                  <a14:hiddenLine xmlns="" xmlns:a14="http://schemas.microsoft.com/office/drawing/2010/main" w="9525">
                     <a:solidFill>
                       <a:srgbClr val="000000"/>
                     </a:solidFill>
@@ -10492,7 +10493,7 @@
               </a:ln>
               <a:extLst>
                 <a:ext uri="{91240B29-F687-4f45-9708-019B960494DF}">
-                  <a14:hiddenLine xmlns:a14="http://schemas.microsoft.com/office/drawing/2010/main" xmlns="" w="9525">
+                  <a14:hiddenLine xmlns="" xmlns:a14="http://schemas.microsoft.com/office/drawing/2010/main" w="9525">
                     <a:solidFill>
                       <a:srgbClr val="000000"/>
                     </a:solidFill>
@@ -10582,7 +10583,7 @@
               </a:ln>
               <a:extLst>
                 <a:ext uri="{91240B29-F687-4f45-9708-019B960494DF}">
-                  <a14:hiddenLine xmlns:a14="http://schemas.microsoft.com/office/drawing/2010/main" xmlns="" w="9525">
+                  <a14:hiddenLine xmlns="" xmlns:a14="http://schemas.microsoft.com/office/drawing/2010/main" w="9525">
                     <a:solidFill>
                       <a:srgbClr val="000000"/>
                     </a:solidFill>
@@ -10647,7 +10648,7 @@
               </a:ln>
               <a:extLst>
                 <a:ext uri="{91240B29-F687-4f45-9708-019B960494DF}">
-                  <a14:hiddenLine xmlns:a14="http://schemas.microsoft.com/office/drawing/2010/main" xmlns="" w="9525">
+                  <a14:hiddenLine xmlns="" xmlns:a14="http://schemas.microsoft.com/office/drawing/2010/main" w="9525">
                     <a:solidFill>
                       <a:srgbClr val="000000"/>
                     </a:solidFill>
@@ -10709,7 +10710,7 @@
               </a:ln>
               <a:extLst>
                 <a:ext uri="{91240B29-F687-4f45-9708-019B960494DF}">
-                  <a14:hiddenLine xmlns:a14="http://schemas.microsoft.com/office/drawing/2010/main" xmlns="" w="9525">
+                  <a14:hiddenLine xmlns="" xmlns:a14="http://schemas.microsoft.com/office/drawing/2010/main" w="9525">
                     <a:solidFill>
                       <a:srgbClr val="000000"/>
                     </a:solidFill>
@@ -10799,7 +10800,7 @@
               </a:ln>
               <a:extLst>
                 <a:ext uri="{91240B29-F687-4f45-9708-019B960494DF}">
-                  <a14:hiddenLine xmlns:a14="http://schemas.microsoft.com/office/drawing/2010/main" xmlns="" w="9525">
+                  <a14:hiddenLine xmlns="" xmlns:a14="http://schemas.microsoft.com/office/drawing/2010/main" w="9525">
                     <a:solidFill>
                       <a:srgbClr val="000000"/>
                     </a:solidFill>
@@ -10889,7 +10890,7 @@
               </a:ln>
               <a:extLst>
                 <a:ext uri="{91240B29-F687-4f45-9708-019B960494DF}">
-                  <a14:hiddenLine xmlns:a14="http://schemas.microsoft.com/office/drawing/2010/main" xmlns="" w="9525">
+                  <a14:hiddenLine xmlns="" xmlns:a14="http://schemas.microsoft.com/office/drawing/2010/main" w="9525">
                     <a:solidFill>
                       <a:srgbClr val="000000"/>
                     </a:solidFill>
@@ -10954,7 +10955,7 @@
               </a:ln>
               <a:extLst>
                 <a:ext uri="{91240B29-F687-4f45-9708-019B960494DF}">
-                  <a14:hiddenLine xmlns:a14="http://schemas.microsoft.com/office/drawing/2010/main" xmlns="" w="9525">
+                  <a14:hiddenLine xmlns="" xmlns:a14="http://schemas.microsoft.com/office/drawing/2010/main" w="9525">
                     <a:solidFill>
                       <a:srgbClr val="000000"/>
                     </a:solidFill>
@@ -11074,7 +11075,7 @@
               </a:ln>
               <a:extLst>
                 <a:ext uri="{91240B29-F687-4f45-9708-019B960494DF}">
-                  <a14:hiddenLine xmlns:a14="http://schemas.microsoft.com/office/drawing/2010/main" xmlns="" w="9525">
+                  <a14:hiddenLine xmlns="" xmlns:a14="http://schemas.microsoft.com/office/drawing/2010/main" w="9525">
                     <a:solidFill>
                       <a:srgbClr val="000000"/>
                     </a:solidFill>
@@ -11172,7 +11173,7 @@
               </a:ln>
               <a:extLst>
                 <a:ext uri="{91240B29-F687-4f45-9708-019B960494DF}">
-                  <a14:hiddenLine xmlns:a14="http://schemas.microsoft.com/office/drawing/2010/main" xmlns="" w="9525">
+                  <a14:hiddenLine xmlns="" xmlns:a14="http://schemas.microsoft.com/office/drawing/2010/main" w="9525">
                     <a:solidFill>
                       <a:srgbClr val="000000"/>
                     </a:solidFill>
@@ -11287,7 +11288,7 @@
               </a:ln>
               <a:extLst>
                 <a:ext uri="{91240B29-F687-4f45-9708-019B960494DF}">
-                  <a14:hiddenLine xmlns:a14="http://schemas.microsoft.com/office/drawing/2010/main" xmlns="" w="9525">
+                  <a14:hiddenLine xmlns="" xmlns:a14="http://schemas.microsoft.com/office/drawing/2010/main" w="9525">
                     <a:solidFill>
                       <a:srgbClr val="000000"/>
                     </a:solidFill>
@@ -11377,7 +11378,7 @@
               </a:ln>
               <a:extLst>
                 <a:ext uri="{91240B29-F687-4f45-9708-019B960494DF}">
-                  <a14:hiddenLine xmlns:a14="http://schemas.microsoft.com/office/drawing/2010/main" xmlns="" w="9525">
+                  <a14:hiddenLine xmlns="" xmlns:a14="http://schemas.microsoft.com/office/drawing/2010/main" w="9525">
                     <a:solidFill>
                       <a:srgbClr val="000000"/>
                     </a:solidFill>
@@ -11442,7 +11443,7 @@
               </a:ln>
               <a:extLst>
                 <a:ext uri="{91240B29-F687-4f45-9708-019B960494DF}">
-                  <a14:hiddenLine xmlns:a14="http://schemas.microsoft.com/office/drawing/2010/main" xmlns="" w="9525">
+                  <a14:hiddenLine xmlns="" xmlns:a14="http://schemas.microsoft.com/office/drawing/2010/main" w="9525">
                     <a:solidFill>
                       <a:srgbClr val="000000"/>
                     </a:solidFill>
@@ -11532,7 +11533,7 @@
               </a:ln>
               <a:extLst>
                 <a:ext uri="{91240B29-F687-4f45-9708-019B960494DF}">
-                  <a14:hiddenLine xmlns:a14="http://schemas.microsoft.com/office/drawing/2010/main" xmlns="" w="9525">
+                  <a14:hiddenLine xmlns="" xmlns:a14="http://schemas.microsoft.com/office/drawing/2010/main" w="9525">
                     <a:solidFill>
                       <a:srgbClr val="000000"/>
                     </a:solidFill>
@@ -11600,7 +11601,7 @@
               </a:ln>
               <a:extLst>
                 <a:ext uri="{91240B29-F687-4f45-9708-019B960494DF}">
-                  <a14:hiddenLine xmlns:a14="http://schemas.microsoft.com/office/drawing/2010/main" xmlns="" w="9525">
+                  <a14:hiddenLine xmlns="" xmlns:a14="http://schemas.microsoft.com/office/drawing/2010/main" w="9525">
                     <a:solidFill>
                       <a:srgbClr val="000000"/>
                     </a:solidFill>
@@ -11690,7 +11691,7 @@
               </a:ln>
               <a:extLst>
                 <a:ext uri="{91240B29-F687-4f45-9708-019B960494DF}">
-                  <a14:hiddenLine xmlns:a14="http://schemas.microsoft.com/office/drawing/2010/main" xmlns="" w="9525">
+                  <a14:hiddenLine xmlns="" xmlns:a14="http://schemas.microsoft.com/office/drawing/2010/main" w="9525">
                     <a:solidFill>
                       <a:srgbClr val="000000"/>
                     </a:solidFill>
@@ -11758,7 +11759,7 @@
               </a:ln>
               <a:extLst>
                 <a:ext uri="{91240B29-F687-4f45-9708-019B960494DF}">
-                  <a14:hiddenLine xmlns:a14="http://schemas.microsoft.com/office/drawing/2010/main" xmlns="" w="9525">
+                  <a14:hiddenLine xmlns="" xmlns:a14="http://schemas.microsoft.com/office/drawing/2010/main" w="9525">
                     <a:solidFill>
                       <a:srgbClr val="000000"/>
                     </a:solidFill>
@@ -11848,7 +11849,7 @@
               </a:ln>
               <a:extLst>
                 <a:ext uri="{91240B29-F687-4f45-9708-019B960494DF}">
-                  <a14:hiddenLine xmlns:a14="http://schemas.microsoft.com/office/drawing/2010/main" xmlns="" w="9525">
+                  <a14:hiddenLine xmlns="" xmlns:a14="http://schemas.microsoft.com/office/drawing/2010/main" w="9525">
                     <a:solidFill>
                       <a:srgbClr val="000000"/>
                     </a:solidFill>
@@ -11882,7 +11883,7 @@
               </a:ln>
               <a:extLst>
                 <a:ext uri="{91240B29-F687-4f45-9708-019B960494DF}">
-                  <a14:hiddenLine xmlns:a14="http://schemas.microsoft.com/office/drawing/2010/main" xmlns="" w="9525">
+                  <a14:hiddenLine xmlns="" xmlns:a14="http://schemas.microsoft.com/office/drawing/2010/main" w="9525">
                     <a:solidFill>
                       <a:srgbClr val="000000"/>
                     </a:solidFill>
@@ -12022,7 +12023,7 @@
           <a:p>
             <a:fld id="{B9BA6063-779C-4BB6-8BC7-C5993206073F}" type="datetimeFigureOut">
               <a:rPr lang="sr-Latn-CS" smtClean="0"/>
-              <a:t>13.10.2017.</a:t>
+              <a:t>10.11.2017.</a:t>
             </a:fld>
             <a:endParaRPr lang="sr-Latn-CS"/>
           </a:p>
@@ -12575,8 +12576,21 @@
           <a:p>
             <a:r>
               <a:rPr lang="en-US" dirty="0" smtClean="0"/>
-              <a:t>Goal is to understand security flaws through practical examples</a:t>
-            </a:r>
+              <a:t>Goal is to understand security flaws through practical </a:t>
+            </a:r>
+            <a:r>
+              <a:rPr lang="en-US" dirty="0" smtClean="0"/>
+              <a:t>examples </a:t>
+            </a:r>
+            <a:r>
+              <a:rPr lang="en-US" b="1" dirty="0" smtClean="0"/>
+              <a:t>in context of</a:t>
+            </a:r>
+            <a:r>
+              <a:rPr lang="en-US" dirty="0" smtClean="0"/>
+              <a:t> the latest technologies</a:t>
+            </a:r>
+            <a:endParaRPr lang="en-US" dirty="0" smtClean="0"/>
           </a:p>
           <a:p>
             <a:r>
@@ -12690,8 +12704,29 @@
           <a:p>
             <a:r>
               <a:rPr lang="en-US" dirty="0" smtClean="0"/>
-              <a:t>Every topic is in separate folder</a:t>
-            </a:r>
+              <a:t>Every topic is </a:t>
+            </a:r>
+            <a:r>
+              <a:rPr lang="en-US" dirty="0" smtClean="0"/>
+              <a:t>in a </a:t>
+            </a:r>
+            <a:r>
+              <a:rPr lang="en-US" dirty="0" smtClean="0"/>
+              <a:t>separate </a:t>
+            </a:r>
+            <a:r>
+              <a:rPr lang="en-US" dirty="0" smtClean="0"/>
+              <a:t>folder </a:t>
+            </a:r>
+            <a:r>
+              <a:rPr lang="en-US" dirty="0"/>
+              <a:t>(example </a:t>
+            </a:r>
+            <a:r>
+              <a:rPr lang="en-US" dirty="0" smtClean="0"/>
+              <a:t>A1-Injection)</a:t>
+            </a:r>
+            <a:endParaRPr lang="en-US" dirty="0" smtClean="0"/>
           </a:p>
           <a:p>
             <a:r>
@@ -12705,29 +12740,26 @@
           </a:p>
           <a:p>
             <a:r>
+              <a:rPr lang="en-US" b="1" dirty="0" smtClean="0"/>
+              <a:t>Solutions</a:t>
+            </a:r>
+            <a:r>
               <a:rPr lang="en-US" dirty="0" smtClean="0"/>
-              <a:t>Solutions for each task is in separate </a:t>
-            </a:r>
-            <a:r>
-              <a:rPr lang="en-US" smtClean="0"/>
-              <a:t>branch </a:t>
-            </a:r>
-            <a:r>
-              <a:rPr lang="en-US" b="1" smtClean="0"/>
-              <a:t>security</a:t>
+              <a:t> for </a:t>
+            </a:r>
+            <a:r>
+              <a:rPr lang="en-US" dirty="0" smtClean="0"/>
+              <a:t>all tasks are in a </a:t>
+            </a:r>
+            <a:r>
+              <a:rPr lang="en-US" dirty="0" smtClean="0"/>
+              <a:t>separate branch </a:t>
             </a:r>
             <a:r>
               <a:rPr lang="en-US" b="1" dirty="0" smtClean="0"/>
-              <a:t>/[flaw </a:t>
-            </a:r>
-            <a:r>
-              <a:rPr lang="en-US" b="1" dirty="0"/>
-              <a:t>name]_</a:t>
-            </a:r>
-            <a:r>
-              <a:rPr lang="en-US" b="1" dirty="0" smtClean="0"/>
-              <a:t>solution</a:t>
-            </a:r>
+              <a:t>security/solution</a:t>
+            </a:r>
+            <a:endParaRPr lang="en-US" b="1" dirty="0" smtClean="0"/>
           </a:p>
         </p:txBody>
       </p:sp>
@@ -12874,9 +12906,13 @@
             </a:r>
             <a:r>
               <a:rPr lang="en-US" b="1" dirty="0" smtClean="0"/>
+              <a:t>insecure-web-app\</a:t>
+            </a:r>
+            <a:r>
+              <a:rPr lang="en-US" b="1" dirty="0" smtClean="0"/>
               <a:t>run.bat</a:t>
             </a:r>
-            <a:endParaRPr lang="en-US" dirty="0" smtClean="0"/>
+            <a:endParaRPr lang="en-US" b="1" dirty="0" smtClean="0"/>
           </a:p>
           <a:p>
             <a:r>
@@ -12972,15 +13008,28 @@
           <a:p>
             <a:r>
               <a:rPr lang="en-US" dirty="0" smtClean="0"/>
-              <a:t>Each practical lesson follows same structure:</a:t>
+              <a:t>Each practical lesson </a:t>
+            </a:r>
+            <a:r>
+              <a:rPr lang="en-US" dirty="0" smtClean="0"/>
+              <a:t>follows the </a:t>
+            </a:r>
+            <a:r>
+              <a:rPr lang="en-US" dirty="0" smtClean="0"/>
+              <a:t>same structure:</a:t>
             </a:r>
           </a:p>
           <a:p>
             <a:pPr lvl="1"/>
             <a:r>
               <a:rPr lang="en-US" dirty="0" smtClean="0"/>
-              <a:t>Short introduction description</a:t>
-            </a:r>
+              <a:t>Short </a:t>
+            </a:r>
+            <a:r>
+              <a:rPr lang="en-US" dirty="0" smtClean="0"/>
+              <a:t>introductory description</a:t>
+            </a:r>
+            <a:endParaRPr lang="en-US" dirty="0" smtClean="0"/>
           </a:p>
           <a:p>
             <a:pPr lvl="1"/>
@@ -13059,8 +13108,16 @@
           <a:lstStyle/>
           <a:p>
             <a:r>
+              <a:rPr lang="en-US" dirty="0" err="1" smtClean="0"/>
+              <a:t>TopicS</a:t>
+            </a:r>
+            <a:r>
               <a:rPr lang="en-US" dirty="0" smtClean="0"/>
-              <a:t>Topic covered</a:t>
+              <a:t> </a:t>
+            </a:r>
+            <a:r>
+              <a:rPr lang="en-US" dirty="0" smtClean="0"/>
+              <a:t>covered</a:t>
             </a:r>
             <a:endParaRPr lang="sr-Latn-CS" dirty="0"/>
           </a:p>
@@ -13217,13 +13274,8 @@
             <a:pPr lvl="1"/>
             <a:r>
               <a:rPr lang="en-US" dirty="0" smtClean="0"/>
-              <a:t>Milan </a:t>
-            </a:r>
-            <a:r>
-              <a:rPr lang="en-US" dirty="0" smtClean="0"/>
-              <a:t>Starcevic</a:t>
-            </a:r>
-            <a:endParaRPr lang="en-US" dirty="0" smtClean="0"/>
+              <a:t>Milan Starcevic</a:t>
+            </a:r>
           </a:p>
           <a:p>
             <a:pPr lvl="1"/>
@@ -13248,11 +13300,7 @@
             <a:pPr lvl="1"/>
             <a:r>
               <a:rPr lang="en-US" dirty="0" smtClean="0"/>
-              <a:t>Stefan </a:t>
-            </a:r>
-            <a:r>
-              <a:rPr lang="en-US" dirty="0" smtClean="0"/>
-              <a:t>Rankovic</a:t>
+              <a:t>Stefan Rankovic</a:t>
             </a:r>
           </a:p>
           <a:p>
@@ -13269,6 +13317,64 @@
     <p:extLst>
       <p:ext uri="{BB962C8B-B14F-4D97-AF65-F5344CB8AC3E}">
         <p14:creationId xmlns:p14="http://schemas.microsoft.com/office/powerpoint/2010/main" val="651145536"/>
+      </p:ext>
+    </p:extLst>
+  </p:cSld>
+  <p:clrMapOvr>
+    <a:masterClrMapping/>
+  </p:clrMapOvr>
+</p:sld>
+</file>
+
+<file path=ppt/slides/slide8.xml><?xml version="1.0" encoding="utf-8"?>
+<p:sld xmlns:a="http://schemas.openxmlformats.org/drawingml/2006/main" xmlns:r="http://schemas.openxmlformats.org/officeDocument/2006/relationships" xmlns:p="http://schemas.openxmlformats.org/presentationml/2006/main">
+  <p:cSld>
+    <p:spTree>
+      <p:nvGrpSpPr>
+        <p:cNvPr id="1" name=""/>
+        <p:cNvGrpSpPr/>
+        <p:nvPr/>
+      </p:nvGrpSpPr>
+      <p:grpSpPr>
+        <a:xfrm>
+          <a:off x="0" y="0"/>
+          <a:ext cx="0" cy="0"/>
+          <a:chOff x="0" y="0"/>
+          <a:chExt cx="0" cy="0"/>
+        </a:xfrm>
+      </p:grpSpPr>
+      <p:sp>
+        <p:nvSpPr>
+          <p:cNvPr id="3" name="Content Placeholder 2"/>
+          <p:cNvSpPr>
+            <a:spLocks noGrp="1"/>
+          </p:cNvSpPr>
+          <p:nvPr>
+            <p:ph idx="1"/>
+          </p:nvPr>
+        </p:nvSpPr>
+        <p:spPr/>
+        <p:txBody>
+          <a:bodyPr>
+            <a:normAutofit/>
+          </a:bodyPr>
+          <a:lstStyle/>
+          <a:p>
+            <a:pPr marL="0" indent="0" algn="ctr">
+              <a:buNone/>
+            </a:pPr>
+            <a:r>
+              <a:rPr lang="en-GB" sz="9600" dirty="0" smtClean="0"/>
+              <a:t>?</a:t>
+            </a:r>
+            <a:endParaRPr lang="en-GB" sz="9600" dirty="0"/>
+          </a:p>
+        </p:txBody>
+      </p:sp>
+    </p:spTree>
+    <p:extLst>
+      <p:ext uri="{BB962C8B-B14F-4D97-AF65-F5344CB8AC3E}">
+        <p14:creationId xmlns:p14="http://schemas.microsoft.com/office/powerpoint/2010/main" val="4178906509"/>
       </p:ext>
     </p:extLst>
   </p:cSld>

</xml_diff>

<commit_message>
Removed name from security presentation
</commit_message>
<xml_diff>
--- a/security/00-Introduction/Introduction.pptx
+++ b/security/00-Introduction/Introduction.pptx
@@ -169,7 +169,7 @@
           <a:noFill/>
           <a:extLst>
             <a:ext uri="{909E8E84-426E-40dd-AFC4-6F175D3DCCD1}">
-              <a14:hiddenFill xmlns="" xmlns:a14="http://schemas.microsoft.com/office/drawing/2010/main">
+              <a14:hiddenFill xmlns:a14="http://schemas.microsoft.com/office/drawing/2010/main" xmlns="">
                 <a:solidFill>
                   <a:srgbClr val="FFFFFF"/>
                 </a:solidFill>
@@ -229,7 +229,7 @@
             </a:ln>
             <a:extLst>
               <a:ext uri="{91240B29-F687-4f45-9708-019B960494DF}">
-                <a14:hiddenLine xmlns="" xmlns:a14="http://schemas.microsoft.com/office/drawing/2010/main" w="9525">
+                <a14:hiddenLine xmlns:a14="http://schemas.microsoft.com/office/drawing/2010/main" xmlns="" w="9525">
                   <a:solidFill>
                     <a:srgbClr val="000000"/>
                   </a:solidFill>
@@ -319,7 +319,7 @@
             </a:ln>
             <a:extLst>
               <a:ext uri="{91240B29-F687-4f45-9708-019B960494DF}">
-                <a14:hiddenLine xmlns="" xmlns:a14="http://schemas.microsoft.com/office/drawing/2010/main" w="9525">
+                <a14:hiddenLine xmlns:a14="http://schemas.microsoft.com/office/drawing/2010/main" xmlns="" w="9525">
                   <a:solidFill>
                     <a:srgbClr val="000000"/>
                   </a:solidFill>
@@ -409,7 +409,7 @@
             </a:ln>
             <a:extLst>
               <a:ext uri="{91240B29-F687-4f45-9708-019B960494DF}">
-                <a14:hiddenLine xmlns="" xmlns:a14="http://schemas.microsoft.com/office/drawing/2010/main" w="9525">
+                <a14:hiddenLine xmlns:a14="http://schemas.microsoft.com/office/drawing/2010/main" xmlns="" w="9525">
                   <a:solidFill>
                     <a:srgbClr val="000000"/>
                   </a:solidFill>
@@ -443,7 +443,7 @@
             </a:ln>
             <a:extLst>
               <a:ext uri="{91240B29-F687-4f45-9708-019B960494DF}">
-                <a14:hiddenLine xmlns="" xmlns:a14="http://schemas.microsoft.com/office/drawing/2010/main" w="9525">
+                <a14:hiddenLine xmlns:a14="http://schemas.microsoft.com/office/drawing/2010/main" xmlns="" w="9525">
                   <a:solidFill>
                     <a:srgbClr val="000000"/>
                   </a:solidFill>
@@ -533,7 +533,7 @@
             </a:ln>
             <a:extLst>
               <a:ext uri="{91240B29-F687-4f45-9708-019B960494DF}">
-                <a14:hiddenLine xmlns="" xmlns:a14="http://schemas.microsoft.com/office/drawing/2010/main" w="9525">
+                <a14:hiddenLine xmlns:a14="http://schemas.microsoft.com/office/drawing/2010/main" xmlns="" w="9525">
                   <a:solidFill>
                     <a:srgbClr val="000000"/>
                   </a:solidFill>
@@ -595,7 +595,7 @@
             </a:ln>
             <a:extLst>
               <a:ext uri="{91240B29-F687-4f45-9708-019B960494DF}">
-                <a14:hiddenLine xmlns="" xmlns:a14="http://schemas.microsoft.com/office/drawing/2010/main" w="9525">
+                <a14:hiddenLine xmlns:a14="http://schemas.microsoft.com/office/drawing/2010/main" xmlns="" w="9525">
                   <a:solidFill>
                     <a:srgbClr val="000000"/>
                   </a:solidFill>
@@ -657,7 +657,7 @@
             </a:ln>
             <a:extLst>
               <a:ext uri="{91240B29-F687-4f45-9708-019B960494DF}">
-                <a14:hiddenLine xmlns="" xmlns:a14="http://schemas.microsoft.com/office/drawing/2010/main" w="9525">
+                <a14:hiddenLine xmlns:a14="http://schemas.microsoft.com/office/drawing/2010/main" xmlns="" w="9525">
                   <a:solidFill>
                     <a:srgbClr val="000000"/>
                   </a:solidFill>
@@ -747,7 +747,7 @@
             </a:ln>
             <a:extLst>
               <a:ext uri="{91240B29-F687-4f45-9708-019B960494DF}">
-                <a14:hiddenLine xmlns="" xmlns:a14="http://schemas.microsoft.com/office/drawing/2010/main" w="9525">
+                <a14:hiddenLine xmlns:a14="http://schemas.microsoft.com/office/drawing/2010/main" xmlns="" w="9525">
                   <a:solidFill>
                     <a:srgbClr val="000000"/>
                   </a:solidFill>
@@ -809,7 +809,7 @@
             </a:ln>
             <a:extLst>
               <a:ext uri="{91240B29-F687-4f45-9708-019B960494DF}">
-                <a14:hiddenLine xmlns="" xmlns:a14="http://schemas.microsoft.com/office/drawing/2010/main" w="9525">
+                <a14:hiddenLine xmlns:a14="http://schemas.microsoft.com/office/drawing/2010/main" xmlns="" w="9525">
                   <a:solidFill>
                     <a:srgbClr val="000000"/>
                   </a:solidFill>
@@ -871,7 +871,7 @@
             </a:ln>
             <a:extLst>
               <a:ext uri="{91240B29-F687-4f45-9708-019B960494DF}">
-                <a14:hiddenLine xmlns="" xmlns:a14="http://schemas.microsoft.com/office/drawing/2010/main" w="9525">
+                <a14:hiddenLine xmlns:a14="http://schemas.microsoft.com/office/drawing/2010/main" xmlns="" w="9525">
                   <a:solidFill>
                     <a:srgbClr val="000000"/>
                   </a:solidFill>
@@ -961,7 +961,7 @@
             </a:ln>
             <a:extLst>
               <a:ext uri="{91240B29-F687-4f45-9708-019B960494DF}">
-                <a14:hiddenLine xmlns="" xmlns:a14="http://schemas.microsoft.com/office/drawing/2010/main" w="9525">
+                <a14:hiddenLine xmlns:a14="http://schemas.microsoft.com/office/drawing/2010/main" xmlns="" w="9525">
                   <a:solidFill>
                     <a:srgbClr val="000000"/>
                   </a:solidFill>
@@ -1051,7 +1051,7 @@
             </a:ln>
             <a:extLst>
               <a:ext uri="{91240B29-F687-4f45-9708-019B960494DF}">
-                <a14:hiddenLine xmlns="" xmlns:a14="http://schemas.microsoft.com/office/drawing/2010/main" w="9525">
+                <a14:hiddenLine xmlns:a14="http://schemas.microsoft.com/office/drawing/2010/main" xmlns="" w="9525">
                   <a:solidFill>
                     <a:srgbClr val="000000"/>
                   </a:solidFill>
@@ -1113,7 +1113,7 @@
             </a:ln>
             <a:extLst>
               <a:ext uri="{91240B29-F687-4f45-9708-019B960494DF}">
-                <a14:hiddenLine xmlns="" xmlns:a14="http://schemas.microsoft.com/office/drawing/2010/main" w="9525">
+                <a14:hiddenLine xmlns:a14="http://schemas.microsoft.com/office/drawing/2010/main" xmlns="" w="9525">
                   <a:solidFill>
                     <a:srgbClr val="000000"/>
                   </a:solidFill>
@@ -1223,7 +1223,7 @@
             </a:ln>
             <a:extLst>
               <a:ext uri="{91240B29-F687-4f45-9708-019B960494DF}">
-                <a14:hiddenLine xmlns="" xmlns:a14="http://schemas.microsoft.com/office/drawing/2010/main" w="9525">
+                <a14:hiddenLine xmlns:a14="http://schemas.microsoft.com/office/drawing/2010/main" xmlns="" w="9525">
                   <a:solidFill>
                     <a:srgbClr val="000000"/>
                   </a:solidFill>
@@ -1285,7 +1285,7 @@
             </a:ln>
             <a:extLst>
               <a:ext uri="{91240B29-F687-4f45-9708-019B960494DF}">
-                <a14:hiddenLine xmlns="" xmlns:a14="http://schemas.microsoft.com/office/drawing/2010/main" w="9525">
+                <a14:hiddenLine xmlns:a14="http://schemas.microsoft.com/office/drawing/2010/main" xmlns="" w="9525">
                   <a:solidFill>
                     <a:srgbClr val="000000"/>
                   </a:solidFill>
@@ -1375,7 +1375,7 @@
             </a:ln>
             <a:extLst>
               <a:ext uri="{91240B29-F687-4f45-9708-019B960494DF}">
-                <a14:hiddenLine xmlns="" xmlns:a14="http://schemas.microsoft.com/office/drawing/2010/main" w="9525">
+                <a14:hiddenLine xmlns:a14="http://schemas.microsoft.com/office/drawing/2010/main" xmlns="" w="9525">
                   <a:solidFill>
                     <a:srgbClr val="000000"/>
                   </a:solidFill>
@@ -1465,7 +1465,7 @@
             </a:ln>
             <a:extLst>
               <a:ext uri="{91240B29-F687-4f45-9708-019B960494DF}">
-                <a14:hiddenLine xmlns="" xmlns:a14="http://schemas.microsoft.com/office/drawing/2010/main" w="9525">
+                <a14:hiddenLine xmlns:a14="http://schemas.microsoft.com/office/drawing/2010/main" xmlns="" w="9525">
                   <a:solidFill>
                     <a:srgbClr val="000000"/>
                   </a:solidFill>
@@ -1527,7 +1527,7 @@
             </a:ln>
             <a:extLst>
               <a:ext uri="{91240B29-F687-4f45-9708-019B960494DF}">
-                <a14:hiddenLine xmlns="" xmlns:a14="http://schemas.microsoft.com/office/drawing/2010/main" w="9525">
+                <a14:hiddenLine xmlns:a14="http://schemas.microsoft.com/office/drawing/2010/main" xmlns="" w="9525">
                   <a:solidFill>
                     <a:srgbClr val="000000"/>
                   </a:solidFill>
@@ -1617,7 +1617,7 @@
             </a:ln>
             <a:extLst>
               <a:ext uri="{91240B29-F687-4f45-9708-019B960494DF}">
-                <a14:hiddenLine xmlns="" xmlns:a14="http://schemas.microsoft.com/office/drawing/2010/main" w="9525">
+                <a14:hiddenLine xmlns:a14="http://schemas.microsoft.com/office/drawing/2010/main" xmlns="" w="9525">
                   <a:solidFill>
                     <a:srgbClr val="000000"/>
                   </a:solidFill>
@@ -1707,7 +1707,7 @@
             </a:ln>
             <a:extLst>
               <a:ext uri="{91240B29-F687-4f45-9708-019B960494DF}">
-                <a14:hiddenLine xmlns="" xmlns:a14="http://schemas.microsoft.com/office/drawing/2010/main" w="9525">
+                <a14:hiddenLine xmlns:a14="http://schemas.microsoft.com/office/drawing/2010/main" xmlns="" w="9525">
                   <a:solidFill>
                     <a:srgbClr val="000000"/>
                   </a:solidFill>
@@ -1763,7 +1763,7 @@
             </a:ln>
             <a:extLst>
               <a:ext uri="{91240B29-F687-4f45-9708-019B960494DF}">
-                <a14:hiddenLine xmlns="" xmlns:a14="http://schemas.microsoft.com/office/drawing/2010/main" w="9525">
+                <a14:hiddenLine xmlns:a14="http://schemas.microsoft.com/office/drawing/2010/main" xmlns="" w="9525">
                   <a:solidFill>
                     <a:srgbClr val="000000"/>
                   </a:solidFill>
@@ -1853,7 +1853,7 @@
             </a:ln>
             <a:extLst>
               <a:ext uri="{91240B29-F687-4f45-9708-019B960494DF}">
-                <a14:hiddenLine xmlns="" xmlns:a14="http://schemas.microsoft.com/office/drawing/2010/main" w="9525">
+                <a14:hiddenLine xmlns:a14="http://schemas.microsoft.com/office/drawing/2010/main" xmlns="" w="9525">
                   <a:solidFill>
                     <a:srgbClr val="000000"/>
                   </a:solidFill>
@@ -1909,7 +1909,7 @@
             </a:ln>
             <a:extLst>
               <a:ext uri="{91240B29-F687-4f45-9708-019B960494DF}">
-                <a14:hiddenLine xmlns="" xmlns:a14="http://schemas.microsoft.com/office/drawing/2010/main" w="9525">
+                <a14:hiddenLine xmlns:a14="http://schemas.microsoft.com/office/drawing/2010/main" xmlns="" w="9525">
                   <a:solidFill>
                     <a:srgbClr val="000000"/>
                   </a:solidFill>
@@ -1999,7 +1999,7 @@
             </a:ln>
             <a:extLst>
               <a:ext uri="{91240B29-F687-4f45-9708-019B960494DF}">
-                <a14:hiddenLine xmlns="" xmlns:a14="http://schemas.microsoft.com/office/drawing/2010/main" w="9525">
+                <a14:hiddenLine xmlns:a14="http://schemas.microsoft.com/office/drawing/2010/main" xmlns="" w="9525">
                   <a:solidFill>
                     <a:srgbClr val="000000"/>
                   </a:solidFill>
@@ -2067,7 +2067,7 @@
             </a:ln>
             <a:extLst>
               <a:ext uri="{91240B29-F687-4f45-9708-019B960494DF}">
-                <a14:hiddenLine xmlns="" xmlns:a14="http://schemas.microsoft.com/office/drawing/2010/main" w="9525">
+                <a14:hiddenLine xmlns:a14="http://schemas.microsoft.com/office/drawing/2010/main" xmlns="" w="9525">
                   <a:solidFill>
                     <a:srgbClr val="000000"/>
                   </a:solidFill>
@@ -2157,7 +2157,7 @@
             </a:ln>
             <a:extLst>
               <a:ext uri="{91240B29-F687-4f45-9708-019B960494DF}">
-                <a14:hiddenLine xmlns="" xmlns:a14="http://schemas.microsoft.com/office/drawing/2010/main" w="9525">
+                <a14:hiddenLine xmlns:a14="http://schemas.microsoft.com/office/drawing/2010/main" xmlns="" w="9525">
                   <a:solidFill>
                     <a:srgbClr val="000000"/>
                   </a:solidFill>
@@ -2225,7 +2225,7 @@
             </a:ln>
             <a:extLst>
               <a:ext uri="{91240B29-F687-4f45-9708-019B960494DF}">
-                <a14:hiddenLine xmlns="" xmlns:a14="http://schemas.microsoft.com/office/drawing/2010/main" w="9525">
+                <a14:hiddenLine xmlns:a14="http://schemas.microsoft.com/office/drawing/2010/main" xmlns="" w="9525">
                   <a:solidFill>
                     <a:srgbClr val="000000"/>
                   </a:solidFill>
@@ -2315,7 +2315,7 @@
             </a:ln>
             <a:extLst>
               <a:ext uri="{91240B29-F687-4f45-9708-019B960494DF}">
-                <a14:hiddenLine xmlns="" xmlns:a14="http://schemas.microsoft.com/office/drawing/2010/main" w="9525">
+                <a14:hiddenLine xmlns:a14="http://schemas.microsoft.com/office/drawing/2010/main" xmlns="" w="9525">
                   <a:solidFill>
                     <a:srgbClr val="000000"/>
                   </a:solidFill>
@@ -2349,7 +2349,7 @@
             </a:ln>
             <a:extLst>
               <a:ext uri="{91240B29-F687-4f45-9708-019B960494DF}">
-                <a14:hiddenLine xmlns="" xmlns:a14="http://schemas.microsoft.com/office/drawing/2010/main" w="9525">
+                <a14:hiddenLine xmlns:a14="http://schemas.microsoft.com/office/drawing/2010/main" xmlns="" w="9525">
                   <a:solidFill>
                     <a:srgbClr val="000000"/>
                   </a:solidFill>
@@ -2439,7 +2439,7 @@
             </a:ln>
             <a:extLst>
               <a:ext uri="{91240B29-F687-4f45-9708-019B960494DF}">
-                <a14:hiddenLine xmlns="" xmlns:a14="http://schemas.microsoft.com/office/drawing/2010/main" w="9525">
+                <a14:hiddenLine xmlns:a14="http://schemas.microsoft.com/office/drawing/2010/main" xmlns="" w="9525">
                   <a:solidFill>
                     <a:srgbClr val="000000"/>
                   </a:solidFill>
@@ -2501,7 +2501,7 @@
             </a:ln>
             <a:extLst>
               <a:ext uri="{91240B29-F687-4f45-9708-019B960494DF}">
-                <a14:hiddenLine xmlns="" xmlns:a14="http://schemas.microsoft.com/office/drawing/2010/main" w="9525">
+                <a14:hiddenLine xmlns:a14="http://schemas.microsoft.com/office/drawing/2010/main" xmlns="" w="9525">
                   <a:solidFill>
                     <a:srgbClr val="000000"/>
                   </a:solidFill>
@@ -2563,7 +2563,7 @@
             </a:ln>
             <a:extLst>
               <a:ext uri="{91240B29-F687-4f45-9708-019B960494DF}">
-                <a14:hiddenLine xmlns="" xmlns:a14="http://schemas.microsoft.com/office/drawing/2010/main" w="9525">
+                <a14:hiddenLine xmlns:a14="http://schemas.microsoft.com/office/drawing/2010/main" xmlns="" w="9525">
                   <a:solidFill>
                     <a:srgbClr val="000000"/>
                   </a:solidFill>
@@ -2653,7 +2653,7 @@
             </a:ln>
             <a:extLst>
               <a:ext uri="{91240B29-F687-4f45-9708-019B960494DF}">
-                <a14:hiddenLine xmlns="" xmlns:a14="http://schemas.microsoft.com/office/drawing/2010/main" w="9525">
+                <a14:hiddenLine xmlns:a14="http://schemas.microsoft.com/office/drawing/2010/main" xmlns="" w="9525">
                   <a:solidFill>
                     <a:srgbClr val="000000"/>
                   </a:solidFill>
@@ -2721,7 +2721,7 @@
             </a:ln>
             <a:extLst>
               <a:ext uri="{91240B29-F687-4f45-9708-019B960494DF}">
-                <a14:hiddenLine xmlns="" xmlns:a14="http://schemas.microsoft.com/office/drawing/2010/main" w="9525">
+                <a14:hiddenLine xmlns:a14="http://schemas.microsoft.com/office/drawing/2010/main" xmlns="" w="9525">
                   <a:solidFill>
                     <a:srgbClr val="000000"/>
                   </a:solidFill>
@@ -2783,7 +2783,7 @@
             </a:ln>
             <a:extLst>
               <a:ext uri="{91240B29-F687-4f45-9708-019B960494DF}">
-                <a14:hiddenLine xmlns="" xmlns:a14="http://schemas.microsoft.com/office/drawing/2010/main" w="9525">
+                <a14:hiddenLine xmlns:a14="http://schemas.microsoft.com/office/drawing/2010/main" xmlns="" w="9525">
                   <a:solidFill>
                     <a:srgbClr val="000000"/>
                   </a:solidFill>
@@ -2873,7 +2873,7 @@
             </a:ln>
             <a:extLst>
               <a:ext uri="{91240B29-F687-4f45-9708-019B960494DF}">
-                <a14:hiddenLine xmlns="" xmlns:a14="http://schemas.microsoft.com/office/drawing/2010/main" w="9525">
+                <a14:hiddenLine xmlns:a14="http://schemas.microsoft.com/office/drawing/2010/main" xmlns="" w="9525">
                   <a:solidFill>
                     <a:srgbClr val="000000"/>
                   </a:solidFill>
@@ -2935,7 +2935,7 @@
             </a:ln>
             <a:extLst>
               <a:ext uri="{91240B29-F687-4f45-9708-019B960494DF}">
-                <a14:hiddenLine xmlns="" xmlns:a14="http://schemas.microsoft.com/office/drawing/2010/main" w="9525">
+                <a14:hiddenLine xmlns:a14="http://schemas.microsoft.com/office/drawing/2010/main" xmlns="" w="9525">
                   <a:solidFill>
                     <a:srgbClr val="000000"/>
                   </a:solidFill>
@@ -3025,7 +3025,7 @@
             </a:ln>
             <a:extLst>
               <a:ext uri="{91240B29-F687-4f45-9708-019B960494DF}">
-                <a14:hiddenLine xmlns="" xmlns:a14="http://schemas.microsoft.com/office/drawing/2010/main" w="9525">
+                <a14:hiddenLine xmlns:a14="http://schemas.microsoft.com/office/drawing/2010/main" xmlns="" w="9525">
                   <a:solidFill>
                     <a:srgbClr val="000000"/>
                   </a:solidFill>
@@ -3087,7 +3087,7 @@
             </a:ln>
             <a:extLst>
               <a:ext uri="{91240B29-F687-4f45-9708-019B960494DF}">
-                <a14:hiddenLine xmlns="" xmlns:a14="http://schemas.microsoft.com/office/drawing/2010/main" w="9525">
+                <a14:hiddenLine xmlns:a14="http://schemas.microsoft.com/office/drawing/2010/main" xmlns="" w="9525">
                   <a:solidFill>
                     <a:srgbClr val="000000"/>
                   </a:solidFill>
@@ -3177,7 +3177,7 @@
             </a:ln>
             <a:extLst>
               <a:ext uri="{91240B29-F687-4f45-9708-019B960494DF}">
-                <a14:hiddenLine xmlns="" xmlns:a14="http://schemas.microsoft.com/office/drawing/2010/main" w="9525">
+                <a14:hiddenLine xmlns:a14="http://schemas.microsoft.com/office/drawing/2010/main" xmlns="" w="9525">
                   <a:solidFill>
                     <a:srgbClr val="000000"/>
                   </a:solidFill>
@@ -3211,7 +3211,7 @@
             </a:ln>
             <a:extLst>
               <a:ext uri="{91240B29-F687-4f45-9708-019B960494DF}">
-                <a14:hiddenLine xmlns="" xmlns:a14="http://schemas.microsoft.com/office/drawing/2010/main" w="9525">
+                <a14:hiddenLine xmlns:a14="http://schemas.microsoft.com/office/drawing/2010/main" xmlns="" w="9525">
                   <a:solidFill>
                     <a:srgbClr val="000000"/>
                   </a:solidFill>
@@ -3276,7 +3276,7 @@
             </a:ln>
             <a:extLst>
               <a:ext uri="{91240B29-F687-4f45-9708-019B960494DF}">
-                <a14:hiddenLine xmlns="" xmlns:a14="http://schemas.microsoft.com/office/drawing/2010/main" w="9525">
+                <a14:hiddenLine xmlns:a14="http://schemas.microsoft.com/office/drawing/2010/main" xmlns="" w="9525">
                   <a:solidFill>
                     <a:srgbClr val="000000"/>
                   </a:solidFill>
@@ -3366,7 +3366,7 @@
             </a:ln>
             <a:extLst>
               <a:ext uri="{91240B29-F687-4f45-9708-019B960494DF}">
-                <a14:hiddenLine xmlns="" xmlns:a14="http://schemas.microsoft.com/office/drawing/2010/main" w="9525">
+                <a14:hiddenLine xmlns:a14="http://schemas.microsoft.com/office/drawing/2010/main" xmlns="" w="9525">
                   <a:solidFill>
                     <a:srgbClr val="000000"/>
                   </a:solidFill>
@@ -3428,7 +3428,7 @@
             </a:ln>
             <a:extLst>
               <a:ext uri="{91240B29-F687-4f45-9708-019B960494DF}">
-                <a14:hiddenLine xmlns="" xmlns:a14="http://schemas.microsoft.com/office/drawing/2010/main" w="9525">
+                <a14:hiddenLine xmlns:a14="http://schemas.microsoft.com/office/drawing/2010/main" xmlns="" w="9525">
                   <a:solidFill>
                     <a:srgbClr val="000000"/>
                   </a:solidFill>
@@ -3518,7 +3518,7 @@
             </a:ln>
             <a:extLst>
               <a:ext uri="{91240B29-F687-4f45-9708-019B960494DF}">
-                <a14:hiddenLine xmlns="" xmlns:a14="http://schemas.microsoft.com/office/drawing/2010/main" w="9525">
+                <a14:hiddenLine xmlns:a14="http://schemas.microsoft.com/office/drawing/2010/main" xmlns="" w="9525">
                   <a:solidFill>
                     <a:srgbClr val="000000"/>
                   </a:solidFill>
@@ -3608,7 +3608,7 @@
             </a:ln>
             <a:extLst>
               <a:ext uri="{91240B29-F687-4f45-9708-019B960494DF}">
-                <a14:hiddenLine xmlns="" xmlns:a14="http://schemas.microsoft.com/office/drawing/2010/main" w="9525">
+                <a14:hiddenLine xmlns:a14="http://schemas.microsoft.com/office/drawing/2010/main" xmlns="" w="9525">
                   <a:solidFill>
                     <a:srgbClr val="000000"/>
                   </a:solidFill>
@@ -3673,7 +3673,7 @@
             </a:ln>
             <a:extLst>
               <a:ext uri="{91240B29-F687-4f45-9708-019B960494DF}">
-                <a14:hiddenLine xmlns="" xmlns:a14="http://schemas.microsoft.com/office/drawing/2010/main" w="9525">
+                <a14:hiddenLine xmlns:a14="http://schemas.microsoft.com/office/drawing/2010/main" xmlns="" w="9525">
                   <a:solidFill>
                     <a:srgbClr val="000000"/>
                   </a:solidFill>
@@ -3735,7 +3735,7 @@
             </a:ln>
             <a:extLst>
               <a:ext uri="{91240B29-F687-4f45-9708-019B960494DF}">
-                <a14:hiddenLine xmlns="" xmlns:a14="http://schemas.microsoft.com/office/drawing/2010/main" w="9525">
+                <a14:hiddenLine xmlns:a14="http://schemas.microsoft.com/office/drawing/2010/main" xmlns="" w="9525">
                   <a:solidFill>
                     <a:srgbClr val="000000"/>
                   </a:solidFill>
@@ -3825,7 +3825,7 @@
             </a:ln>
             <a:extLst>
               <a:ext uri="{91240B29-F687-4f45-9708-019B960494DF}">
-                <a14:hiddenLine xmlns="" xmlns:a14="http://schemas.microsoft.com/office/drawing/2010/main" w="9525">
+                <a14:hiddenLine xmlns:a14="http://schemas.microsoft.com/office/drawing/2010/main" xmlns="" w="9525">
                   <a:solidFill>
                     <a:srgbClr val="000000"/>
                   </a:solidFill>
@@ -3915,7 +3915,7 @@
             </a:ln>
             <a:extLst>
               <a:ext uri="{91240B29-F687-4f45-9708-019B960494DF}">
-                <a14:hiddenLine xmlns="" xmlns:a14="http://schemas.microsoft.com/office/drawing/2010/main" w="9525">
+                <a14:hiddenLine xmlns:a14="http://schemas.microsoft.com/office/drawing/2010/main" xmlns="" w="9525">
                   <a:solidFill>
                     <a:srgbClr val="000000"/>
                   </a:solidFill>
@@ -3977,7 +3977,7 @@
             </a:ln>
             <a:extLst>
               <a:ext uri="{91240B29-F687-4f45-9708-019B960494DF}">
-                <a14:hiddenLine xmlns="" xmlns:a14="http://schemas.microsoft.com/office/drawing/2010/main" w="9525">
+                <a14:hiddenLine xmlns:a14="http://schemas.microsoft.com/office/drawing/2010/main" xmlns="" w="9525">
                   <a:solidFill>
                     <a:srgbClr val="000000"/>
                   </a:solidFill>
@@ -4097,7 +4097,7 @@
             </a:ln>
             <a:extLst>
               <a:ext uri="{91240B29-F687-4f45-9708-019B960494DF}">
-                <a14:hiddenLine xmlns="" xmlns:a14="http://schemas.microsoft.com/office/drawing/2010/main" w="9525">
+                <a14:hiddenLine xmlns:a14="http://schemas.microsoft.com/office/drawing/2010/main" xmlns="" w="9525">
                   <a:solidFill>
                     <a:srgbClr val="000000"/>
                   </a:solidFill>
@@ -4165,7 +4165,7 @@
             </a:ln>
             <a:extLst>
               <a:ext uri="{91240B29-F687-4f45-9708-019B960494DF}">
-                <a14:hiddenLine xmlns="" xmlns:a14="http://schemas.microsoft.com/office/drawing/2010/main" w="9525">
+                <a14:hiddenLine xmlns:a14="http://schemas.microsoft.com/office/drawing/2010/main" xmlns="" w="9525">
                   <a:solidFill>
                     <a:srgbClr val="000000"/>
                   </a:solidFill>
@@ -4255,7 +4255,7 @@
             </a:ln>
             <a:extLst>
               <a:ext uri="{91240B29-F687-4f45-9708-019B960494DF}">
-                <a14:hiddenLine xmlns="" xmlns:a14="http://schemas.microsoft.com/office/drawing/2010/main" w="9525">
+                <a14:hiddenLine xmlns:a14="http://schemas.microsoft.com/office/drawing/2010/main" xmlns="" w="9525">
                   <a:solidFill>
                     <a:srgbClr val="000000"/>
                   </a:solidFill>
@@ -4295,7 +4295,7 @@
           </a:lstStyle>
           <a:p>
             <a:r>
-              <a:rPr lang="en-US" smtClean="0"/>
+              <a:rPr lang="en-US"/>
               <a:t>Click to edit Master title style</a:t>
             </a:r>
             <a:endParaRPr lang="en-US" dirty="0"/>
@@ -4366,7 +4366,7 @@
           </a:lstStyle>
           <a:p>
             <a:r>
-              <a:rPr lang="en-US" smtClean="0"/>
+              <a:rPr lang="en-US"/>
               <a:t>Click to edit Master subtitle style</a:t>
             </a:r>
             <a:endParaRPr lang="en-US" dirty="0"/>
@@ -4395,7 +4395,7 @@
           <a:p>
             <a:fld id="{B9BA6063-779C-4BB6-8BC7-C5993206073F}" type="datetimeFigureOut">
               <a:rPr lang="sr-Latn-CS" smtClean="0"/>
-              <a:t>10.11.2017.</a:t>
+              <a:t>27.4.2018.</a:t>
             </a:fld>
             <a:endParaRPr lang="sr-Latn-CS"/>
           </a:p>
@@ -4510,7 +4510,7 @@
           </a:lstStyle>
           <a:p>
             <a:r>
-              <a:rPr lang="en-US" smtClean="0"/>
+              <a:rPr lang="en-US"/>
               <a:t>Click to edit Master title style</a:t>
             </a:r>
             <a:endParaRPr lang="en-US" dirty="0"/>
@@ -4571,7 +4571,7 @@
               <a:buNone/>
             </a:pPr>
             <a:r>
-              <a:rPr lang="en-US" smtClean="0"/>
+              <a:rPr lang="en-US"/>
               <a:t>Click icon to add picture</a:t>
             </a:r>
             <a:endParaRPr lang="en-US" dirty="0"/>
@@ -4639,7 +4639,7 @@
           <a:p>
             <a:pPr lvl="0"/>
             <a:r>
-              <a:rPr lang="en-US" smtClean="0"/>
+              <a:rPr lang="en-US"/>
               <a:t>Edit Master text styles</a:t>
             </a:r>
           </a:p>
@@ -4662,7 +4662,7 @@
           <a:p>
             <a:fld id="{B9BA6063-779C-4BB6-8BC7-C5993206073F}" type="datetimeFigureOut">
               <a:rPr lang="sr-Latn-CS" smtClean="0"/>
-              <a:t>10.11.2017.</a:t>
+              <a:t>27.4.2018.</a:t>
             </a:fld>
             <a:endParaRPr lang="sr-Latn-CS"/>
           </a:p>
@@ -4767,7 +4767,7 @@
           </a:lstStyle>
           <a:p>
             <a:r>
-              <a:rPr lang="en-US" smtClean="0"/>
+              <a:rPr lang="en-US"/>
               <a:t>Click to edit Master title style</a:t>
             </a:r>
             <a:endParaRPr lang="en-US" dirty="0"/>
@@ -4835,7 +4835,7 @@
           <a:p>
             <a:pPr lvl="0"/>
             <a:r>
-              <a:rPr lang="en-US" smtClean="0"/>
+              <a:rPr lang="en-US"/>
               <a:t>Edit Master text styles</a:t>
             </a:r>
           </a:p>
@@ -4858,7 +4858,7 @@
           <a:p>
             <a:fld id="{B9BA6063-779C-4BB6-8BC7-C5993206073F}" type="datetimeFigureOut">
               <a:rPr lang="sr-Latn-CS" smtClean="0"/>
-              <a:t>10.11.2017.</a:t>
+              <a:t>27.4.2018.</a:t>
             </a:fld>
             <a:endParaRPr lang="sr-Latn-CS"/>
           </a:p>
@@ -4963,7 +4963,7 @@
           </a:lstStyle>
           <a:p>
             <a:r>
-              <a:rPr lang="en-US" smtClean="0"/>
+              <a:rPr lang="en-US"/>
               <a:t>Click to edit Master title style</a:t>
             </a:r>
             <a:endParaRPr lang="en-US" dirty="0"/>
@@ -5031,7 +5031,7 @@
           <a:p>
             <a:pPr lvl="0"/>
             <a:r>
-              <a:rPr lang="en-US" smtClean="0"/>
+              <a:rPr lang="en-US"/>
               <a:t>Edit Master text styles</a:t>
             </a:r>
           </a:p>
@@ -5098,7 +5098,7 @@
           <a:p>
             <a:pPr lvl="0"/>
             <a:r>
-              <a:rPr lang="en-US" smtClean="0"/>
+              <a:rPr lang="en-US"/>
               <a:t>Edit Master text styles</a:t>
             </a:r>
           </a:p>
@@ -5121,7 +5121,7 @@
           <a:p>
             <a:fld id="{B9BA6063-779C-4BB6-8BC7-C5993206073F}" type="datetimeFigureOut">
               <a:rPr lang="sr-Latn-CS" smtClean="0"/>
-              <a:t>10.11.2017.</a:t>
+              <a:t>27.4.2018.</a:t>
             </a:fld>
             <a:endParaRPr lang="sr-Latn-CS"/>
           </a:p>
@@ -5464,7 +5464,7 @@
           </a:lstStyle>
           <a:p>
             <a:r>
-              <a:rPr lang="en-US" smtClean="0"/>
+              <a:rPr lang="en-US"/>
               <a:t>Click to edit Master title style</a:t>
             </a:r>
             <a:endParaRPr lang="en-US" dirty="0"/>
@@ -5532,7 +5532,7 @@
           <a:p>
             <a:pPr lvl="0"/>
             <a:r>
-              <a:rPr lang="en-US" smtClean="0"/>
+              <a:rPr lang="en-US"/>
               <a:t>Edit Master text styles</a:t>
             </a:r>
           </a:p>
@@ -5555,7 +5555,7 @@
           <a:p>
             <a:fld id="{B9BA6063-779C-4BB6-8BC7-C5993206073F}" type="datetimeFigureOut">
               <a:rPr lang="sr-Latn-CS" smtClean="0"/>
-              <a:t>10.11.2017.</a:t>
+              <a:t>27.4.2018.</a:t>
             </a:fld>
             <a:endParaRPr lang="sr-Latn-CS"/>
           </a:p>
@@ -5654,7 +5654,7 @@
           <a:lstStyle/>
           <a:p>
             <a:r>
-              <a:rPr lang="en-US" smtClean="0"/>
+              <a:rPr lang="en-US"/>
               <a:t>Click to edit Master title style</a:t>
             </a:r>
             <a:endParaRPr lang="en-US" dirty="0"/>
@@ -5729,7 +5729,7 @@
           <a:p>
             <a:pPr lvl="0"/>
             <a:r>
-              <a:rPr lang="en-US" smtClean="0"/>
+              <a:rPr lang="en-US"/>
               <a:t>Edit Master text styles</a:t>
             </a:r>
           </a:p>
@@ -5796,7 +5796,7 @@
           <a:p>
             <a:pPr lvl="0"/>
             <a:r>
-              <a:rPr lang="en-US" smtClean="0"/>
+              <a:rPr lang="en-US"/>
               <a:t>Edit Master text styles</a:t>
             </a:r>
           </a:p>
@@ -5870,7 +5870,7 @@
           <a:p>
             <a:pPr lvl="0"/>
             <a:r>
-              <a:rPr lang="en-US" smtClean="0"/>
+              <a:rPr lang="en-US"/>
               <a:t>Edit Master text styles</a:t>
             </a:r>
           </a:p>
@@ -5937,7 +5937,7 @@
           <a:p>
             <a:pPr lvl="0"/>
             <a:r>
-              <a:rPr lang="en-US" smtClean="0"/>
+              <a:rPr lang="en-US"/>
               <a:t>Edit Master text styles</a:t>
             </a:r>
           </a:p>
@@ -6011,7 +6011,7 @@
           <a:p>
             <a:pPr lvl="0"/>
             <a:r>
-              <a:rPr lang="en-US" smtClean="0"/>
+              <a:rPr lang="en-US"/>
               <a:t>Edit Master text styles</a:t>
             </a:r>
           </a:p>
@@ -6078,7 +6078,7 @@
           <a:p>
             <a:pPr lvl="0"/>
             <a:r>
-              <a:rPr lang="en-US" smtClean="0"/>
+              <a:rPr lang="en-US"/>
               <a:t>Edit Master text styles</a:t>
             </a:r>
           </a:p>
@@ -6101,7 +6101,7 @@
           <a:p>
             <a:fld id="{B9BA6063-779C-4BB6-8BC7-C5993206073F}" type="datetimeFigureOut">
               <a:rPr lang="sr-Latn-CS" smtClean="0"/>
-              <a:t>10.11.2017.</a:t>
+              <a:t>27.4.2018.</a:t>
             </a:fld>
             <a:endParaRPr lang="sr-Latn-CS"/>
           </a:p>
@@ -6200,7 +6200,7 @@
           <a:lstStyle/>
           <a:p>
             <a:r>
-              <a:rPr lang="en-US" smtClean="0"/>
+              <a:rPr lang="en-US"/>
               <a:t>Click to edit Master title style</a:t>
             </a:r>
             <a:endParaRPr lang="en-US" dirty="0"/>
@@ -6275,7 +6275,7 @@
           <a:p>
             <a:pPr lvl="0"/>
             <a:r>
-              <a:rPr lang="en-US" smtClean="0"/>
+              <a:rPr lang="en-US"/>
               <a:t>Edit Master text styles</a:t>
             </a:r>
           </a:p>
@@ -6332,7 +6332,7 @@
               <a:buNone/>
             </a:pPr>
             <a:r>
-              <a:rPr lang="en-US" smtClean="0"/>
+              <a:rPr lang="en-US"/>
               <a:t>Click icon to add picture</a:t>
             </a:r>
             <a:endParaRPr lang="en-US" dirty="0"/>
@@ -6400,7 +6400,7 @@
           <a:p>
             <a:pPr lvl="0"/>
             <a:r>
-              <a:rPr lang="en-US" smtClean="0"/>
+              <a:rPr lang="en-US"/>
               <a:t>Edit Master text styles</a:t>
             </a:r>
           </a:p>
@@ -6474,7 +6474,7 @@
           <a:p>
             <a:pPr lvl="0"/>
             <a:r>
-              <a:rPr lang="en-US" smtClean="0"/>
+              <a:rPr lang="en-US"/>
               <a:t>Edit Master text styles</a:t>
             </a:r>
           </a:p>
@@ -6531,7 +6531,7 @@
               <a:buNone/>
             </a:pPr>
             <a:r>
-              <a:rPr lang="en-US" smtClean="0"/>
+              <a:rPr lang="en-US"/>
               <a:t>Click icon to add picture</a:t>
             </a:r>
             <a:endParaRPr lang="en-US" dirty="0"/>
@@ -6599,7 +6599,7 @@
           <a:p>
             <a:pPr lvl="0"/>
             <a:r>
-              <a:rPr lang="en-US" smtClean="0"/>
+              <a:rPr lang="en-US"/>
               <a:t>Edit Master text styles</a:t>
             </a:r>
           </a:p>
@@ -6673,7 +6673,7 @@
           <a:p>
             <a:pPr lvl="0"/>
             <a:r>
-              <a:rPr lang="en-US" smtClean="0"/>
+              <a:rPr lang="en-US"/>
               <a:t>Edit Master text styles</a:t>
             </a:r>
           </a:p>
@@ -6730,7 +6730,7 @@
               <a:buNone/>
             </a:pPr>
             <a:r>
-              <a:rPr lang="en-US" smtClean="0"/>
+              <a:rPr lang="en-US"/>
               <a:t>Click icon to add picture</a:t>
             </a:r>
             <a:endParaRPr lang="en-US" dirty="0"/>
@@ -6798,7 +6798,7 @@
           <a:p>
             <a:pPr lvl="0"/>
             <a:r>
-              <a:rPr lang="en-US" smtClean="0"/>
+              <a:rPr lang="en-US"/>
               <a:t>Edit Master text styles</a:t>
             </a:r>
           </a:p>
@@ -6821,7 +6821,7 @@
           <a:p>
             <a:fld id="{B9BA6063-779C-4BB6-8BC7-C5993206073F}" type="datetimeFigureOut">
               <a:rPr lang="sr-Latn-CS" smtClean="0"/>
-              <a:t>10.11.2017.</a:t>
+              <a:t>27.4.2018.</a:t>
             </a:fld>
             <a:endParaRPr lang="sr-Latn-CS"/>
           </a:p>
@@ -6915,7 +6915,7 @@
           <a:lstStyle/>
           <a:p>
             <a:r>
-              <a:rPr lang="en-US" smtClean="0"/>
+              <a:rPr lang="en-US"/>
               <a:t>Click to edit Master title style</a:t>
             </a:r>
             <a:endParaRPr lang="en-US" dirty="0"/>
@@ -6939,35 +6939,35 @@
           <a:p>
             <a:pPr lvl="0"/>
             <a:r>
-              <a:rPr lang="en-US" smtClean="0"/>
+              <a:rPr lang="en-US"/>
               <a:t>Edit Master text styles</a:t>
             </a:r>
           </a:p>
           <a:p>
             <a:pPr lvl="1"/>
             <a:r>
-              <a:rPr lang="en-US" smtClean="0"/>
+              <a:rPr lang="en-US"/>
               <a:t>Second level</a:t>
             </a:r>
           </a:p>
           <a:p>
             <a:pPr lvl="2"/>
             <a:r>
-              <a:rPr lang="en-US" smtClean="0"/>
+              <a:rPr lang="en-US"/>
               <a:t>Third level</a:t>
             </a:r>
           </a:p>
           <a:p>
             <a:pPr lvl="3"/>
             <a:r>
-              <a:rPr lang="en-US" smtClean="0"/>
+              <a:rPr lang="en-US"/>
               <a:t>Fourth level</a:t>
             </a:r>
           </a:p>
           <a:p>
             <a:pPr lvl="4"/>
             <a:r>
-              <a:rPr lang="en-US" smtClean="0"/>
+              <a:rPr lang="en-US"/>
               <a:t>Fifth level</a:t>
             </a:r>
             <a:endParaRPr lang="en-US" dirty="0"/>
@@ -6991,7 +6991,7 @@
           <a:p>
             <a:fld id="{B9BA6063-779C-4BB6-8BC7-C5993206073F}" type="datetimeFigureOut">
               <a:rPr lang="sr-Latn-CS" smtClean="0"/>
-              <a:t>10.11.2017.</a:t>
+              <a:t>27.4.2018.</a:t>
             </a:fld>
             <a:endParaRPr lang="sr-Latn-CS"/>
           </a:p>
@@ -7090,7 +7090,7 @@
           <a:lstStyle/>
           <a:p>
             <a:r>
-              <a:rPr lang="en-US" smtClean="0"/>
+              <a:rPr lang="en-US"/>
               <a:t>Click to edit Master title style</a:t>
             </a:r>
             <a:endParaRPr lang="en-US" dirty="0"/>
@@ -7119,35 +7119,35 @@
           <a:p>
             <a:pPr lvl="0"/>
             <a:r>
-              <a:rPr lang="en-US" smtClean="0"/>
+              <a:rPr lang="en-US"/>
               <a:t>Edit Master text styles</a:t>
             </a:r>
           </a:p>
           <a:p>
             <a:pPr lvl="1"/>
             <a:r>
-              <a:rPr lang="en-US" smtClean="0"/>
+              <a:rPr lang="en-US"/>
               <a:t>Second level</a:t>
             </a:r>
           </a:p>
           <a:p>
             <a:pPr lvl="2"/>
             <a:r>
-              <a:rPr lang="en-US" smtClean="0"/>
+              <a:rPr lang="en-US"/>
               <a:t>Third level</a:t>
             </a:r>
           </a:p>
           <a:p>
             <a:pPr lvl="3"/>
             <a:r>
-              <a:rPr lang="en-US" smtClean="0"/>
+              <a:rPr lang="en-US"/>
               <a:t>Fourth level</a:t>
             </a:r>
           </a:p>
           <a:p>
             <a:pPr lvl="4"/>
             <a:r>
-              <a:rPr lang="en-US" smtClean="0"/>
+              <a:rPr lang="en-US"/>
               <a:t>Fifth level</a:t>
             </a:r>
             <a:endParaRPr lang="en-US" dirty="0"/>
@@ -7171,7 +7171,7 @@
           <a:p>
             <a:fld id="{B9BA6063-779C-4BB6-8BC7-C5993206073F}" type="datetimeFigureOut">
               <a:rPr lang="sr-Latn-CS" smtClean="0"/>
-              <a:t>10.11.2017.</a:t>
+              <a:t>27.4.2018.</a:t>
             </a:fld>
             <a:endParaRPr lang="sr-Latn-CS"/>
           </a:p>
@@ -7265,7 +7265,7 @@
           <a:lstStyle/>
           <a:p>
             <a:r>
-              <a:rPr lang="en-US" smtClean="0"/>
+              <a:rPr lang="en-US"/>
               <a:t>Click to edit Master title style</a:t>
             </a:r>
             <a:endParaRPr lang="en-US" dirty="0"/>
@@ -7289,35 +7289,35 @@
           <a:p>
             <a:pPr lvl="0"/>
             <a:r>
-              <a:rPr lang="en-US" smtClean="0"/>
+              <a:rPr lang="en-US"/>
               <a:t>Edit Master text styles</a:t>
             </a:r>
           </a:p>
           <a:p>
             <a:pPr lvl="1"/>
             <a:r>
-              <a:rPr lang="en-US" smtClean="0"/>
+              <a:rPr lang="en-US"/>
               <a:t>Second level</a:t>
             </a:r>
           </a:p>
           <a:p>
             <a:pPr lvl="2"/>
             <a:r>
-              <a:rPr lang="en-US" smtClean="0"/>
+              <a:rPr lang="en-US"/>
               <a:t>Third level</a:t>
             </a:r>
           </a:p>
           <a:p>
             <a:pPr lvl="3"/>
             <a:r>
-              <a:rPr lang="en-US" smtClean="0"/>
+              <a:rPr lang="en-US"/>
               <a:t>Fourth level</a:t>
             </a:r>
           </a:p>
           <a:p>
             <a:pPr lvl="4"/>
             <a:r>
-              <a:rPr lang="en-US" smtClean="0"/>
+              <a:rPr lang="en-US"/>
               <a:t>Fifth level</a:t>
             </a:r>
             <a:endParaRPr lang="en-US" dirty="0"/>
@@ -7341,7 +7341,7 @@
           <a:p>
             <a:fld id="{B9BA6063-779C-4BB6-8BC7-C5993206073F}" type="datetimeFigureOut">
               <a:rPr lang="sr-Latn-CS" smtClean="0"/>
-              <a:t>10.11.2017.</a:t>
+              <a:t>27.4.2018.</a:t>
             </a:fld>
             <a:endParaRPr lang="sr-Latn-CS"/>
           </a:p>
@@ -7446,7 +7446,7 @@
           </a:lstStyle>
           <a:p>
             <a:r>
-              <a:rPr lang="en-US" smtClean="0"/>
+              <a:rPr lang="en-US"/>
               <a:t>Click to edit Master title style</a:t>
             </a:r>
             <a:endParaRPr lang="en-US" dirty="0"/>
@@ -7568,7 +7568,7 @@
           <a:p>
             <a:pPr lvl="0"/>
             <a:r>
-              <a:rPr lang="en-US" smtClean="0"/>
+              <a:rPr lang="en-US"/>
               <a:t>Edit Master text styles</a:t>
             </a:r>
           </a:p>
@@ -7591,7 +7591,7 @@
           <a:p>
             <a:fld id="{B9BA6063-779C-4BB6-8BC7-C5993206073F}" type="datetimeFigureOut">
               <a:rPr lang="sr-Latn-CS" smtClean="0"/>
-              <a:t>10.11.2017.</a:t>
+              <a:t>27.4.2018.</a:t>
             </a:fld>
             <a:endParaRPr lang="sr-Latn-CS"/>
           </a:p>
@@ -7685,7 +7685,7 @@
           <a:lstStyle/>
           <a:p>
             <a:r>
-              <a:rPr lang="en-US" smtClean="0"/>
+              <a:rPr lang="en-US"/>
               <a:t>Click to edit Master title style</a:t>
             </a:r>
             <a:endParaRPr lang="en-US" dirty="0"/>
@@ -7714,35 +7714,35 @@
           <a:p>
             <a:pPr lvl="0"/>
             <a:r>
-              <a:rPr lang="en-US" smtClean="0"/>
+              <a:rPr lang="en-US"/>
               <a:t>Edit Master text styles</a:t>
             </a:r>
           </a:p>
           <a:p>
             <a:pPr lvl="1"/>
             <a:r>
-              <a:rPr lang="en-US" smtClean="0"/>
+              <a:rPr lang="en-US"/>
               <a:t>Second level</a:t>
             </a:r>
           </a:p>
           <a:p>
             <a:pPr lvl="2"/>
             <a:r>
-              <a:rPr lang="en-US" smtClean="0"/>
+              <a:rPr lang="en-US"/>
               <a:t>Third level</a:t>
             </a:r>
           </a:p>
           <a:p>
             <a:pPr lvl="3"/>
             <a:r>
-              <a:rPr lang="en-US" smtClean="0"/>
+              <a:rPr lang="en-US"/>
               <a:t>Fourth level</a:t>
             </a:r>
           </a:p>
           <a:p>
             <a:pPr lvl="4"/>
             <a:r>
-              <a:rPr lang="en-US" smtClean="0"/>
+              <a:rPr lang="en-US"/>
               <a:t>Fifth level</a:t>
             </a:r>
             <a:endParaRPr lang="en-US" dirty="0"/>
@@ -7771,35 +7771,35 @@
           <a:p>
             <a:pPr lvl="0"/>
             <a:r>
-              <a:rPr lang="en-US" smtClean="0"/>
+              <a:rPr lang="en-US"/>
               <a:t>Edit Master text styles</a:t>
             </a:r>
           </a:p>
           <a:p>
             <a:pPr lvl="1"/>
             <a:r>
-              <a:rPr lang="en-US" smtClean="0"/>
+              <a:rPr lang="en-US"/>
               <a:t>Second level</a:t>
             </a:r>
           </a:p>
           <a:p>
             <a:pPr lvl="2"/>
             <a:r>
-              <a:rPr lang="en-US" smtClean="0"/>
+              <a:rPr lang="en-US"/>
               <a:t>Third level</a:t>
             </a:r>
           </a:p>
           <a:p>
             <a:pPr lvl="3"/>
             <a:r>
-              <a:rPr lang="en-US" smtClean="0"/>
+              <a:rPr lang="en-US"/>
               <a:t>Fourth level</a:t>
             </a:r>
           </a:p>
           <a:p>
             <a:pPr lvl="4"/>
             <a:r>
-              <a:rPr lang="en-US" smtClean="0"/>
+              <a:rPr lang="en-US"/>
               <a:t>Fifth level</a:t>
             </a:r>
             <a:endParaRPr lang="en-US" dirty="0"/>
@@ -7823,7 +7823,7 @@
           <a:p>
             <a:fld id="{B9BA6063-779C-4BB6-8BC7-C5993206073F}" type="datetimeFigureOut">
               <a:rPr lang="sr-Latn-CS" smtClean="0"/>
-              <a:t>10.11.2017.</a:t>
+              <a:t>27.4.2018.</a:t>
             </a:fld>
             <a:endParaRPr lang="sr-Latn-CS"/>
           </a:p>
@@ -7922,7 +7922,7 @@
           <a:lstStyle/>
           <a:p>
             <a:r>
-              <a:rPr lang="en-US" smtClean="0"/>
+              <a:rPr lang="en-US"/>
               <a:t>Click to edit Master title style</a:t>
             </a:r>
             <a:endParaRPr lang="en-US" dirty="0"/>
@@ -7995,7 +7995,7 @@
           <a:p>
             <a:pPr lvl="0"/>
             <a:r>
-              <a:rPr lang="en-US" smtClean="0"/>
+              <a:rPr lang="en-US"/>
               <a:t>Edit Master text styles</a:t>
             </a:r>
           </a:p>
@@ -8023,35 +8023,35 @@
           <a:p>
             <a:pPr lvl="0"/>
             <a:r>
-              <a:rPr lang="en-US" smtClean="0"/>
+              <a:rPr lang="en-US"/>
               <a:t>Edit Master text styles</a:t>
             </a:r>
           </a:p>
           <a:p>
             <a:pPr lvl="1"/>
             <a:r>
-              <a:rPr lang="en-US" smtClean="0"/>
+              <a:rPr lang="en-US"/>
               <a:t>Second level</a:t>
             </a:r>
           </a:p>
           <a:p>
             <a:pPr lvl="2"/>
             <a:r>
-              <a:rPr lang="en-US" smtClean="0"/>
+              <a:rPr lang="en-US"/>
               <a:t>Third level</a:t>
             </a:r>
           </a:p>
           <a:p>
             <a:pPr lvl="3"/>
             <a:r>
-              <a:rPr lang="en-US" smtClean="0"/>
+              <a:rPr lang="en-US"/>
               <a:t>Fourth level</a:t>
             </a:r>
           </a:p>
           <a:p>
             <a:pPr lvl="4"/>
             <a:r>
-              <a:rPr lang="en-US" smtClean="0"/>
+              <a:rPr lang="en-US"/>
               <a:t>Fifth level</a:t>
             </a:r>
             <a:endParaRPr lang="en-US" dirty="0"/>
@@ -8124,7 +8124,7 @@
           <a:p>
             <a:pPr lvl="0"/>
             <a:r>
-              <a:rPr lang="en-US" smtClean="0"/>
+              <a:rPr lang="en-US"/>
               <a:t>Edit Master text styles</a:t>
             </a:r>
           </a:p>
@@ -8152,35 +8152,35 @@
           <a:p>
             <a:pPr lvl="0"/>
             <a:r>
-              <a:rPr lang="en-US" smtClean="0"/>
+              <a:rPr lang="en-US"/>
               <a:t>Edit Master text styles</a:t>
             </a:r>
           </a:p>
           <a:p>
             <a:pPr lvl="1"/>
             <a:r>
-              <a:rPr lang="en-US" smtClean="0"/>
+              <a:rPr lang="en-US"/>
               <a:t>Second level</a:t>
             </a:r>
           </a:p>
           <a:p>
             <a:pPr lvl="2"/>
             <a:r>
-              <a:rPr lang="en-US" smtClean="0"/>
+              <a:rPr lang="en-US"/>
               <a:t>Third level</a:t>
             </a:r>
           </a:p>
           <a:p>
             <a:pPr lvl="3"/>
             <a:r>
-              <a:rPr lang="en-US" smtClean="0"/>
+              <a:rPr lang="en-US"/>
               <a:t>Fourth level</a:t>
             </a:r>
           </a:p>
           <a:p>
             <a:pPr lvl="4"/>
             <a:r>
-              <a:rPr lang="en-US" smtClean="0"/>
+              <a:rPr lang="en-US"/>
               <a:t>Fifth level</a:t>
             </a:r>
             <a:endParaRPr lang="en-US" dirty="0"/>
@@ -8204,7 +8204,7 @@
           <a:p>
             <a:fld id="{B9BA6063-779C-4BB6-8BC7-C5993206073F}" type="datetimeFigureOut">
               <a:rPr lang="sr-Latn-CS" smtClean="0"/>
-              <a:t>10.11.2017.</a:t>
+              <a:t>27.4.2018.</a:t>
             </a:fld>
             <a:endParaRPr lang="sr-Latn-CS"/>
           </a:p>
@@ -8298,7 +8298,7 @@
           <a:lstStyle/>
           <a:p>
             <a:r>
-              <a:rPr lang="en-US" smtClean="0"/>
+              <a:rPr lang="en-US"/>
               <a:t>Click to edit Master title style</a:t>
             </a:r>
             <a:endParaRPr lang="en-US" dirty="0"/>
@@ -8322,7 +8322,7 @@
           <a:p>
             <a:fld id="{B9BA6063-779C-4BB6-8BC7-C5993206073F}" type="datetimeFigureOut">
               <a:rPr lang="sr-Latn-CS" smtClean="0"/>
-              <a:t>10.11.2017.</a:t>
+              <a:t>27.4.2018.</a:t>
             </a:fld>
             <a:endParaRPr lang="sr-Latn-CS"/>
           </a:p>
@@ -8417,7 +8417,7 @@
           <a:p>
             <a:fld id="{B9BA6063-779C-4BB6-8BC7-C5993206073F}" type="datetimeFigureOut">
               <a:rPr lang="sr-Latn-CS" smtClean="0"/>
-              <a:t>10.11.2017.</a:t>
+              <a:t>27.4.2018.</a:t>
             </a:fld>
             <a:endParaRPr lang="sr-Latn-CS"/>
           </a:p>
@@ -8520,7 +8520,7 @@
           </a:lstStyle>
           <a:p>
             <a:r>
-              <a:rPr lang="en-US" smtClean="0"/>
+              <a:rPr lang="en-US"/>
               <a:t>Click to edit Master title style</a:t>
             </a:r>
             <a:endParaRPr lang="en-US" dirty="0"/>
@@ -8549,35 +8549,35 @@
           <a:p>
             <a:pPr lvl="0"/>
             <a:r>
-              <a:rPr lang="en-US" smtClean="0"/>
+              <a:rPr lang="en-US"/>
               <a:t>Edit Master text styles</a:t>
             </a:r>
           </a:p>
           <a:p>
             <a:pPr lvl="1"/>
             <a:r>
-              <a:rPr lang="en-US" smtClean="0"/>
+              <a:rPr lang="en-US"/>
               <a:t>Second level</a:t>
             </a:r>
           </a:p>
           <a:p>
             <a:pPr lvl="2"/>
             <a:r>
-              <a:rPr lang="en-US" smtClean="0"/>
+              <a:rPr lang="en-US"/>
               <a:t>Third level</a:t>
             </a:r>
           </a:p>
           <a:p>
             <a:pPr lvl="3"/>
             <a:r>
-              <a:rPr lang="en-US" smtClean="0"/>
+              <a:rPr lang="en-US"/>
               <a:t>Fourth level</a:t>
             </a:r>
           </a:p>
           <a:p>
             <a:pPr lvl="4"/>
             <a:r>
-              <a:rPr lang="en-US" smtClean="0"/>
+              <a:rPr lang="en-US"/>
               <a:t>Fifth level</a:t>
             </a:r>
             <a:endParaRPr lang="en-US" dirty="0"/>
@@ -8643,7 +8643,7 @@
           <a:p>
             <a:pPr lvl="0"/>
             <a:r>
-              <a:rPr lang="en-US" smtClean="0"/>
+              <a:rPr lang="en-US"/>
               <a:t>Edit Master text styles</a:t>
             </a:r>
           </a:p>
@@ -8666,7 +8666,7 @@
           <a:p>
             <a:fld id="{B9BA6063-779C-4BB6-8BC7-C5993206073F}" type="datetimeFigureOut">
               <a:rPr lang="sr-Latn-CS" smtClean="0"/>
-              <a:t>10.11.2017.</a:t>
+              <a:t>27.4.2018.</a:t>
             </a:fld>
             <a:endParaRPr lang="sr-Latn-CS"/>
           </a:p>
@@ -8769,7 +8769,7 @@
           </a:lstStyle>
           <a:p>
             <a:r>
-              <a:rPr lang="en-US" smtClean="0"/>
+              <a:rPr lang="en-US"/>
               <a:t>Click to edit Master title style</a:t>
             </a:r>
             <a:endParaRPr lang="en-US" dirty="0"/>
@@ -8857,7 +8857,7 @@
           </a:lstStyle>
           <a:p>
             <a:r>
-              <a:rPr lang="en-US" smtClean="0"/>
+              <a:rPr lang="en-US"/>
               <a:t>Click icon to add picture</a:t>
             </a:r>
             <a:endParaRPr lang="en-US" dirty="0"/>
@@ -8923,7 +8923,7 @@
           <a:p>
             <a:pPr lvl="0"/>
             <a:r>
-              <a:rPr lang="en-US" smtClean="0"/>
+              <a:rPr lang="en-US"/>
               <a:t>Edit Master text styles</a:t>
             </a:r>
           </a:p>
@@ -8946,7 +8946,7 @@
           <a:p>
             <a:fld id="{B9BA6063-779C-4BB6-8BC7-C5993206073F}" type="datetimeFigureOut">
               <a:rPr lang="sr-Latn-CS" smtClean="0"/>
-              <a:t>10.11.2017.</a:t>
+              <a:t>27.4.2018.</a:t>
             </a:fld>
             <a:endParaRPr lang="sr-Latn-CS"/>
           </a:p>
@@ -9062,7 +9062,7 @@
           <a:noFill/>
           <a:extLst>
             <a:ext uri="{909E8E84-426E-40dd-AFC4-6F175D3DCCD1}">
-              <a14:hiddenFill xmlns="" xmlns:a14="http://schemas.microsoft.com/office/drawing/2010/main">
+              <a14:hiddenFill xmlns:a14="http://schemas.microsoft.com/office/drawing/2010/main" xmlns="">
                 <a:solidFill>
                   <a:srgbClr val="FFFFFF"/>
                 </a:solidFill>
@@ -9136,7 +9136,7 @@
               </a:ln>
               <a:extLst>
                 <a:ext uri="{91240B29-F687-4f45-9708-019B960494DF}">
-                  <a14:hiddenLine xmlns="" xmlns:a14="http://schemas.microsoft.com/office/drawing/2010/main" w="9525">
+                  <a14:hiddenLine xmlns:a14="http://schemas.microsoft.com/office/drawing/2010/main" xmlns="" w="9525">
                     <a:solidFill>
                       <a:srgbClr val="000000"/>
                     </a:solidFill>
@@ -9226,7 +9226,7 @@
               </a:ln>
               <a:extLst>
                 <a:ext uri="{91240B29-F687-4f45-9708-019B960494DF}">
-                  <a14:hiddenLine xmlns="" xmlns:a14="http://schemas.microsoft.com/office/drawing/2010/main" w="9525">
+                  <a14:hiddenLine xmlns:a14="http://schemas.microsoft.com/office/drawing/2010/main" xmlns="" w="9525">
                     <a:solidFill>
                       <a:srgbClr val="000000"/>
                     </a:solidFill>
@@ -9316,7 +9316,7 @@
               </a:ln>
               <a:extLst>
                 <a:ext uri="{91240B29-F687-4f45-9708-019B960494DF}">
-                  <a14:hiddenLine xmlns="" xmlns:a14="http://schemas.microsoft.com/office/drawing/2010/main" w="9525">
+                  <a14:hiddenLine xmlns:a14="http://schemas.microsoft.com/office/drawing/2010/main" xmlns="" w="9525">
                     <a:solidFill>
                       <a:srgbClr val="000000"/>
                     </a:solidFill>
@@ -9378,7 +9378,7 @@
               </a:ln>
               <a:extLst>
                 <a:ext uri="{91240B29-F687-4f45-9708-019B960494DF}">
-                  <a14:hiddenLine xmlns="" xmlns:a14="http://schemas.microsoft.com/office/drawing/2010/main" w="9525">
+                  <a14:hiddenLine xmlns:a14="http://schemas.microsoft.com/office/drawing/2010/main" xmlns="" w="9525">
                     <a:solidFill>
                       <a:srgbClr val="000000"/>
                     </a:solidFill>
@@ -9468,7 +9468,7 @@
               </a:ln>
               <a:extLst>
                 <a:ext uri="{91240B29-F687-4f45-9708-019B960494DF}">
-                  <a14:hiddenLine xmlns="" xmlns:a14="http://schemas.microsoft.com/office/drawing/2010/main" w="9525">
+                  <a14:hiddenLine xmlns:a14="http://schemas.microsoft.com/office/drawing/2010/main" xmlns="" w="9525">
                     <a:solidFill>
                       <a:srgbClr val="000000"/>
                     </a:solidFill>
@@ -9530,7 +9530,7 @@
               </a:ln>
               <a:extLst>
                 <a:ext uri="{91240B29-F687-4f45-9708-019B960494DF}">
-                  <a14:hiddenLine xmlns="" xmlns:a14="http://schemas.microsoft.com/office/drawing/2010/main" w="9525">
+                  <a14:hiddenLine xmlns:a14="http://schemas.microsoft.com/office/drawing/2010/main" xmlns="" w="9525">
                     <a:solidFill>
                       <a:srgbClr val="000000"/>
                     </a:solidFill>
@@ -9592,7 +9592,7 @@
               </a:ln>
               <a:extLst>
                 <a:ext uri="{91240B29-F687-4f45-9708-019B960494DF}">
-                  <a14:hiddenLine xmlns="" xmlns:a14="http://schemas.microsoft.com/office/drawing/2010/main" w="9525">
+                  <a14:hiddenLine xmlns:a14="http://schemas.microsoft.com/office/drawing/2010/main" xmlns="" w="9525">
                     <a:solidFill>
                       <a:srgbClr val="000000"/>
                     </a:solidFill>
@@ -9682,7 +9682,7 @@
               </a:ln>
               <a:extLst>
                 <a:ext uri="{91240B29-F687-4f45-9708-019B960494DF}">
-                  <a14:hiddenLine xmlns="" xmlns:a14="http://schemas.microsoft.com/office/drawing/2010/main" w="9525">
+                  <a14:hiddenLine xmlns:a14="http://schemas.microsoft.com/office/drawing/2010/main" xmlns="" w="9525">
                     <a:solidFill>
                       <a:srgbClr val="000000"/>
                     </a:solidFill>
@@ -9772,7 +9772,7 @@
               </a:ln>
               <a:extLst>
                 <a:ext uri="{91240B29-F687-4f45-9708-019B960494DF}">
-                  <a14:hiddenLine xmlns="" xmlns:a14="http://schemas.microsoft.com/office/drawing/2010/main" w="9525">
+                  <a14:hiddenLine xmlns:a14="http://schemas.microsoft.com/office/drawing/2010/main" xmlns="" w="9525">
                     <a:solidFill>
                       <a:srgbClr val="000000"/>
                     </a:solidFill>
@@ -9834,7 +9834,7 @@
               </a:ln>
               <a:extLst>
                 <a:ext uri="{91240B29-F687-4f45-9708-019B960494DF}">
-                  <a14:hiddenLine xmlns="" xmlns:a14="http://schemas.microsoft.com/office/drawing/2010/main" w="9525">
+                  <a14:hiddenLine xmlns:a14="http://schemas.microsoft.com/office/drawing/2010/main" xmlns="" w="9525">
                     <a:solidFill>
                       <a:srgbClr val="000000"/>
                     </a:solidFill>
@@ -9944,7 +9944,7 @@
               </a:ln>
               <a:extLst>
                 <a:ext uri="{91240B29-F687-4f45-9708-019B960494DF}">
-                  <a14:hiddenLine xmlns="" xmlns:a14="http://schemas.microsoft.com/office/drawing/2010/main" w="9525">
+                  <a14:hiddenLine xmlns:a14="http://schemas.microsoft.com/office/drawing/2010/main" xmlns="" w="9525">
                     <a:solidFill>
                       <a:srgbClr val="000000"/>
                     </a:solidFill>
@@ -10028,7 +10028,7 @@
               </a:ln>
               <a:extLst>
                 <a:ext uri="{91240B29-F687-4f45-9708-019B960494DF}">
-                  <a14:hiddenLine xmlns="" xmlns:a14="http://schemas.microsoft.com/office/drawing/2010/main" w="9525">
+                  <a14:hiddenLine xmlns:a14="http://schemas.microsoft.com/office/drawing/2010/main" xmlns="" w="9525">
                     <a:solidFill>
                       <a:srgbClr val="000000"/>
                     </a:solidFill>
@@ -10090,7 +10090,7 @@
               </a:ln>
               <a:extLst>
                 <a:ext uri="{91240B29-F687-4f45-9708-019B960494DF}">
-                  <a14:hiddenLine xmlns="" xmlns:a14="http://schemas.microsoft.com/office/drawing/2010/main" w="9525">
+                  <a14:hiddenLine xmlns:a14="http://schemas.microsoft.com/office/drawing/2010/main" xmlns="" w="9525">
                     <a:solidFill>
                       <a:srgbClr val="000000"/>
                     </a:solidFill>
@@ -10152,7 +10152,7 @@
               </a:ln>
               <a:extLst>
                 <a:ext uri="{91240B29-F687-4f45-9708-019B960494DF}">
-                  <a14:hiddenLine xmlns="" xmlns:a14="http://schemas.microsoft.com/office/drawing/2010/main" w="9525">
+                  <a14:hiddenLine xmlns:a14="http://schemas.microsoft.com/office/drawing/2010/main" xmlns="" w="9525">
                     <a:solidFill>
                       <a:srgbClr val="000000"/>
                     </a:solidFill>
@@ -10242,7 +10242,7 @@
               </a:ln>
               <a:extLst>
                 <a:ext uri="{91240B29-F687-4f45-9708-019B960494DF}">
-                  <a14:hiddenLine xmlns="" xmlns:a14="http://schemas.microsoft.com/office/drawing/2010/main" w="9525">
+                  <a14:hiddenLine xmlns:a14="http://schemas.microsoft.com/office/drawing/2010/main" xmlns="" w="9525">
                     <a:solidFill>
                       <a:srgbClr val="000000"/>
                     </a:solidFill>
@@ -10276,7 +10276,7 @@
               </a:ln>
               <a:extLst>
                 <a:ext uri="{91240B29-F687-4f45-9708-019B960494DF}">
-                  <a14:hiddenLine xmlns="" xmlns:a14="http://schemas.microsoft.com/office/drawing/2010/main" w="9525">
+                  <a14:hiddenLine xmlns:a14="http://schemas.microsoft.com/office/drawing/2010/main" xmlns="" w="9525">
                     <a:solidFill>
                       <a:srgbClr val="000000"/>
                     </a:solidFill>
@@ -10341,7 +10341,7 @@
               </a:ln>
               <a:extLst>
                 <a:ext uri="{91240B29-F687-4f45-9708-019B960494DF}">
-                  <a14:hiddenLine xmlns="" xmlns:a14="http://schemas.microsoft.com/office/drawing/2010/main" w="9525">
+                  <a14:hiddenLine xmlns:a14="http://schemas.microsoft.com/office/drawing/2010/main" xmlns="" w="9525">
                     <a:solidFill>
                       <a:srgbClr val="000000"/>
                     </a:solidFill>
@@ -10431,7 +10431,7 @@
               </a:ln>
               <a:extLst>
                 <a:ext uri="{91240B29-F687-4f45-9708-019B960494DF}">
-                  <a14:hiddenLine xmlns="" xmlns:a14="http://schemas.microsoft.com/office/drawing/2010/main" w="9525">
+                  <a14:hiddenLine xmlns:a14="http://schemas.microsoft.com/office/drawing/2010/main" xmlns="" w="9525">
                     <a:solidFill>
                       <a:srgbClr val="000000"/>
                     </a:solidFill>
@@ -10493,7 +10493,7 @@
               </a:ln>
               <a:extLst>
                 <a:ext uri="{91240B29-F687-4f45-9708-019B960494DF}">
-                  <a14:hiddenLine xmlns="" xmlns:a14="http://schemas.microsoft.com/office/drawing/2010/main" w="9525">
+                  <a14:hiddenLine xmlns:a14="http://schemas.microsoft.com/office/drawing/2010/main" xmlns="" w="9525">
                     <a:solidFill>
                       <a:srgbClr val="000000"/>
                     </a:solidFill>
@@ -10583,7 +10583,7 @@
               </a:ln>
               <a:extLst>
                 <a:ext uri="{91240B29-F687-4f45-9708-019B960494DF}">
-                  <a14:hiddenLine xmlns="" xmlns:a14="http://schemas.microsoft.com/office/drawing/2010/main" w="9525">
+                  <a14:hiddenLine xmlns:a14="http://schemas.microsoft.com/office/drawing/2010/main" xmlns="" w="9525">
                     <a:solidFill>
                       <a:srgbClr val="000000"/>
                     </a:solidFill>
@@ -10648,7 +10648,7 @@
               </a:ln>
               <a:extLst>
                 <a:ext uri="{91240B29-F687-4f45-9708-019B960494DF}">
-                  <a14:hiddenLine xmlns="" xmlns:a14="http://schemas.microsoft.com/office/drawing/2010/main" w="9525">
+                  <a14:hiddenLine xmlns:a14="http://schemas.microsoft.com/office/drawing/2010/main" xmlns="" w="9525">
                     <a:solidFill>
                       <a:srgbClr val="000000"/>
                     </a:solidFill>
@@ -10710,7 +10710,7 @@
               </a:ln>
               <a:extLst>
                 <a:ext uri="{91240B29-F687-4f45-9708-019B960494DF}">
-                  <a14:hiddenLine xmlns="" xmlns:a14="http://schemas.microsoft.com/office/drawing/2010/main" w="9525">
+                  <a14:hiddenLine xmlns:a14="http://schemas.microsoft.com/office/drawing/2010/main" xmlns="" w="9525">
                     <a:solidFill>
                       <a:srgbClr val="000000"/>
                     </a:solidFill>
@@ -10800,7 +10800,7 @@
               </a:ln>
               <a:extLst>
                 <a:ext uri="{91240B29-F687-4f45-9708-019B960494DF}">
-                  <a14:hiddenLine xmlns="" xmlns:a14="http://schemas.microsoft.com/office/drawing/2010/main" w="9525">
+                  <a14:hiddenLine xmlns:a14="http://schemas.microsoft.com/office/drawing/2010/main" xmlns="" w="9525">
                     <a:solidFill>
                       <a:srgbClr val="000000"/>
                     </a:solidFill>
@@ -10890,7 +10890,7 @@
               </a:ln>
               <a:extLst>
                 <a:ext uri="{91240B29-F687-4f45-9708-019B960494DF}">
-                  <a14:hiddenLine xmlns="" xmlns:a14="http://schemas.microsoft.com/office/drawing/2010/main" w="9525">
+                  <a14:hiddenLine xmlns:a14="http://schemas.microsoft.com/office/drawing/2010/main" xmlns="" w="9525">
                     <a:solidFill>
                       <a:srgbClr val="000000"/>
                     </a:solidFill>
@@ -10955,7 +10955,7 @@
               </a:ln>
               <a:extLst>
                 <a:ext uri="{91240B29-F687-4f45-9708-019B960494DF}">
-                  <a14:hiddenLine xmlns="" xmlns:a14="http://schemas.microsoft.com/office/drawing/2010/main" w="9525">
+                  <a14:hiddenLine xmlns:a14="http://schemas.microsoft.com/office/drawing/2010/main" xmlns="" w="9525">
                     <a:solidFill>
                       <a:srgbClr val="000000"/>
                     </a:solidFill>
@@ -11075,7 +11075,7 @@
               </a:ln>
               <a:extLst>
                 <a:ext uri="{91240B29-F687-4f45-9708-019B960494DF}">
-                  <a14:hiddenLine xmlns="" xmlns:a14="http://schemas.microsoft.com/office/drawing/2010/main" w="9525">
+                  <a14:hiddenLine xmlns:a14="http://schemas.microsoft.com/office/drawing/2010/main" xmlns="" w="9525">
                     <a:solidFill>
                       <a:srgbClr val="000000"/>
                     </a:solidFill>
@@ -11173,7 +11173,7 @@
               </a:ln>
               <a:extLst>
                 <a:ext uri="{91240B29-F687-4f45-9708-019B960494DF}">
-                  <a14:hiddenLine xmlns="" xmlns:a14="http://schemas.microsoft.com/office/drawing/2010/main" w="9525">
+                  <a14:hiddenLine xmlns:a14="http://schemas.microsoft.com/office/drawing/2010/main" xmlns="" w="9525">
                     <a:solidFill>
                       <a:srgbClr val="000000"/>
                     </a:solidFill>
@@ -11288,7 +11288,7 @@
               </a:ln>
               <a:extLst>
                 <a:ext uri="{91240B29-F687-4f45-9708-019B960494DF}">
-                  <a14:hiddenLine xmlns="" xmlns:a14="http://schemas.microsoft.com/office/drawing/2010/main" w="9525">
+                  <a14:hiddenLine xmlns:a14="http://schemas.microsoft.com/office/drawing/2010/main" xmlns="" w="9525">
                     <a:solidFill>
                       <a:srgbClr val="000000"/>
                     </a:solidFill>
@@ -11378,7 +11378,7 @@
               </a:ln>
               <a:extLst>
                 <a:ext uri="{91240B29-F687-4f45-9708-019B960494DF}">
-                  <a14:hiddenLine xmlns="" xmlns:a14="http://schemas.microsoft.com/office/drawing/2010/main" w="9525">
+                  <a14:hiddenLine xmlns:a14="http://schemas.microsoft.com/office/drawing/2010/main" xmlns="" w="9525">
                     <a:solidFill>
                       <a:srgbClr val="000000"/>
                     </a:solidFill>
@@ -11443,7 +11443,7 @@
               </a:ln>
               <a:extLst>
                 <a:ext uri="{91240B29-F687-4f45-9708-019B960494DF}">
-                  <a14:hiddenLine xmlns="" xmlns:a14="http://schemas.microsoft.com/office/drawing/2010/main" w="9525">
+                  <a14:hiddenLine xmlns:a14="http://schemas.microsoft.com/office/drawing/2010/main" xmlns="" w="9525">
                     <a:solidFill>
                       <a:srgbClr val="000000"/>
                     </a:solidFill>
@@ -11533,7 +11533,7 @@
               </a:ln>
               <a:extLst>
                 <a:ext uri="{91240B29-F687-4f45-9708-019B960494DF}">
-                  <a14:hiddenLine xmlns="" xmlns:a14="http://schemas.microsoft.com/office/drawing/2010/main" w="9525">
+                  <a14:hiddenLine xmlns:a14="http://schemas.microsoft.com/office/drawing/2010/main" xmlns="" w="9525">
                     <a:solidFill>
                       <a:srgbClr val="000000"/>
                     </a:solidFill>
@@ -11601,7 +11601,7 @@
               </a:ln>
               <a:extLst>
                 <a:ext uri="{91240B29-F687-4f45-9708-019B960494DF}">
-                  <a14:hiddenLine xmlns="" xmlns:a14="http://schemas.microsoft.com/office/drawing/2010/main" w="9525">
+                  <a14:hiddenLine xmlns:a14="http://schemas.microsoft.com/office/drawing/2010/main" xmlns="" w="9525">
                     <a:solidFill>
                       <a:srgbClr val="000000"/>
                     </a:solidFill>
@@ -11691,7 +11691,7 @@
               </a:ln>
               <a:extLst>
                 <a:ext uri="{91240B29-F687-4f45-9708-019B960494DF}">
-                  <a14:hiddenLine xmlns="" xmlns:a14="http://schemas.microsoft.com/office/drawing/2010/main" w="9525">
+                  <a14:hiddenLine xmlns:a14="http://schemas.microsoft.com/office/drawing/2010/main" xmlns="" w="9525">
                     <a:solidFill>
                       <a:srgbClr val="000000"/>
                     </a:solidFill>
@@ -11759,7 +11759,7 @@
               </a:ln>
               <a:extLst>
                 <a:ext uri="{91240B29-F687-4f45-9708-019B960494DF}">
-                  <a14:hiddenLine xmlns="" xmlns:a14="http://schemas.microsoft.com/office/drawing/2010/main" w="9525">
+                  <a14:hiddenLine xmlns:a14="http://schemas.microsoft.com/office/drawing/2010/main" xmlns="" w="9525">
                     <a:solidFill>
                       <a:srgbClr val="000000"/>
                     </a:solidFill>
@@ -11849,7 +11849,7 @@
               </a:ln>
               <a:extLst>
                 <a:ext uri="{91240B29-F687-4f45-9708-019B960494DF}">
-                  <a14:hiddenLine xmlns="" xmlns:a14="http://schemas.microsoft.com/office/drawing/2010/main" w="9525">
+                  <a14:hiddenLine xmlns:a14="http://schemas.microsoft.com/office/drawing/2010/main" xmlns="" w="9525">
                     <a:solidFill>
                       <a:srgbClr val="000000"/>
                     </a:solidFill>
@@ -11883,7 +11883,7 @@
               </a:ln>
               <a:extLst>
                 <a:ext uri="{91240B29-F687-4f45-9708-019B960494DF}">
-                  <a14:hiddenLine xmlns="" xmlns:a14="http://schemas.microsoft.com/office/drawing/2010/main" w="9525">
+                  <a14:hiddenLine xmlns:a14="http://schemas.microsoft.com/office/drawing/2010/main" xmlns="" w="9525">
                     <a:solidFill>
                       <a:srgbClr val="000000"/>
                     </a:solidFill>
@@ -11953,35 +11953,35 @@
           <a:p>
             <a:pPr lvl="0"/>
             <a:r>
-              <a:rPr lang="en-US" smtClean="0"/>
+              <a:rPr lang="en-US"/>
               <a:t>Edit Master text styles</a:t>
             </a:r>
           </a:p>
           <a:p>
             <a:pPr lvl="1"/>
             <a:r>
-              <a:rPr lang="en-US" smtClean="0"/>
+              <a:rPr lang="en-US"/>
               <a:t>Second level</a:t>
             </a:r>
           </a:p>
           <a:p>
             <a:pPr lvl="2"/>
             <a:r>
-              <a:rPr lang="en-US" smtClean="0"/>
+              <a:rPr lang="en-US"/>
               <a:t>Third level</a:t>
             </a:r>
           </a:p>
           <a:p>
             <a:pPr lvl="3"/>
             <a:r>
-              <a:rPr lang="en-US" smtClean="0"/>
+              <a:rPr lang="en-US"/>
               <a:t>Fourth level</a:t>
             </a:r>
           </a:p>
           <a:p>
             <a:pPr lvl="4"/>
             <a:r>
-              <a:rPr lang="en-US" smtClean="0"/>
+              <a:rPr lang="en-US"/>
               <a:t>Fifth level</a:t>
             </a:r>
             <a:endParaRPr lang="en-US" dirty="0"/>
@@ -12023,7 +12023,7 @@
           <a:p>
             <a:fld id="{B9BA6063-779C-4BB6-8BC7-C5993206073F}" type="datetimeFigureOut">
               <a:rPr lang="sr-Latn-CS" smtClean="0"/>
-              <a:t>10.11.2017.</a:t>
+              <a:t>27.4.2018.</a:t>
             </a:fld>
             <a:endParaRPr lang="sr-Latn-CS"/>
           </a:p>
@@ -12459,7 +12459,7 @@
           <a:lstStyle/>
           <a:p>
             <a:r>
-              <a:rPr lang="en-US" dirty="0" smtClean="0"/>
+              <a:rPr lang="en-US" dirty="0"/>
               <a:t>Security Basics	</a:t>
             </a:r>
             <a:endParaRPr lang="sr-Latn-CS" dirty="0"/>
@@ -12482,7 +12482,7 @@
           <a:lstStyle/>
           <a:p>
             <a:r>
-              <a:rPr lang="en-US" dirty="0" smtClean="0"/>
+              <a:rPr lang="en-US" dirty="0"/>
               <a:t>Introduction</a:t>
             </a:r>
             <a:endParaRPr lang="sr-Latn-CS" dirty="0"/>
@@ -12499,13 +12499,6 @@
   <p:clrMapOvr>
     <a:masterClrMapping/>
   </p:clrMapOvr>
-  <p:timing>
-    <p:tnLst>
-      <p:par>
-        <p:cTn id="1" dur="indefinite" restart="never" nodeType="tmRoot"/>
-      </p:par>
-    </p:tnLst>
-  </p:timing>
 </p:sld>
 </file>
 
@@ -12566,7 +12559,7 @@
           <a:lstStyle/>
           <a:p>
             <a:r>
-              <a:rPr lang="en-US" dirty="0" smtClean="0"/>
+              <a:rPr lang="en-US" dirty="0"/>
               <a:t>This course was created for developers as an introduction to Web Security – concepts, flaws, solutions</a:t>
             </a:r>
           </a:p>
@@ -12575,50 +12568,45 @@
           </a:p>
           <a:p>
             <a:r>
-              <a:rPr lang="en-US" dirty="0" smtClean="0"/>
-              <a:t>Goal is to understand security flaws through practical </a:t>
-            </a:r>
-            <a:r>
-              <a:rPr lang="en-US" dirty="0" smtClean="0"/>
-              <a:t>examples </a:t>
-            </a:r>
-            <a:r>
-              <a:rPr lang="en-US" b="1" dirty="0" smtClean="0"/>
+              <a:rPr lang="en-US" dirty="0"/>
+              <a:t>Goal is to understand security flaws through practical examples </a:t>
+            </a:r>
+            <a:r>
+              <a:rPr lang="en-US" b="1" dirty="0"/>
               <a:t>in context of</a:t>
             </a:r>
             <a:r>
-              <a:rPr lang="en-US" dirty="0" smtClean="0"/>
+              <a:rPr lang="en-US" dirty="0"/>
               <a:t> the latest technologies</a:t>
             </a:r>
-            <a:endParaRPr lang="en-US" dirty="0" smtClean="0"/>
-          </a:p>
-          <a:p>
-            <a:r>
-              <a:rPr lang="en-US" dirty="0" smtClean="0"/>
+          </a:p>
+          <a:p>
+            <a:r>
+              <a:rPr lang="en-US" dirty="0"/>
               <a:t>The course covers:</a:t>
             </a:r>
           </a:p>
           <a:p>
             <a:pPr lvl="1"/>
             <a:r>
-              <a:rPr lang="en-US" dirty="0" smtClean="0"/>
+              <a:rPr lang="en-US" dirty="0"/>
               <a:t>Introduction to Security</a:t>
             </a:r>
           </a:p>
           <a:p>
             <a:pPr lvl="1"/>
             <a:r>
-              <a:rPr lang="en-US" dirty="0" smtClean="0"/>
+              <a:rPr lang="en-US" dirty="0"/>
               <a:t>OWASP Top 10 flaws and solutions</a:t>
             </a:r>
           </a:p>
           <a:p>
             <a:pPr lvl="1"/>
-            <a:endParaRPr lang="en-US" dirty="0" smtClean="0"/>
+            <a:endParaRPr lang="en-US" dirty="0"/>
           </a:p>
           <a:p>
             <a:pPr lvl="1"/>
-            <a:endParaRPr lang="en-US" dirty="0" smtClean="0"/>
+            <a:endParaRPr lang="en-US" dirty="0"/>
           </a:p>
         </p:txBody>
       </p:sp>
@@ -12632,13 +12620,6 @@
   <p:clrMapOvr>
     <a:masterClrMapping/>
   </p:clrMapOvr>
-  <p:timing>
-    <p:tnLst>
-      <p:par>
-        <p:cTn id="1" dur="indefinite" restart="never" nodeType="tmRoot"/>
-      </p:par>
-    </p:tnLst>
-  </p:timing>
 </p:sld>
 </file>
 
@@ -12675,7 +12656,7 @@
           <a:lstStyle/>
           <a:p>
             <a:r>
-              <a:rPr lang="en-US" dirty="0" smtClean="0"/>
+              <a:rPr lang="en-US" dirty="0"/>
               <a:t>Format</a:t>
             </a:r>
             <a:endParaRPr lang="sr-Latn-CS" dirty="0"/>
@@ -12703,63 +12684,33 @@
           <a:lstStyle/>
           <a:p>
             <a:r>
-              <a:rPr lang="en-US" dirty="0" smtClean="0"/>
-              <a:t>Every topic is </a:t>
-            </a:r>
-            <a:r>
-              <a:rPr lang="en-US" dirty="0" smtClean="0"/>
-              <a:t>in a </a:t>
-            </a:r>
-            <a:r>
-              <a:rPr lang="en-US" dirty="0" smtClean="0"/>
-              <a:t>separate </a:t>
-            </a:r>
-            <a:r>
-              <a:rPr lang="en-US" dirty="0" smtClean="0"/>
-              <a:t>folder </a:t>
-            </a:r>
-            <a:r>
               <a:rPr lang="en-US" dirty="0"/>
-              <a:t>(example </a:t>
-            </a:r>
-            <a:r>
-              <a:rPr lang="en-US" dirty="0" smtClean="0"/>
-              <a:t>A1-Injection)</a:t>
-            </a:r>
-            <a:endParaRPr lang="en-US" dirty="0" smtClean="0"/>
-          </a:p>
-          <a:p>
-            <a:r>
-              <a:rPr lang="en-US" dirty="0" smtClean="0"/>
+              <a:t>Every topic is in a separate folder (example A1-Injection)</a:t>
+            </a:r>
+          </a:p>
+          <a:p>
+            <a:r>
+              <a:rPr lang="en-US" dirty="0"/>
               <a:t>Latest application is located in branch </a:t>
             </a:r>
             <a:r>
-              <a:rPr lang="en-US" b="1" dirty="0" smtClean="0"/>
+              <a:rPr lang="en-US" b="1" dirty="0"/>
               <a:t>master</a:t>
             </a:r>
           </a:p>
           <a:p>
             <a:r>
-              <a:rPr lang="en-US" b="1" dirty="0" smtClean="0"/>
+              <a:rPr lang="en-US" b="1" dirty="0"/>
               <a:t>Solutions</a:t>
             </a:r>
             <a:r>
-              <a:rPr lang="en-US" dirty="0" smtClean="0"/>
-              <a:t> for </a:t>
-            </a:r>
-            <a:r>
-              <a:rPr lang="en-US" dirty="0" smtClean="0"/>
-              <a:t>all tasks are in a </a:t>
-            </a:r>
-            <a:r>
-              <a:rPr lang="en-US" dirty="0" smtClean="0"/>
-              <a:t>separate branch </a:t>
-            </a:r>
-            <a:r>
-              <a:rPr lang="en-US" b="1" dirty="0" smtClean="0"/>
+              <a:rPr lang="en-US" dirty="0"/>
+              <a:t> for all tasks are in a separate branch </a:t>
+            </a:r>
+            <a:r>
+              <a:rPr lang="en-US" b="1" dirty="0"/>
               <a:t>security/solution</a:t>
             </a:r>
-            <a:endParaRPr lang="en-US" b="1" dirty="0" smtClean="0"/>
           </a:p>
         </p:txBody>
       </p:sp>
@@ -12773,13 +12724,6 @@
   <p:clrMapOvr>
     <a:masterClrMapping/>
   </p:clrMapOvr>
-  <p:timing>
-    <p:tnLst>
-      <p:par>
-        <p:cTn id="1" dur="indefinite" restart="never" nodeType="tmRoot"/>
-      </p:par>
-    </p:tnLst>
-  </p:timing>
 </p:sld>
 </file>
 
@@ -12816,7 +12760,7 @@
           <a:lstStyle/>
           <a:p>
             <a:r>
-              <a:rPr lang="en-US" dirty="0" smtClean="0"/>
+              <a:rPr lang="en-US" dirty="0"/>
               <a:t>Tools</a:t>
             </a:r>
             <a:endParaRPr lang="sr-Latn-CS" dirty="0"/>
@@ -12840,11 +12784,7 @@
           <a:p>
             <a:r>
               <a:rPr lang="en-US" dirty="0"/>
-              <a:t>You will need following </a:t>
-            </a:r>
-            <a:r>
-              <a:rPr lang="en-US" dirty="0" smtClean="0"/>
-              <a:t>tools:</a:t>
+              <a:t>You will need following tools:</a:t>
             </a:r>
           </a:p>
           <a:p>
@@ -12860,7 +12800,7 @@
               <a:t>http://www.oracle.com/technetwork/java/javase/downloads/jdk8-downloads-2133151.html</a:t>
             </a:r>
             <a:r>
-              <a:rPr lang="en-US" dirty="0" smtClean="0"/>
+              <a:rPr lang="en-US" dirty="0"/>
               <a:t>)</a:t>
             </a:r>
           </a:p>
@@ -12868,11 +12808,7 @@
             <a:pPr lvl="1"/>
             <a:r>
               <a:rPr lang="sr-Latn-CS" dirty="0"/>
-              <a:t>Node.js </a:t>
-            </a:r>
-            <a:r>
-              <a:rPr lang="sr-Latn-CS" dirty="0" smtClean="0"/>
-              <a:t>latest</a:t>
+              <a:t>Node.js latest</a:t>
             </a:r>
             <a:r>
               <a:rPr lang="en-US" dirty="0"/>
@@ -12882,16 +12818,10 @@
               <a:rPr lang="en-US" dirty="0">
                 <a:hlinkClick r:id="rId3"/>
               </a:rPr>
-              <a:t>https://nodejs.org/en/download/current</a:t>
-            </a:r>
-            <a:r>
-              <a:rPr lang="en-US" dirty="0" smtClean="0">
-                <a:hlinkClick r:id="rId3"/>
-              </a:rPr>
-              <a:t>/</a:t>
-            </a:r>
-            <a:r>
-              <a:rPr lang="en-US" dirty="0" smtClean="0"/>
+              <a:t>https://nodejs.org/en/download/current/</a:t>
+            </a:r>
+            <a:r>
+              <a:rPr lang="en-US" dirty="0"/>
               <a:t>)</a:t>
             </a:r>
           </a:p>
@@ -12901,18 +12831,13 @@
           </a:p>
           <a:p>
             <a:r>
-              <a:rPr lang="en-US" dirty="0" smtClean="0"/>
+              <a:rPr lang="en-US" dirty="0"/>
               <a:t>Run the application by calling </a:t>
             </a:r>
             <a:r>
-              <a:rPr lang="en-US" b="1" dirty="0" smtClean="0"/>
-              <a:t>insecure-web-app\</a:t>
-            </a:r>
-            <a:r>
-              <a:rPr lang="en-US" b="1" dirty="0" smtClean="0"/>
-              <a:t>run.bat</a:t>
-            </a:r>
-            <a:endParaRPr lang="en-US" b="1" dirty="0" smtClean="0"/>
+              <a:rPr lang="en-US" b="1" dirty="0"/>
+              <a:t>insecure-web-app\run.bat</a:t>
+            </a:r>
           </a:p>
           <a:p>
             <a:r>
@@ -12920,11 +12845,11 @@
               <a:t>Read </a:t>
             </a:r>
             <a:r>
-              <a:rPr lang="en-US" b="1" dirty="0" smtClean="0"/>
+              <a:rPr lang="en-US" b="1" dirty="0"/>
               <a:t>insecure-web-app\readme.md</a:t>
             </a:r>
             <a:r>
-              <a:rPr lang="en-US" dirty="0" smtClean="0"/>
+              <a:rPr lang="en-US" dirty="0"/>
               <a:t> for further information</a:t>
             </a:r>
             <a:endParaRPr lang="sr-Latn-CS" dirty="0"/>
@@ -12941,13 +12866,6 @@
   <p:clrMapOvr>
     <a:masterClrMapping/>
   </p:clrMapOvr>
-  <p:timing>
-    <p:tnLst>
-      <p:par>
-        <p:cTn id="1" dur="indefinite" restart="never" nodeType="tmRoot"/>
-      </p:par>
-    </p:tnLst>
-  </p:timing>
 </p:sld>
 </file>
 
@@ -12984,7 +12902,7 @@
           <a:lstStyle/>
           <a:p>
             <a:r>
-              <a:rPr lang="en-US" dirty="0" smtClean="0"/>
+              <a:rPr lang="en-US" dirty="0"/>
               <a:t>Lesson structure</a:t>
             </a:r>
             <a:endParaRPr lang="sr-Latn-CS" dirty="0"/>
@@ -13007,48 +12925,35 @@
           <a:lstStyle/>
           <a:p>
             <a:r>
-              <a:rPr lang="en-US" dirty="0" smtClean="0"/>
-              <a:t>Each practical lesson </a:t>
-            </a:r>
-            <a:r>
-              <a:rPr lang="en-US" dirty="0" smtClean="0"/>
-              <a:t>follows the </a:t>
-            </a:r>
-            <a:r>
-              <a:rPr lang="en-US" dirty="0" smtClean="0"/>
-              <a:t>same structure:</a:t>
+              <a:rPr lang="en-US" dirty="0"/>
+              <a:t>Each practical lesson follows the same structure:</a:t>
             </a:r>
           </a:p>
           <a:p>
             <a:pPr lvl="1"/>
             <a:r>
-              <a:rPr lang="en-US" dirty="0" smtClean="0"/>
-              <a:t>Short </a:t>
-            </a:r>
-            <a:r>
-              <a:rPr lang="en-US" dirty="0" smtClean="0"/>
-              <a:t>introductory description</a:t>
-            </a:r>
-            <a:endParaRPr lang="en-US" dirty="0" smtClean="0"/>
+              <a:rPr lang="en-US" dirty="0"/>
+              <a:t>Short introductory description</a:t>
+            </a:r>
           </a:p>
           <a:p>
             <a:pPr lvl="1"/>
             <a:r>
-              <a:rPr lang="en-US" dirty="0" smtClean="0"/>
+              <a:rPr lang="en-US" dirty="0"/>
               <a:t>Example of the attack</a:t>
             </a:r>
           </a:p>
           <a:p>
             <a:pPr lvl="1"/>
             <a:r>
-              <a:rPr lang="en-US" dirty="0" smtClean="0"/>
+              <a:rPr lang="en-US" dirty="0"/>
               <a:t>Analysis of the attack</a:t>
             </a:r>
           </a:p>
           <a:p>
             <a:pPr lvl="1"/>
             <a:r>
-              <a:rPr lang="en-US" dirty="0" smtClean="0"/>
+              <a:rPr lang="en-US" dirty="0"/>
               <a:t>Task to implement prevention of the attack</a:t>
             </a:r>
             <a:endParaRPr lang="sr-Latn-CS" dirty="0"/>
@@ -13065,13 +12970,6 @@
   <p:clrMapOvr>
     <a:masterClrMapping/>
   </p:clrMapOvr>
-  <p:timing>
-    <p:tnLst>
-      <p:par>
-        <p:cTn id="1" dur="indefinite" restart="never" nodeType="tmRoot"/>
-      </p:par>
-    </p:tnLst>
-  </p:timing>
 </p:sld>
 </file>
 
@@ -13108,16 +13006,12 @@
           <a:lstStyle/>
           <a:p>
             <a:r>
-              <a:rPr lang="en-US" dirty="0" err="1" smtClean="0"/>
+              <a:rPr lang="en-US" dirty="0" err="1"/>
               <a:t>TopicS</a:t>
             </a:r>
             <a:r>
-              <a:rPr lang="en-US" dirty="0" smtClean="0"/>
-              <a:t> </a:t>
-            </a:r>
-            <a:r>
-              <a:rPr lang="en-US" dirty="0" smtClean="0"/>
-              <a:t>covered</a:t>
+              <a:rPr lang="en-US" dirty="0"/>
+              <a:t> covered</a:t>
             </a:r>
             <a:endParaRPr lang="sr-Latn-CS" dirty="0"/>
           </a:p>
@@ -13144,18 +13038,14 @@
           <a:lstStyle/>
           <a:p>
             <a:r>
-              <a:rPr lang="en-US" dirty="0" smtClean="0"/>
+              <a:rPr lang="en-US" dirty="0"/>
               <a:t>Introduction to security</a:t>
             </a:r>
           </a:p>
           <a:p>
             <a:r>
-              <a:rPr lang="en-US" dirty="0" smtClean="0"/>
-              <a:t>A1 </a:t>
-            </a:r>
-            <a:r>
               <a:rPr lang="en-US" dirty="0"/>
-              <a:t>Injection</a:t>
+              <a:t>A1 Injection</a:t>
             </a:r>
           </a:p>
           <a:p>
@@ -13243,7 +13133,7 @@
           <a:lstStyle/>
           <a:p>
             <a:r>
-              <a:rPr lang="en-US" dirty="0" smtClean="0"/>
+              <a:rPr lang="en-US" dirty="0"/>
               <a:t>Contact</a:t>
             </a:r>
             <a:endParaRPr lang="sr-Latn-CS" dirty="0"/>
@@ -13266,50 +13156,38 @@
           <a:lstStyle/>
           <a:p>
             <a:r>
-              <a:rPr lang="en-US" dirty="0" smtClean="0"/>
+              <a:rPr lang="en-US" dirty="0"/>
               <a:t>If you have any questions, you can contact:</a:t>
             </a:r>
           </a:p>
           <a:p>
             <a:pPr lvl="1"/>
             <a:r>
-              <a:rPr lang="en-US" dirty="0" smtClean="0"/>
+              <a:rPr lang="en-US" dirty="0"/>
               <a:t>Milan Starcevic</a:t>
             </a:r>
           </a:p>
           <a:p>
             <a:pPr lvl="1"/>
             <a:r>
+              <a:rPr lang="en-US"/>
+              <a:t>Nenad Ivanovic</a:t>
+            </a:r>
+            <a:endParaRPr lang="sr-Latn-CS" dirty="0"/>
+          </a:p>
+          <a:p>
+            <a:pPr lvl="1"/>
+            <a:r>
               <a:rPr lang="en-US" dirty="0"/>
-              <a:t>Nenad </a:t>
-            </a:r>
-            <a:r>
-              <a:rPr lang="en-US" dirty="0" smtClean="0"/>
-              <a:t>Ivanovic</a:t>
+              <a:t>Stefan Rankovic</a:t>
             </a:r>
           </a:p>
           <a:p>
             <a:pPr lvl="1"/>
             <a:r>
               <a:rPr lang="en-US" dirty="0"/>
-              <a:t>Branko Kanjevac</a:t>
-            </a:r>
-            <a:endParaRPr lang="sr-Latn-CS" dirty="0"/>
-          </a:p>
-          <a:p>
-            <a:pPr lvl="1"/>
-            <a:r>
-              <a:rPr lang="en-US" dirty="0" smtClean="0"/>
-              <a:t>Stefan Rankovic</a:t>
-            </a:r>
-          </a:p>
-          <a:p>
-            <a:pPr lvl="1"/>
-            <a:r>
-              <a:rPr lang="en-US" smtClean="0"/>
               <a:t>Ognjen Blagojevic</a:t>
             </a:r>
-            <a:endParaRPr lang="en-US" dirty="0" smtClean="0"/>
           </a:p>
         </p:txBody>
       </p:sp>
@@ -13364,10 +13242,9 @@
               <a:buNone/>
             </a:pPr>
             <a:r>
-              <a:rPr lang="en-GB" sz="9600" dirty="0" smtClean="0"/>
+              <a:rPr lang="en-GB" sz="9600" dirty="0"/>
               <a:t>?</a:t>
             </a:r>
-            <a:endParaRPr lang="en-GB" sz="9600" dirty="0"/>
           </a:p>
         </p:txBody>
       </p:sp>

</xml_diff>

<commit_message>
Modified presentation to include .NET setup instructions
</commit_message>
<xml_diff>
--- a/security/00-Introduction/Introduction.pptx
+++ b/security/00-Introduction/Introduction.pptx
@@ -9,10 +9,11 @@
     <p:sldId id="257" r:id="rId3"/>
     <p:sldId id="258" r:id="rId4"/>
     <p:sldId id="259" r:id="rId5"/>
-    <p:sldId id="260" r:id="rId6"/>
-    <p:sldId id="261" r:id="rId7"/>
-    <p:sldId id="262" r:id="rId8"/>
-    <p:sldId id="263" r:id="rId9"/>
+    <p:sldId id="264" r:id="rId6"/>
+    <p:sldId id="260" r:id="rId7"/>
+    <p:sldId id="261" r:id="rId8"/>
+    <p:sldId id="262" r:id="rId9"/>
+    <p:sldId id="263" r:id="rId10"/>
   </p:sldIdLst>
   <p:sldSz cx="12192000" cy="6858000"/>
   <p:notesSz cx="6858000" cy="9144000"/>
@@ -169,7 +170,7 @@
           <a:noFill/>
           <a:extLst>
             <a:ext uri="{909E8E84-426E-40dd-AFC4-6F175D3DCCD1}">
-              <a14:hiddenFill xmlns:a14="http://schemas.microsoft.com/office/drawing/2010/main" xmlns="">
+              <a14:hiddenFill xmlns="" xmlns:a14="http://schemas.microsoft.com/office/drawing/2010/main">
                 <a:solidFill>
                   <a:srgbClr val="FFFFFF"/>
                 </a:solidFill>
@@ -229,7 +230,7 @@
             </a:ln>
             <a:extLst>
               <a:ext uri="{91240B29-F687-4f45-9708-019B960494DF}">
-                <a14:hiddenLine xmlns:a14="http://schemas.microsoft.com/office/drawing/2010/main" xmlns="" w="9525">
+                <a14:hiddenLine xmlns="" xmlns:a14="http://schemas.microsoft.com/office/drawing/2010/main" w="9525">
                   <a:solidFill>
                     <a:srgbClr val="000000"/>
                   </a:solidFill>
@@ -319,7 +320,7 @@
             </a:ln>
             <a:extLst>
               <a:ext uri="{91240B29-F687-4f45-9708-019B960494DF}">
-                <a14:hiddenLine xmlns:a14="http://schemas.microsoft.com/office/drawing/2010/main" xmlns="" w="9525">
+                <a14:hiddenLine xmlns="" xmlns:a14="http://schemas.microsoft.com/office/drawing/2010/main" w="9525">
                   <a:solidFill>
                     <a:srgbClr val="000000"/>
                   </a:solidFill>
@@ -409,7 +410,7 @@
             </a:ln>
             <a:extLst>
               <a:ext uri="{91240B29-F687-4f45-9708-019B960494DF}">
-                <a14:hiddenLine xmlns:a14="http://schemas.microsoft.com/office/drawing/2010/main" xmlns="" w="9525">
+                <a14:hiddenLine xmlns="" xmlns:a14="http://schemas.microsoft.com/office/drawing/2010/main" w="9525">
                   <a:solidFill>
                     <a:srgbClr val="000000"/>
                   </a:solidFill>
@@ -443,7 +444,7 @@
             </a:ln>
             <a:extLst>
               <a:ext uri="{91240B29-F687-4f45-9708-019B960494DF}">
-                <a14:hiddenLine xmlns:a14="http://schemas.microsoft.com/office/drawing/2010/main" xmlns="" w="9525">
+                <a14:hiddenLine xmlns="" xmlns:a14="http://schemas.microsoft.com/office/drawing/2010/main" w="9525">
                   <a:solidFill>
                     <a:srgbClr val="000000"/>
                   </a:solidFill>
@@ -533,7 +534,7 @@
             </a:ln>
             <a:extLst>
               <a:ext uri="{91240B29-F687-4f45-9708-019B960494DF}">
-                <a14:hiddenLine xmlns:a14="http://schemas.microsoft.com/office/drawing/2010/main" xmlns="" w="9525">
+                <a14:hiddenLine xmlns="" xmlns:a14="http://schemas.microsoft.com/office/drawing/2010/main" w="9525">
                   <a:solidFill>
                     <a:srgbClr val="000000"/>
                   </a:solidFill>
@@ -595,7 +596,7 @@
             </a:ln>
             <a:extLst>
               <a:ext uri="{91240B29-F687-4f45-9708-019B960494DF}">
-                <a14:hiddenLine xmlns:a14="http://schemas.microsoft.com/office/drawing/2010/main" xmlns="" w="9525">
+                <a14:hiddenLine xmlns="" xmlns:a14="http://schemas.microsoft.com/office/drawing/2010/main" w="9525">
                   <a:solidFill>
                     <a:srgbClr val="000000"/>
                   </a:solidFill>
@@ -657,7 +658,7 @@
             </a:ln>
             <a:extLst>
               <a:ext uri="{91240B29-F687-4f45-9708-019B960494DF}">
-                <a14:hiddenLine xmlns:a14="http://schemas.microsoft.com/office/drawing/2010/main" xmlns="" w="9525">
+                <a14:hiddenLine xmlns="" xmlns:a14="http://schemas.microsoft.com/office/drawing/2010/main" w="9525">
                   <a:solidFill>
                     <a:srgbClr val="000000"/>
                   </a:solidFill>
@@ -747,7 +748,7 @@
             </a:ln>
             <a:extLst>
               <a:ext uri="{91240B29-F687-4f45-9708-019B960494DF}">
-                <a14:hiddenLine xmlns:a14="http://schemas.microsoft.com/office/drawing/2010/main" xmlns="" w="9525">
+                <a14:hiddenLine xmlns="" xmlns:a14="http://schemas.microsoft.com/office/drawing/2010/main" w="9525">
                   <a:solidFill>
                     <a:srgbClr val="000000"/>
                   </a:solidFill>
@@ -809,7 +810,7 @@
             </a:ln>
             <a:extLst>
               <a:ext uri="{91240B29-F687-4f45-9708-019B960494DF}">
-                <a14:hiddenLine xmlns:a14="http://schemas.microsoft.com/office/drawing/2010/main" xmlns="" w="9525">
+                <a14:hiddenLine xmlns="" xmlns:a14="http://schemas.microsoft.com/office/drawing/2010/main" w="9525">
                   <a:solidFill>
                     <a:srgbClr val="000000"/>
                   </a:solidFill>
@@ -871,7 +872,7 @@
             </a:ln>
             <a:extLst>
               <a:ext uri="{91240B29-F687-4f45-9708-019B960494DF}">
-                <a14:hiddenLine xmlns:a14="http://schemas.microsoft.com/office/drawing/2010/main" xmlns="" w="9525">
+                <a14:hiddenLine xmlns="" xmlns:a14="http://schemas.microsoft.com/office/drawing/2010/main" w="9525">
                   <a:solidFill>
                     <a:srgbClr val="000000"/>
                   </a:solidFill>
@@ -961,7 +962,7 @@
             </a:ln>
             <a:extLst>
               <a:ext uri="{91240B29-F687-4f45-9708-019B960494DF}">
-                <a14:hiddenLine xmlns:a14="http://schemas.microsoft.com/office/drawing/2010/main" xmlns="" w="9525">
+                <a14:hiddenLine xmlns="" xmlns:a14="http://schemas.microsoft.com/office/drawing/2010/main" w="9525">
                   <a:solidFill>
                     <a:srgbClr val="000000"/>
                   </a:solidFill>
@@ -1051,7 +1052,7 @@
             </a:ln>
             <a:extLst>
               <a:ext uri="{91240B29-F687-4f45-9708-019B960494DF}">
-                <a14:hiddenLine xmlns:a14="http://schemas.microsoft.com/office/drawing/2010/main" xmlns="" w="9525">
+                <a14:hiddenLine xmlns="" xmlns:a14="http://schemas.microsoft.com/office/drawing/2010/main" w="9525">
                   <a:solidFill>
                     <a:srgbClr val="000000"/>
                   </a:solidFill>
@@ -1113,7 +1114,7 @@
             </a:ln>
             <a:extLst>
               <a:ext uri="{91240B29-F687-4f45-9708-019B960494DF}">
-                <a14:hiddenLine xmlns:a14="http://schemas.microsoft.com/office/drawing/2010/main" xmlns="" w="9525">
+                <a14:hiddenLine xmlns="" xmlns:a14="http://schemas.microsoft.com/office/drawing/2010/main" w="9525">
                   <a:solidFill>
                     <a:srgbClr val="000000"/>
                   </a:solidFill>
@@ -1223,7 +1224,7 @@
             </a:ln>
             <a:extLst>
               <a:ext uri="{91240B29-F687-4f45-9708-019B960494DF}">
-                <a14:hiddenLine xmlns:a14="http://schemas.microsoft.com/office/drawing/2010/main" xmlns="" w="9525">
+                <a14:hiddenLine xmlns="" xmlns:a14="http://schemas.microsoft.com/office/drawing/2010/main" w="9525">
                   <a:solidFill>
                     <a:srgbClr val="000000"/>
                   </a:solidFill>
@@ -1285,7 +1286,7 @@
             </a:ln>
             <a:extLst>
               <a:ext uri="{91240B29-F687-4f45-9708-019B960494DF}">
-                <a14:hiddenLine xmlns:a14="http://schemas.microsoft.com/office/drawing/2010/main" xmlns="" w="9525">
+                <a14:hiddenLine xmlns="" xmlns:a14="http://schemas.microsoft.com/office/drawing/2010/main" w="9525">
                   <a:solidFill>
                     <a:srgbClr val="000000"/>
                   </a:solidFill>
@@ -1375,7 +1376,7 @@
             </a:ln>
             <a:extLst>
               <a:ext uri="{91240B29-F687-4f45-9708-019B960494DF}">
-                <a14:hiddenLine xmlns:a14="http://schemas.microsoft.com/office/drawing/2010/main" xmlns="" w="9525">
+                <a14:hiddenLine xmlns="" xmlns:a14="http://schemas.microsoft.com/office/drawing/2010/main" w="9525">
                   <a:solidFill>
                     <a:srgbClr val="000000"/>
                   </a:solidFill>
@@ -1465,7 +1466,7 @@
             </a:ln>
             <a:extLst>
               <a:ext uri="{91240B29-F687-4f45-9708-019B960494DF}">
-                <a14:hiddenLine xmlns:a14="http://schemas.microsoft.com/office/drawing/2010/main" xmlns="" w="9525">
+                <a14:hiddenLine xmlns="" xmlns:a14="http://schemas.microsoft.com/office/drawing/2010/main" w="9525">
                   <a:solidFill>
                     <a:srgbClr val="000000"/>
                   </a:solidFill>
@@ -1527,7 +1528,7 @@
             </a:ln>
             <a:extLst>
               <a:ext uri="{91240B29-F687-4f45-9708-019B960494DF}">
-                <a14:hiddenLine xmlns:a14="http://schemas.microsoft.com/office/drawing/2010/main" xmlns="" w="9525">
+                <a14:hiddenLine xmlns="" xmlns:a14="http://schemas.microsoft.com/office/drawing/2010/main" w="9525">
                   <a:solidFill>
                     <a:srgbClr val="000000"/>
                   </a:solidFill>
@@ -1617,7 +1618,7 @@
             </a:ln>
             <a:extLst>
               <a:ext uri="{91240B29-F687-4f45-9708-019B960494DF}">
-                <a14:hiddenLine xmlns:a14="http://schemas.microsoft.com/office/drawing/2010/main" xmlns="" w="9525">
+                <a14:hiddenLine xmlns="" xmlns:a14="http://schemas.microsoft.com/office/drawing/2010/main" w="9525">
                   <a:solidFill>
                     <a:srgbClr val="000000"/>
                   </a:solidFill>
@@ -1707,7 +1708,7 @@
             </a:ln>
             <a:extLst>
               <a:ext uri="{91240B29-F687-4f45-9708-019B960494DF}">
-                <a14:hiddenLine xmlns:a14="http://schemas.microsoft.com/office/drawing/2010/main" xmlns="" w="9525">
+                <a14:hiddenLine xmlns="" xmlns:a14="http://schemas.microsoft.com/office/drawing/2010/main" w="9525">
                   <a:solidFill>
                     <a:srgbClr val="000000"/>
                   </a:solidFill>
@@ -1763,7 +1764,7 @@
             </a:ln>
             <a:extLst>
               <a:ext uri="{91240B29-F687-4f45-9708-019B960494DF}">
-                <a14:hiddenLine xmlns:a14="http://schemas.microsoft.com/office/drawing/2010/main" xmlns="" w="9525">
+                <a14:hiddenLine xmlns="" xmlns:a14="http://schemas.microsoft.com/office/drawing/2010/main" w="9525">
                   <a:solidFill>
                     <a:srgbClr val="000000"/>
                   </a:solidFill>
@@ -1853,7 +1854,7 @@
             </a:ln>
             <a:extLst>
               <a:ext uri="{91240B29-F687-4f45-9708-019B960494DF}">
-                <a14:hiddenLine xmlns:a14="http://schemas.microsoft.com/office/drawing/2010/main" xmlns="" w="9525">
+                <a14:hiddenLine xmlns="" xmlns:a14="http://schemas.microsoft.com/office/drawing/2010/main" w="9525">
                   <a:solidFill>
                     <a:srgbClr val="000000"/>
                   </a:solidFill>
@@ -1909,7 +1910,7 @@
             </a:ln>
             <a:extLst>
               <a:ext uri="{91240B29-F687-4f45-9708-019B960494DF}">
-                <a14:hiddenLine xmlns:a14="http://schemas.microsoft.com/office/drawing/2010/main" xmlns="" w="9525">
+                <a14:hiddenLine xmlns="" xmlns:a14="http://schemas.microsoft.com/office/drawing/2010/main" w="9525">
                   <a:solidFill>
                     <a:srgbClr val="000000"/>
                   </a:solidFill>
@@ -1999,7 +2000,7 @@
             </a:ln>
             <a:extLst>
               <a:ext uri="{91240B29-F687-4f45-9708-019B960494DF}">
-                <a14:hiddenLine xmlns:a14="http://schemas.microsoft.com/office/drawing/2010/main" xmlns="" w="9525">
+                <a14:hiddenLine xmlns="" xmlns:a14="http://schemas.microsoft.com/office/drawing/2010/main" w="9525">
                   <a:solidFill>
                     <a:srgbClr val="000000"/>
                   </a:solidFill>
@@ -2067,7 +2068,7 @@
             </a:ln>
             <a:extLst>
               <a:ext uri="{91240B29-F687-4f45-9708-019B960494DF}">
-                <a14:hiddenLine xmlns:a14="http://schemas.microsoft.com/office/drawing/2010/main" xmlns="" w="9525">
+                <a14:hiddenLine xmlns="" xmlns:a14="http://schemas.microsoft.com/office/drawing/2010/main" w="9525">
                   <a:solidFill>
                     <a:srgbClr val="000000"/>
                   </a:solidFill>
@@ -2157,7 +2158,7 @@
             </a:ln>
             <a:extLst>
               <a:ext uri="{91240B29-F687-4f45-9708-019B960494DF}">
-                <a14:hiddenLine xmlns:a14="http://schemas.microsoft.com/office/drawing/2010/main" xmlns="" w="9525">
+                <a14:hiddenLine xmlns="" xmlns:a14="http://schemas.microsoft.com/office/drawing/2010/main" w="9525">
                   <a:solidFill>
                     <a:srgbClr val="000000"/>
                   </a:solidFill>
@@ -2225,7 +2226,7 @@
             </a:ln>
             <a:extLst>
               <a:ext uri="{91240B29-F687-4f45-9708-019B960494DF}">
-                <a14:hiddenLine xmlns:a14="http://schemas.microsoft.com/office/drawing/2010/main" xmlns="" w="9525">
+                <a14:hiddenLine xmlns="" xmlns:a14="http://schemas.microsoft.com/office/drawing/2010/main" w="9525">
                   <a:solidFill>
                     <a:srgbClr val="000000"/>
                   </a:solidFill>
@@ -2315,7 +2316,7 @@
             </a:ln>
             <a:extLst>
               <a:ext uri="{91240B29-F687-4f45-9708-019B960494DF}">
-                <a14:hiddenLine xmlns:a14="http://schemas.microsoft.com/office/drawing/2010/main" xmlns="" w="9525">
+                <a14:hiddenLine xmlns="" xmlns:a14="http://schemas.microsoft.com/office/drawing/2010/main" w="9525">
                   <a:solidFill>
                     <a:srgbClr val="000000"/>
                   </a:solidFill>
@@ -2349,7 +2350,7 @@
             </a:ln>
             <a:extLst>
               <a:ext uri="{91240B29-F687-4f45-9708-019B960494DF}">
-                <a14:hiddenLine xmlns:a14="http://schemas.microsoft.com/office/drawing/2010/main" xmlns="" w="9525">
+                <a14:hiddenLine xmlns="" xmlns:a14="http://schemas.microsoft.com/office/drawing/2010/main" w="9525">
                   <a:solidFill>
                     <a:srgbClr val="000000"/>
                   </a:solidFill>
@@ -2439,7 +2440,7 @@
             </a:ln>
             <a:extLst>
               <a:ext uri="{91240B29-F687-4f45-9708-019B960494DF}">
-                <a14:hiddenLine xmlns:a14="http://schemas.microsoft.com/office/drawing/2010/main" xmlns="" w="9525">
+                <a14:hiddenLine xmlns="" xmlns:a14="http://schemas.microsoft.com/office/drawing/2010/main" w="9525">
                   <a:solidFill>
                     <a:srgbClr val="000000"/>
                   </a:solidFill>
@@ -2501,7 +2502,7 @@
             </a:ln>
             <a:extLst>
               <a:ext uri="{91240B29-F687-4f45-9708-019B960494DF}">
-                <a14:hiddenLine xmlns:a14="http://schemas.microsoft.com/office/drawing/2010/main" xmlns="" w="9525">
+                <a14:hiddenLine xmlns="" xmlns:a14="http://schemas.microsoft.com/office/drawing/2010/main" w="9525">
                   <a:solidFill>
                     <a:srgbClr val="000000"/>
                   </a:solidFill>
@@ -2563,7 +2564,7 @@
             </a:ln>
             <a:extLst>
               <a:ext uri="{91240B29-F687-4f45-9708-019B960494DF}">
-                <a14:hiddenLine xmlns:a14="http://schemas.microsoft.com/office/drawing/2010/main" xmlns="" w="9525">
+                <a14:hiddenLine xmlns="" xmlns:a14="http://schemas.microsoft.com/office/drawing/2010/main" w="9525">
                   <a:solidFill>
                     <a:srgbClr val="000000"/>
                   </a:solidFill>
@@ -2653,7 +2654,7 @@
             </a:ln>
             <a:extLst>
               <a:ext uri="{91240B29-F687-4f45-9708-019B960494DF}">
-                <a14:hiddenLine xmlns:a14="http://schemas.microsoft.com/office/drawing/2010/main" xmlns="" w="9525">
+                <a14:hiddenLine xmlns="" xmlns:a14="http://schemas.microsoft.com/office/drawing/2010/main" w="9525">
                   <a:solidFill>
                     <a:srgbClr val="000000"/>
                   </a:solidFill>
@@ -2721,7 +2722,7 @@
             </a:ln>
             <a:extLst>
               <a:ext uri="{91240B29-F687-4f45-9708-019B960494DF}">
-                <a14:hiddenLine xmlns:a14="http://schemas.microsoft.com/office/drawing/2010/main" xmlns="" w="9525">
+                <a14:hiddenLine xmlns="" xmlns:a14="http://schemas.microsoft.com/office/drawing/2010/main" w="9525">
                   <a:solidFill>
                     <a:srgbClr val="000000"/>
                   </a:solidFill>
@@ -2783,7 +2784,7 @@
             </a:ln>
             <a:extLst>
               <a:ext uri="{91240B29-F687-4f45-9708-019B960494DF}">
-                <a14:hiddenLine xmlns:a14="http://schemas.microsoft.com/office/drawing/2010/main" xmlns="" w="9525">
+                <a14:hiddenLine xmlns="" xmlns:a14="http://schemas.microsoft.com/office/drawing/2010/main" w="9525">
                   <a:solidFill>
                     <a:srgbClr val="000000"/>
                   </a:solidFill>
@@ -2873,7 +2874,7 @@
             </a:ln>
             <a:extLst>
               <a:ext uri="{91240B29-F687-4f45-9708-019B960494DF}">
-                <a14:hiddenLine xmlns:a14="http://schemas.microsoft.com/office/drawing/2010/main" xmlns="" w="9525">
+                <a14:hiddenLine xmlns="" xmlns:a14="http://schemas.microsoft.com/office/drawing/2010/main" w="9525">
                   <a:solidFill>
                     <a:srgbClr val="000000"/>
                   </a:solidFill>
@@ -2935,7 +2936,7 @@
             </a:ln>
             <a:extLst>
               <a:ext uri="{91240B29-F687-4f45-9708-019B960494DF}">
-                <a14:hiddenLine xmlns:a14="http://schemas.microsoft.com/office/drawing/2010/main" xmlns="" w="9525">
+                <a14:hiddenLine xmlns="" xmlns:a14="http://schemas.microsoft.com/office/drawing/2010/main" w="9525">
                   <a:solidFill>
                     <a:srgbClr val="000000"/>
                   </a:solidFill>
@@ -3025,7 +3026,7 @@
             </a:ln>
             <a:extLst>
               <a:ext uri="{91240B29-F687-4f45-9708-019B960494DF}">
-                <a14:hiddenLine xmlns:a14="http://schemas.microsoft.com/office/drawing/2010/main" xmlns="" w="9525">
+                <a14:hiddenLine xmlns="" xmlns:a14="http://schemas.microsoft.com/office/drawing/2010/main" w="9525">
                   <a:solidFill>
                     <a:srgbClr val="000000"/>
                   </a:solidFill>
@@ -3087,7 +3088,7 @@
             </a:ln>
             <a:extLst>
               <a:ext uri="{91240B29-F687-4f45-9708-019B960494DF}">
-                <a14:hiddenLine xmlns:a14="http://schemas.microsoft.com/office/drawing/2010/main" xmlns="" w="9525">
+                <a14:hiddenLine xmlns="" xmlns:a14="http://schemas.microsoft.com/office/drawing/2010/main" w="9525">
                   <a:solidFill>
                     <a:srgbClr val="000000"/>
                   </a:solidFill>
@@ -3177,7 +3178,7 @@
             </a:ln>
             <a:extLst>
               <a:ext uri="{91240B29-F687-4f45-9708-019B960494DF}">
-                <a14:hiddenLine xmlns:a14="http://schemas.microsoft.com/office/drawing/2010/main" xmlns="" w="9525">
+                <a14:hiddenLine xmlns="" xmlns:a14="http://schemas.microsoft.com/office/drawing/2010/main" w="9525">
                   <a:solidFill>
                     <a:srgbClr val="000000"/>
                   </a:solidFill>
@@ -3211,7 +3212,7 @@
             </a:ln>
             <a:extLst>
               <a:ext uri="{91240B29-F687-4f45-9708-019B960494DF}">
-                <a14:hiddenLine xmlns:a14="http://schemas.microsoft.com/office/drawing/2010/main" xmlns="" w="9525">
+                <a14:hiddenLine xmlns="" xmlns:a14="http://schemas.microsoft.com/office/drawing/2010/main" w="9525">
                   <a:solidFill>
                     <a:srgbClr val="000000"/>
                   </a:solidFill>
@@ -3276,7 +3277,7 @@
             </a:ln>
             <a:extLst>
               <a:ext uri="{91240B29-F687-4f45-9708-019B960494DF}">
-                <a14:hiddenLine xmlns:a14="http://schemas.microsoft.com/office/drawing/2010/main" xmlns="" w="9525">
+                <a14:hiddenLine xmlns="" xmlns:a14="http://schemas.microsoft.com/office/drawing/2010/main" w="9525">
                   <a:solidFill>
                     <a:srgbClr val="000000"/>
                   </a:solidFill>
@@ -3366,7 +3367,7 @@
             </a:ln>
             <a:extLst>
               <a:ext uri="{91240B29-F687-4f45-9708-019B960494DF}">
-                <a14:hiddenLine xmlns:a14="http://schemas.microsoft.com/office/drawing/2010/main" xmlns="" w="9525">
+                <a14:hiddenLine xmlns="" xmlns:a14="http://schemas.microsoft.com/office/drawing/2010/main" w="9525">
                   <a:solidFill>
                     <a:srgbClr val="000000"/>
                   </a:solidFill>
@@ -3428,7 +3429,7 @@
             </a:ln>
             <a:extLst>
               <a:ext uri="{91240B29-F687-4f45-9708-019B960494DF}">
-                <a14:hiddenLine xmlns:a14="http://schemas.microsoft.com/office/drawing/2010/main" xmlns="" w="9525">
+                <a14:hiddenLine xmlns="" xmlns:a14="http://schemas.microsoft.com/office/drawing/2010/main" w="9525">
                   <a:solidFill>
                     <a:srgbClr val="000000"/>
                   </a:solidFill>
@@ -3518,7 +3519,7 @@
             </a:ln>
             <a:extLst>
               <a:ext uri="{91240B29-F687-4f45-9708-019B960494DF}">
-                <a14:hiddenLine xmlns:a14="http://schemas.microsoft.com/office/drawing/2010/main" xmlns="" w="9525">
+                <a14:hiddenLine xmlns="" xmlns:a14="http://schemas.microsoft.com/office/drawing/2010/main" w="9525">
                   <a:solidFill>
                     <a:srgbClr val="000000"/>
                   </a:solidFill>
@@ -3608,7 +3609,7 @@
             </a:ln>
             <a:extLst>
               <a:ext uri="{91240B29-F687-4f45-9708-019B960494DF}">
-                <a14:hiddenLine xmlns:a14="http://schemas.microsoft.com/office/drawing/2010/main" xmlns="" w="9525">
+                <a14:hiddenLine xmlns="" xmlns:a14="http://schemas.microsoft.com/office/drawing/2010/main" w="9525">
                   <a:solidFill>
                     <a:srgbClr val="000000"/>
                   </a:solidFill>
@@ -3673,7 +3674,7 @@
             </a:ln>
             <a:extLst>
               <a:ext uri="{91240B29-F687-4f45-9708-019B960494DF}">
-                <a14:hiddenLine xmlns:a14="http://schemas.microsoft.com/office/drawing/2010/main" xmlns="" w="9525">
+                <a14:hiddenLine xmlns="" xmlns:a14="http://schemas.microsoft.com/office/drawing/2010/main" w="9525">
                   <a:solidFill>
                     <a:srgbClr val="000000"/>
                   </a:solidFill>
@@ -3735,7 +3736,7 @@
             </a:ln>
             <a:extLst>
               <a:ext uri="{91240B29-F687-4f45-9708-019B960494DF}">
-                <a14:hiddenLine xmlns:a14="http://schemas.microsoft.com/office/drawing/2010/main" xmlns="" w="9525">
+                <a14:hiddenLine xmlns="" xmlns:a14="http://schemas.microsoft.com/office/drawing/2010/main" w="9525">
                   <a:solidFill>
                     <a:srgbClr val="000000"/>
                   </a:solidFill>
@@ -3825,7 +3826,7 @@
             </a:ln>
             <a:extLst>
               <a:ext uri="{91240B29-F687-4f45-9708-019B960494DF}">
-                <a14:hiddenLine xmlns:a14="http://schemas.microsoft.com/office/drawing/2010/main" xmlns="" w="9525">
+                <a14:hiddenLine xmlns="" xmlns:a14="http://schemas.microsoft.com/office/drawing/2010/main" w="9525">
                   <a:solidFill>
                     <a:srgbClr val="000000"/>
                   </a:solidFill>
@@ -3915,7 +3916,7 @@
             </a:ln>
             <a:extLst>
               <a:ext uri="{91240B29-F687-4f45-9708-019B960494DF}">
-                <a14:hiddenLine xmlns:a14="http://schemas.microsoft.com/office/drawing/2010/main" xmlns="" w="9525">
+                <a14:hiddenLine xmlns="" xmlns:a14="http://schemas.microsoft.com/office/drawing/2010/main" w="9525">
                   <a:solidFill>
                     <a:srgbClr val="000000"/>
                   </a:solidFill>
@@ -3977,7 +3978,7 @@
             </a:ln>
             <a:extLst>
               <a:ext uri="{91240B29-F687-4f45-9708-019B960494DF}">
-                <a14:hiddenLine xmlns:a14="http://schemas.microsoft.com/office/drawing/2010/main" xmlns="" w="9525">
+                <a14:hiddenLine xmlns="" xmlns:a14="http://schemas.microsoft.com/office/drawing/2010/main" w="9525">
                   <a:solidFill>
                     <a:srgbClr val="000000"/>
                   </a:solidFill>
@@ -4097,7 +4098,7 @@
             </a:ln>
             <a:extLst>
               <a:ext uri="{91240B29-F687-4f45-9708-019B960494DF}">
-                <a14:hiddenLine xmlns:a14="http://schemas.microsoft.com/office/drawing/2010/main" xmlns="" w="9525">
+                <a14:hiddenLine xmlns="" xmlns:a14="http://schemas.microsoft.com/office/drawing/2010/main" w="9525">
                   <a:solidFill>
                     <a:srgbClr val="000000"/>
                   </a:solidFill>
@@ -4165,7 +4166,7 @@
             </a:ln>
             <a:extLst>
               <a:ext uri="{91240B29-F687-4f45-9708-019B960494DF}">
-                <a14:hiddenLine xmlns:a14="http://schemas.microsoft.com/office/drawing/2010/main" xmlns="" w="9525">
+                <a14:hiddenLine xmlns="" xmlns:a14="http://schemas.microsoft.com/office/drawing/2010/main" w="9525">
                   <a:solidFill>
                     <a:srgbClr val="000000"/>
                   </a:solidFill>
@@ -4255,7 +4256,7 @@
             </a:ln>
             <a:extLst>
               <a:ext uri="{91240B29-F687-4f45-9708-019B960494DF}">
-                <a14:hiddenLine xmlns:a14="http://schemas.microsoft.com/office/drawing/2010/main" xmlns="" w="9525">
+                <a14:hiddenLine xmlns="" xmlns:a14="http://schemas.microsoft.com/office/drawing/2010/main" w="9525">
                   <a:solidFill>
                     <a:srgbClr val="000000"/>
                   </a:solidFill>
@@ -4395,7 +4396,7 @@
           <a:p>
             <a:fld id="{B9BA6063-779C-4BB6-8BC7-C5993206073F}" type="datetimeFigureOut">
               <a:rPr lang="sr-Latn-CS" smtClean="0"/>
-              <a:t>27.4.2018.</a:t>
+              <a:t>14.5.2018.</a:t>
             </a:fld>
             <a:endParaRPr lang="sr-Latn-CS"/>
           </a:p>
@@ -4662,7 +4663,7 @@
           <a:p>
             <a:fld id="{B9BA6063-779C-4BB6-8BC7-C5993206073F}" type="datetimeFigureOut">
               <a:rPr lang="sr-Latn-CS" smtClean="0"/>
-              <a:t>27.4.2018.</a:t>
+              <a:t>14.5.2018.</a:t>
             </a:fld>
             <a:endParaRPr lang="sr-Latn-CS"/>
           </a:p>
@@ -4858,7 +4859,7 @@
           <a:p>
             <a:fld id="{B9BA6063-779C-4BB6-8BC7-C5993206073F}" type="datetimeFigureOut">
               <a:rPr lang="sr-Latn-CS" smtClean="0"/>
-              <a:t>27.4.2018.</a:t>
+              <a:t>14.5.2018.</a:t>
             </a:fld>
             <a:endParaRPr lang="sr-Latn-CS"/>
           </a:p>
@@ -5121,7 +5122,7 @@
           <a:p>
             <a:fld id="{B9BA6063-779C-4BB6-8BC7-C5993206073F}" type="datetimeFigureOut">
               <a:rPr lang="sr-Latn-CS" smtClean="0"/>
-              <a:t>27.4.2018.</a:t>
+              <a:t>14.5.2018.</a:t>
             </a:fld>
             <a:endParaRPr lang="sr-Latn-CS"/>
           </a:p>
@@ -5555,7 +5556,7 @@
           <a:p>
             <a:fld id="{B9BA6063-779C-4BB6-8BC7-C5993206073F}" type="datetimeFigureOut">
               <a:rPr lang="sr-Latn-CS" smtClean="0"/>
-              <a:t>27.4.2018.</a:t>
+              <a:t>14.5.2018.</a:t>
             </a:fld>
             <a:endParaRPr lang="sr-Latn-CS"/>
           </a:p>
@@ -6101,7 +6102,7 @@
           <a:p>
             <a:fld id="{B9BA6063-779C-4BB6-8BC7-C5993206073F}" type="datetimeFigureOut">
               <a:rPr lang="sr-Latn-CS" smtClean="0"/>
-              <a:t>27.4.2018.</a:t>
+              <a:t>14.5.2018.</a:t>
             </a:fld>
             <a:endParaRPr lang="sr-Latn-CS"/>
           </a:p>
@@ -6821,7 +6822,7 @@
           <a:p>
             <a:fld id="{B9BA6063-779C-4BB6-8BC7-C5993206073F}" type="datetimeFigureOut">
               <a:rPr lang="sr-Latn-CS" smtClean="0"/>
-              <a:t>27.4.2018.</a:t>
+              <a:t>14.5.2018.</a:t>
             </a:fld>
             <a:endParaRPr lang="sr-Latn-CS"/>
           </a:p>
@@ -6991,7 +6992,7 @@
           <a:p>
             <a:fld id="{B9BA6063-779C-4BB6-8BC7-C5993206073F}" type="datetimeFigureOut">
               <a:rPr lang="sr-Latn-CS" smtClean="0"/>
-              <a:t>27.4.2018.</a:t>
+              <a:t>14.5.2018.</a:t>
             </a:fld>
             <a:endParaRPr lang="sr-Latn-CS"/>
           </a:p>
@@ -7171,7 +7172,7 @@
           <a:p>
             <a:fld id="{B9BA6063-779C-4BB6-8BC7-C5993206073F}" type="datetimeFigureOut">
               <a:rPr lang="sr-Latn-CS" smtClean="0"/>
-              <a:t>27.4.2018.</a:t>
+              <a:t>14.5.2018.</a:t>
             </a:fld>
             <a:endParaRPr lang="sr-Latn-CS"/>
           </a:p>
@@ -7341,7 +7342,7 @@
           <a:p>
             <a:fld id="{B9BA6063-779C-4BB6-8BC7-C5993206073F}" type="datetimeFigureOut">
               <a:rPr lang="sr-Latn-CS" smtClean="0"/>
-              <a:t>27.4.2018.</a:t>
+              <a:t>14.5.2018.</a:t>
             </a:fld>
             <a:endParaRPr lang="sr-Latn-CS"/>
           </a:p>
@@ -7591,7 +7592,7 @@
           <a:p>
             <a:fld id="{B9BA6063-779C-4BB6-8BC7-C5993206073F}" type="datetimeFigureOut">
               <a:rPr lang="sr-Latn-CS" smtClean="0"/>
-              <a:t>27.4.2018.</a:t>
+              <a:t>14.5.2018.</a:t>
             </a:fld>
             <a:endParaRPr lang="sr-Latn-CS"/>
           </a:p>
@@ -7823,7 +7824,7 @@
           <a:p>
             <a:fld id="{B9BA6063-779C-4BB6-8BC7-C5993206073F}" type="datetimeFigureOut">
               <a:rPr lang="sr-Latn-CS" smtClean="0"/>
-              <a:t>27.4.2018.</a:t>
+              <a:t>14.5.2018.</a:t>
             </a:fld>
             <a:endParaRPr lang="sr-Latn-CS"/>
           </a:p>
@@ -8204,7 +8205,7 @@
           <a:p>
             <a:fld id="{B9BA6063-779C-4BB6-8BC7-C5993206073F}" type="datetimeFigureOut">
               <a:rPr lang="sr-Latn-CS" smtClean="0"/>
-              <a:t>27.4.2018.</a:t>
+              <a:t>14.5.2018.</a:t>
             </a:fld>
             <a:endParaRPr lang="sr-Latn-CS"/>
           </a:p>
@@ -8322,7 +8323,7 @@
           <a:p>
             <a:fld id="{B9BA6063-779C-4BB6-8BC7-C5993206073F}" type="datetimeFigureOut">
               <a:rPr lang="sr-Latn-CS" smtClean="0"/>
-              <a:t>27.4.2018.</a:t>
+              <a:t>14.5.2018.</a:t>
             </a:fld>
             <a:endParaRPr lang="sr-Latn-CS"/>
           </a:p>
@@ -8417,7 +8418,7 @@
           <a:p>
             <a:fld id="{B9BA6063-779C-4BB6-8BC7-C5993206073F}" type="datetimeFigureOut">
               <a:rPr lang="sr-Latn-CS" smtClean="0"/>
-              <a:t>27.4.2018.</a:t>
+              <a:t>14.5.2018.</a:t>
             </a:fld>
             <a:endParaRPr lang="sr-Latn-CS"/>
           </a:p>
@@ -8666,7 +8667,7 @@
           <a:p>
             <a:fld id="{B9BA6063-779C-4BB6-8BC7-C5993206073F}" type="datetimeFigureOut">
               <a:rPr lang="sr-Latn-CS" smtClean="0"/>
-              <a:t>27.4.2018.</a:t>
+              <a:t>14.5.2018.</a:t>
             </a:fld>
             <a:endParaRPr lang="sr-Latn-CS"/>
           </a:p>
@@ -8946,7 +8947,7 @@
           <a:p>
             <a:fld id="{B9BA6063-779C-4BB6-8BC7-C5993206073F}" type="datetimeFigureOut">
               <a:rPr lang="sr-Latn-CS" smtClean="0"/>
-              <a:t>27.4.2018.</a:t>
+              <a:t>14.5.2018.</a:t>
             </a:fld>
             <a:endParaRPr lang="sr-Latn-CS"/>
           </a:p>
@@ -9062,7 +9063,7 @@
           <a:noFill/>
           <a:extLst>
             <a:ext uri="{909E8E84-426E-40dd-AFC4-6F175D3DCCD1}">
-              <a14:hiddenFill xmlns:a14="http://schemas.microsoft.com/office/drawing/2010/main" xmlns="">
+              <a14:hiddenFill xmlns="" xmlns:a14="http://schemas.microsoft.com/office/drawing/2010/main">
                 <a:solidFill>
                   <a:srgbClr val="FFFFFF"/>
                 </a:solidFill>
@@ -9136,7 +9137,7 @@
               </a:ln>
               <a:extLst>
                 <a:ext uri="{91240B29-F687-4f45-9708-019B960494DF}">
-                  <a14:hiddenLine xmlns:a14="http://schemas.microsoft.com/office/drawing/2010/main" xmlns="" w="9525">
+                  <a14:hiddenLine xmlns="" xmlns:a14="http://schemas.microsoft.com/office/drawing/2010/main" w="9525">
                     <a:solidFill>
                       <a:srgbClr val="000000"/>
                     </a:solidFill>
@@ -9226,7 +9227,7 @@
               </a:ln>
               <a:extLst>
                 <a:ext uri="{91240B29-F687-4f45-9708-019B960494DF}">
-                  <a14:hiddenLine xmlns:a14="http://schemas.microsoft.com/office/drawing/2010/main" xmlns="" w="9525">
+                  <a14:hiddenLine xmlns="" xmlns:a14="http://schemas.microsoft.com/office/drawing/2010/main" w="9525">
                     <a:solidFill>
                       <a:srgbClr val="000000"/>
                     </a:solidFill>
@@ -9316,7 +9317,7 @@
               </a:ln>
               <a:extLst>
                 <a:ext uri="{91240B29-F687-4f45-9708-019B960494DF}">
-                  <a14:hiddenLine xmlns:a14="http://schemas.microsoft.com/office/drawing/2010/main" xmlns="" w="9525">
+                  <a14:hiddenLine xmlns="" xmlns:a14="http://schemas.microsoft.com/office/drawing/2010/main" w="9525">
                     <a:solidFill>
                       <a:srgbClr val="000000"/>
                     </a:solidFill>
@@ -9378,7 +9379,7 @@
               </a:ln>
               <a:extLst>
                 <a:ext uri="{91240B29-F687-4f45-9708-019B960494DF}">
-                  <a14:hiddenLine xmlns:a14="http://schemas.microsoft.com/office/drawing/2010/main" xmlns="" w="9525">
+                  <a14:hiddenLine xmlns="" xmlns:a14="http://schemas.microsoft.com/office/drawing/2010/main" w="9525">
                     <a:solidFill>
                       <a:srgbClr val="000000"/>
                     </a:solidFill>
@@ -9468,7 +9469,7 @@
               </a:ln>
               <a:extLst>
                 <a:ext uri="{91240B29-F687-4f45-9708-019B960494DF}">
-                  <a14:hiddenLine xmlns:a14="http://schemas.microsoft.com/office/drawing/2010/main" xmlns="" w="9525">
+                  <a14:hiddenLine xmlns="" xmlns:a14="http://schemas.microsoft.com/office/drawing/2010/main" w="9525">
                     <a:solidFill>
                       <a:srgbClr val="000000"/>
                     </a:solidFill>
@@ -9530,7 +9531,7 @@
               </a:ln>
               <a:extLst>
                 <a:ext uri="{91240B29-F687-4f45-9708-019B960494DF}">
-                  <a14:hiddenLine xmlns:a14="http://schemas.microsoft.com/office/drawing/2010/main" xmlns="" w="9525">
+                  <a14:hiddenLine xmlns="" xmlns:a14="http://schemas.microsoft.com/office/drawing/2010/main" w="9525">
                     <a:solidFill>
                       <a:srgbClr val="000000"/>
                     </a:solidFill>
@@ -9592,7 +9593,7 @@
               </a:ln>
               <a:extLst>
                 <a:ext uri="{91240B29-F687-4f45-9708-019B960494DF}">
-                  <a14:hiddenLine xmlns:a14="http://schemas.microsoft.com/office/drawing/2010/main" xmlns="" w="9525">
+                  <a14:hiddenLine xmlns="" xmlns:a14="http://schemas.microsoft.com/office/drawing/2010/main" w="9525">
                     <a:solidFill>
                       <a:srgbClr val="000000"/>
                     </a:solidFill>
@@ -9682,7 +9683,7 @@
               </a:ln>
               <a:extLst>
                 <a:ext uri="{91240B29-F687-4f45-9708-019B960494DF}">
-                  <a14:hiddenLine xmlns:a14="http://schemas.microsoft.com/office/drawing/2010/main" xmlns="" w="9525">
+                  <a14:hiddenLine xmlns="" xmlns:a14="http://schemas.microsoft.com/office/drawing/2010/main" w="9525">
                     <a:solidFill>
                       <a:srgbClr val="000000"/>
                     </a:solidFill>
@@ -9772,7 +9773,7 @@
               </a:ln>
               <a:extLst>
                 <a:ext uri="{91240B29-F687-4f45-9708-019B960494DF}">
-                  <a14:hiddenLine xmlns:a14="http://schemas.microsoft.com/office/drawing/2010/main" xmlns="" w="9525">
+                  <a14:hiddenLine xmlns="" xmlns:a14="http://schemas.microsoft.com/office/drawing/2010/main" w="9525">
                     <a:solidFill>
                       <a:srgbClr val="000000"/>
                     </a:solidFill>
@@ -9834,7 +9835,7 @@
               </a:ln>
               <a:extLst>
                 <a:ext uri="{91240B29-F687-4f45-9708-019B960494DF}">
-                  <a14:hiddenLine xmlns:a14="http://schemas.microsoft.com/office/drawing/2010/main" xmlns="" w="9525">
+                  <a14:hiddenLine xmlns="" xmlns:a14="http://schemas.microsoft.com/office/drawing/2010/main" w="9525">
                     <a:solidFill>
                       <a:srgbClr val="000000"/>
                     </a:solidFill>
@@ -9944,7 +9945,7 @@
               </a:ln>
               <a:extLst>
                 <a:ext uri="{91240B29-F687-4f45-9708-019B960494DF}">
-                  <a14:hiddenLine xmlns:a14="http://schemas.microsoft.com/office/drawing/2010/main" xmlns="" w="9525">
+                  <a14:hiddenLine xmlns="" xmlns:a14="http://schemas.microsoft.com/office/drawing/2010/main" w="9525">
                     <a:solidFill>
                       <a:srgbClr val="000000"/>
                     </a:solidFill>
@@ -10028,7 +10029,7 @@
               </a:ln>
               <a:extLst>
                 <a:ext uri="{91240B29-F687-4f45-9708-019B960494DF}">
-                  <a14:hiddenLine xmlns:a14="http://schemas.microsoft.com/office/drawing/2010/main" xmlns="" w="9525">
+                  <a14:hiddenLine xmlns="" xmlns:a14="http://schemas.microsoft.com/office/drawing/2010/main" w="9525">
                     <a:solidFill>
                       <a:srgbClr val="000000"/>
                     </a:solidFill>
@@ -10090,7 +10091,7 @@
               </a:ln>
               <a:extLst>
                 <a:ext uri="{91240B29-F687-4f45-9708-019B960494DF}">
-                  <a14:hiddenLine xmlns:a14="http://schemas.microsoft.com/office/drawing/2010/main" xmlns="" w="9525">
+                  <a14:hiddenLine xmlns="" xmlns:a14="http://schemas.microsoft.com/office/drawing/2010/main" w="9525">
                     <a:solidFill>
                       <a:srgbClr val="000000"/>
                     </a:solidFill>
@@ -10152,7 +10153,7 @@
               </a:ln>
               <a:extLst>
                 <a:ext uri="{91240B29-F687-4f45-9708-019B960494DF}">
-                  <a14:hiddenLine xmlns:a14="http://schemas.microsoft.com/office/drawing/2010/main" xmlns="" w="9525">
+                  <a14:hiddenLine xmlns="" xmlns:a14="http://schemas.microsoft.com/office/drawing/2010/main" w="9525">
                     <a:solidFill>
                       <a:srgbClr val="000000"/>
                     </a:solidFill>
@@ -10242,7 +10243,7 @@
               </a:ln>
               <a:extLst>
                 <a:ext uri="{91240B29-F687-4f45-9708-019B960494DF}">
-                  <a14:hiddenLine xmlns:a14="http://schemas.microsoft.com/office/drawing/2010/main" xmlns="" w="9525">
+                  <a14:hiddenLine xmlns="" xmlns:a14="http://schemas.microsoft.com/office/drawing/2010/main" w="9525">
                     <a:solidFill>
                       <a:srgbClr val="000000"/>
                     </a:solidFill>
@@ -10276,7 +10277,7 @@
               </a:ln>
               <a:extLst>
                 <a:ext uri="{91240B29-F687-4f45-9708-019B960494DF}">
-                  <a14:hiddenLine xmlns:a14="http://schemas.microsoft.com/office/drawing/2010/main" xmlns="" w="9525">
+                  <a14:hiddenLine xmlns="" xmlns:a14="http://schemas.microsoft.com/office/drawing/2010/main" w="9525">
                     <a:solidFill>
                       <a:srgbClr val="000000"/>
                     </a:solidFill>
@@ -10341,7 +10342,7 @@
               </a:ln>
               <a:extLst>
                 <a:ext uri="{91240B29-F687-4f45-9708-019B960494DF}">
-                  <a14:hiddenLine xmlns:a14="http://schemas.microsoft.com/office/drawing/2010/main" xmlns="" w="9525">
+                  <a14:hiddenLine xmlns="" xmlns:a14="http://schemas.microsoft.com/office/drawing/2010/main" w="9525">
                     <a:solidFill>
                       <a:srgbClr val="000000"/>
                     </a:solidFill>
@@ -10431,7 +10432,7 @@
               </a:ln>
               <a:extLst>
                 <a:ext uri="{91240B29-F687-4f45-9708-019B960494DF}">
-                  <a14:hiddenLine xmlns:a14="http://schemas.microsoft.com/office/drawing/2010/main" xmlns="" w="9525">
+                  <a14:hiddenLine xmlns="" xmlns:a14="http://schemas.microsoft.com/office/drawing/2010/main" w="9525">
                     <a:solidFill>
                       <a:srgbClr val="000000"/>
                     </a:solidFill>
@@ -10493,7 +10494,7 @@
               </a:ln>
               <a:extLst>
                 <a:ext uri="{91240B29-F687-4f45-9708-019B960494DF}">
-                  <a14:hiddenLine xmlns:a14="http://schemas.microsoft.com/office/drawing/2010/main" xmlns="" w="9525">
+                  <a14:hiddenLine xmlns="" xmlns:a14="http://schemas.microsoft.com/office/drawing/2010/main" w="9525">
                     <a:solidFill>
                       <a:srgbClr val="000000"/>
                     </a:solidFill>
@@ -10583,7 +10584,7 @@
               </a:ln>
               <a:extLst>
                 <a:ext uri="{91240B29-F687-4f45-9708-019B960494DF}">
-                  <a14:hiddenLine xmlns:a14="http://schemas.microsoft.com/office/drawing/2010/main" xmlns="" w="9525">
+                  <a14:hiddenLine xmlns="" xmlns:a14="http://schemas.microsoft.com/office/drawing/2010/main" w="9525">
                     <a:solidFill>
                       <a:srgbClr val="000000"/>
                     </a:solidFill>
@@ -10648,7 +10649,7 @@
               </a:ln>
               <a:extLst>
                 <a:ext uri="{91240B29-F687-4f45-9708-019B960494DF}">
-                  <a14:hiddenLine xmlns:a14="http://schemas.microsoft.com/office/drawing/2010/main" xmlns="" w="9525">
+                  <a14:hiddenLine xmlns="" xmlns:a14="http://schemas.microsoft.com/office/drawing/2010/main" w="9525">
                     <a:solidFill>
                       <a:srgbClr val="000000"/>
                     </a:solidFill>
@@ -10710,7 +10711,7 @@
               </a:ln>
               <a:extLst>
                 <a:ext uri="{91240B29-F687-4f45-9708-019B960494DF}">
-                  <a14:hiddenLine xmlns:a14="http://schemas.microsoft.com/office/drawing/2010/main" xmlns="" w="9525">
+                  <a14:hiddenLine xmlns="" xmlns:a14="http://schemas.microsoft.com/office/drawing/2010/main" w="9525">
                     <a:solidFill>
                       <a:srgbClr val="000000"/>
                     </a:solidFill>
@@ -10800,7 +10801,7 @@
               </a:ln>
               <a:extLst>
                 <a:ext uri="{91240B29-F687-4f45-9708-019B960494DF}">
-                  <a14:hiddenLine xmlns:a14="http://schemas.microsoft.com/office/drawing/2010/main" xmlns="" w="9525">
+                  <a14:hiddenLine xmlns="" xmlns:a14="http://schemas.microsoft.com/office/drawing/2010/main" w="9525">
                     <a:solidFill>
                       <a:srgbClr val="000000"/>
                     </a:solidFill>
@@ -10890,7 +10891,7 @@
               </a:ln>
               <a:extLst>
                 <a:ext uri="{91240B29-F687-4f45-9708-019B960494DF}">
-                  <a14:hiddenLine xmlns:a14="http://schemas.microsoft.com/office/drawing/2010/main" xmlns="" w="9525">
+                  <a14:hiddenLine xmlns="" xmlns:a14="http://schemas.microsoft.com/office/drawing/2010/main" w="9525">
                     <a:solidFill>
                       <a:srgbClr val="000000"/>
                     </a:solidFill>
@@ -10955,7 +10956,7 @@
               </a:ln>
               <a:extLst>
                 <a:ext uri="{91240B29-F687-4f45-9708-019B960494DF}">
-                  <a14:hiddenLine xmlns:a14="http://schemas.microsoft.com/office/drawing/2010/main" xmlns="" w="9525">
+                  <a14:hiddenLine xmlns="" xmlns:a14="http://schemas.microsoft.com/office/drawing/2010/main" w="9525">
                     <a:solidFill>
                       <a:srgbClr val="000000"/>
                     </a:solidFill>
@@ -11075,7 +11076,7 @@
               </a:ln>
               <a:extLst>
                 <a:ext uri="{91240B29-F687-4f45-9708-019B960494DF}">
-                  <a14:hiddenLine xmlns:a14="http://schemas.microsoft.com/office/drawing/2010/main" xmlns="" w="9525">
+                  <a14:hiddenLine xmlns="" xmlns:a14="http://schemas.microsoft.com/office/drawing/2010/main" w="9525">
                     <a:solidFill>
                       <a:srgbClr val="000000"/>
                     </a:solidFill>
@@ -11173,7 +11174,7 @@
               </a:ln>
               <a:extLst>
                 <a:ext uri="{91240B29-F687-4f45-9708-019B960494DF}">
-                  <a14:hiddenLine xmlns:a14="http://schemas.microsoft.com/office/drawing/2010/main" xmlns="" w="9525">
+                  <a14:hiddenLine xmlns="" xmlns:a14="http://schemas.microsoft.com/office/drawing/2010/main" w="9525">
                     <a:solidFill>
                       <a:srgbClr val="000000"/>
                     </a:solidFill>
@@ -11288,7 +11289,7 @@
               </a:ln>
               <a:extLst>
                 <a:ext uri="{91240B29-F687-4f45-9708-019B960494DF}">
-                  <a14:hiddenLine xmlns:a14="http://schemas.microsoft.com/office/drawing/2010/main" xmlns="" w="9525">
+                  <a14:hiddenLine xmlns="" xmlns:a14="http://schemas.microsoft.com/office/drawing/2010/main" w="9525">
                     <a:solidFill>
                       <a:srgbClr val="000000"/>
                     </a:solidFill>
@@ -11378,7 +11379,7 @@
               </a:ln>
               <a:extLst>
                 <a:ext uri="{91240B29-F687-4f45-9708-019B960494DF}">
-                  <a14:hiddenLine xmlns:a14="http://schemas.microsoft.com/office/drawing/2010/main" xmlns="" w="9525">
+                  <a14:hiddenLine xmlns="" xmlns:a14="http://schemas.microsoft.com/office/drawing/2010/main" w="9525">
                     <a:solidFill>
                       <a:srgbClr val="000000"/>
                     </a:solidFill>
@@ -11443,7 +11444,7 @@
               </a:ln>
               <a:extLst>
                 <a:ext uri="{91240B29-F687-4f45-9708-019B960494DF}">
-                  <a14:hiddenLine xmlns:a14="http://schemas.microsoft.com/office/drawing/2010/main" xmlns="" w="9525">
+                  <a14:hiddenLine xmlns="" xmlns:a14="http://schemas.microsoft.com/office/drawing/2010/main" w="9525">
                     <a:solidFill>
                       <a:srgbClr val="000000"/>
                     </a:solidFill>
@@ -11533,7 +11534,7 @@
               </a:ln>
               <a:extLst>
                 <a:ext uri="{91240B29-F687-4f45-9708-019B960494DF}">
-                  <a14:hiddenLine xmlns:a14="http://schemas.microsoft.com/office/drawing/2010/main" xmlns="" w="9525">
+                  <a14:hiddenLine xmlns="" xmlns:a14="http://schemas.microsoft.com/office/drawing/2010/main" w="9525">
                     <a:solidFill>
                       <a:srgbClr val="000000"/>
                     </a:solidFill>
@@ -11601,7 +11602,7 @@
               </a:ln>
               <a:extLst>
                 <a:ext uri="{91240B29-F687-4f45-9708-019B960494DF}">
-                  <a14:hiddenLine xmlns:a14="http://schemas.microsoft.com/office/drawing/2010/main" xmlns="" w="9525">
+                  <a14:hiddenLine xmlns="" xmlns:a14="http://schemas.microsoft.com/office/drawing/2010/main" w="9525">
                     <a:solidFill>
                       <a:srgbClr val="000000"/>
                     </a:solidFill>
@@ -11691,7 +11692,7 @@
               </a:ln>
               <a:extLst>
                 <a:ext uri="{91240B29-F687-4f45-9708-019B960494DF}">
-                  <a14:hiddenLine xmlns:a14="http://schemas.microsoft.com/office/drawing/2010/main" xmlns="" w="9525">
+                  <a14:hiddenLine xmlns="" xmlns:a14="http://schemas.microsoft.com/office/drawing/2010/main" w="9525">
                     <a:solidFill>
                       <a:srgbClr val="000000"/>
                     </a:solidFill>
@@ -11759,7 +11760,7 @@
               </a:ln>
               <a:extLst>
                 <a:ext uri="{91240B29-F687-4f45-9708-019B960494DF}">
-                  <a14:hiddenLine xmlns:a14="http://schemas.microsoft.com/office/drawing/2010/main" xmlns="" w="9525">
+                  <a14:hiddenLine xmlns="" xmlns:a14="http://schemas.microsoft.com/office/drawing/2010/main" w="9525">
                     <a:solidFill>
                       <a:srgbClr val="000000"/>
                     </a:solidFill>
@@ -11849,7 +11850,7 @@
               </a:ln>
               <a:extLst>
                 <a:ext uri="{91240B29-F687-4f45-9708-019B960494DF}">
-                  <a14:hiddenLine xmlns:a14="http://schemas.microsoft.com/office/drawing/2010/main" xmlns="" w="9525">
+                  <a14:hiddenLine xmlns="" xmlns:a14="http://schemas.microsoft.com/office/drawing/2010/main" w="9525">
                     <a:solidFill>
                       <a:srgbClr val="000000"/>
                     </a:solidFill>
@@ -11883,7 +11884,7 @@
               </a:ln>
               <a:extLst>
                 <a:ext uri="{91240B29-F687-4f45-9708-019B960494DF}">
-                  <a14:hiddenLine xmlns:a14="http://schemas.microsoft.com/office/drawing/2010/main" xmlns="" w="9525">
+                  <a14:hiddenLine xmlns="" xmlns:a14="http://schemas.microsoft.com/office/drawing/2010/main" w="9525">
                     <a:solidFill>
                       <a:srgbClr val="000000"/>
                     </a:solidFill>
@@ -12023,7 +12024,7 @@
           <a:p>
             <a:fld id="{B9BA6063-779C-4BB6-8BC7-C5993206073F}" type="datetimeFigureOut">
               <a:rPr lang="sr-Latn-CS" smtClean="0"/>
-              <a:t>27.4.2018.</a:t>
+              <a:t>14.5.2018.</a:t>
             </a:fld>
             <a:endParaRPr lang="sr-Latn-CS"/>
           </a:p>
@@ -12691,7 +12692,7 @@
           <a:p>
             <a:r>
               <a:rPr lang="en-US" dirty="0"/>
-              <a:t>Latest application is located in branch </a:t>
+              <a:t>Latest insecure application for practice is located in branch </a:t>
             </a:r>
             <a:r>
               <a:rPr lang="en-US" b="1" dirty="0"/>
@@ -12761,7 +12762,7 @@
           <a:p>
             <a:r>
               <a:rPr lang="en-US" dirty="0"/>
-              <a:t>Tools</a:t>
+              <a:t>Tools - JAVA</a:t>
             </a:r>
             <a:endParaRPr lang="sr-Latn-CS" dirty="0"/>
           </a:p>
@@ -12903,7 +12904,7 @@
           <a:p>
             <a:r>
               <a:rPr lang="en-US" dirty="0"/>
-              <a:t>Lesson structure</a:t>
+              <a:t>Tools - .NET</a:t>
             </a:r>
             <a:endParaRPr lang="sr-Latn-CS" dirty="0"/>
           </a:p>
@@ -12926,44 +12927,76 @@
           <a:p>
             <a:r>
               <a:rPr lang="en-US" dirty="0"/>
-              <a:t>Each practical lesson follows the same structure:</a:t>
+              <a:t>You will need following tools:</a:t>
             </a:r>
           </a:p>
           <a:p>
             <a:pPr lvl="1"/>
             <a:r>
               <a:rPr lang="en-US" dirty="0"/>
-              <a:t>Short introductory description</a:t>
+              <a:t>.NET Core (</a:t>
+            </a:r>
+            <a:r>
+              <a:rPr lang="en-US" dirty="0">
+                <a:hlinkClick r:id="rId2"/>
+              </a:rPr>
+              <a:t>https://www.microsoft.com/net/download/Windows/build</a:t>
+            </a:r>
+            <a:r>
+              <a:rPr lang="en-US" dirty="0"/>
+              <a:t>) </a:t>
             </a:r>
           </a:p>
           <a:p>
             <a:pPr lvl="1"/>
             <a:r>
+              <a:rPr lang="sr-Latn-CS" dirty="0"/>
+              <a:t>Node.js latest</a:t>
+            </a:r>
+            <a:r>
               <a:rPr lang="en-US" dirty="0"/>
-              <a:t>Example of the attack</a:t>
+              <a:t> (</a:t>
+            </a:r>
+            <a:r>
+              <a:rPr lang="en-US" dirty="0">
+                <a:hlinkClick r:id="rId3"/>
+              </a:rPr>
+              <a:t>https://nodejs.org/en/download/current/</a:t>
+            </a:r>
+            <a:r>
+              <a:rPr lang="en-US" dirty="0"/>
+              <a:t>)</a:t>
             </a:r>
           </a:p>
           <a:p>
             <a:pPr lvl="1"/>
+            <a:endParaRPr lang="en-US" dirty="0"/>
+          </a:p>
+          <a:p>
             <a:r>
               <a:rPr lang="en-US" dirty="0"/>
-              <a:t>Analysis of the attack</a:t>
-            </a:r>
-          </a:p>
-          <a:p>
-            <a:pPr lvl="1"/>
+              <a:t>Run the application by opening the solution in </a:t>
+            </a:r>
+            <a:r>
+              <a:rPr lang="en-US" b="1" dirty="0" err="1"/>
+              <a:t>SecurityApp</a:t>
+            </a:r>
+            <a:r>
+              <a:rPr lang="en-US" b="1" dirty="0"/>
+              <a:t>\task</a:t>
+            </a:r>
             <a:r>
               <a:rPr lang="en-US" dirty="0"/>
-              <a:t>Task to implement prevention of the attack</a:t>
-            </a:r>
-            <a:endParaRPr lang="sr-Latn-CS" dirty="0"/>
+              <a:t> and running it</a:t>
+            </a:r>
+            <a:endParaRPr lang="en-US" b="1" dirty="0"/>
           </a:p>
         </p:txBody>
       </p:sp>
     </p:spTree>
     <p:extLst>
       <p:ext uri="{BB962C8B-B14F-4D97-AF65-F5344CB8AC3E}">
-        <p14:creationId xmlns:p14="http://schemas.microsoft.com/office/powerpoint/2010/main" val="1465883230"/>
+        <p14:creationId xmlns:p14="http://schemas.microsoft.com/office/powerpoint/2010/main" val="3387743044"/>
       </p:ext>
     </p:extLst>
   </p:cSld>
@@ -13006,12 +13039,8 @@
           <a:lstStyle/>
           <a:p>
             <a:r>
-              <a:rPr lang="en-US" dirty="0" err="1"/>
-              <a:t>TopicS</a:t>
-            </a:r>
-            <a:r>
               <a:rPr lang="en-US" dirty="0"/>
-              <a:t> covered</a:t>
+              <a:t>Lesson structure</a:t>
             </a:r>
             <a:endParaRPr lang="sr-Latn-CS" dirty="0"/>
           </a:p>
@@ -13027,61 +13056,42 @@
             <p:ph idx="1"/>
           </p:nvPr>
         </p:nvSpPr>
-        <p:spPr>
-          <a:xfrm>
-            <a:off x="1141412" y="1845726"/>
-            <a:ext cx="9905999" cy="3541714"/>
-          </a:xfrm>
-        </p:spPr>
+        <p:spPr/>
         <p:txBody>
           <a:bodyPr/>
           <a:lstStyle/>
           <a:p>
             <a:r>
               <a:rPr lang="en-US" dirty="0"/>
-              <a:t>Introduction to security</a:t>
-            </a:r>
-          </a:p>
-          <a:p>
+              <a:t>Each practical lesson follows the same structure:</a:t>
+            </a:r>
+          </a:p>
+          <a:p>
+            <a:pPr lvl="1"/>
             <a:r>
               <a:rPr lang="en-US" dirty="0"/>
-              <a:t>A1 Injection</a:t>
-            </a:r>
-          </a:p>
-          <a:p>
+              <a:t>Short introductory description</a:t>
+            </a:r>
+          </a:p>
+          <a:p>
+            <a:pPr lvl="1"/>
             <a:r>
               <a:rPr lang="en-US" dirty="0"/>
-              <a:t>A2 Broken Authentication and Session Management</a:t>
-            </a:r>
-          </a:p>
-          <a:p>
+              <a:t>Example of the attack</a:t>
+            </a:r>
+          </a:p>
+          <a:p>
+            <a:pPr lvl="1"/>
             <a:r>
               <a:rPr lang="en-US" dirty="0"/>
-              <a:t>A3 Cross-Site Scripting (XSS)</a:t>
-            </a:r>
-          </a:p>
-          <a:p>
+              <a:t>Analysis of the attack</a:t>
+            </a:r>
+          </a:p>
+          <a:p>
+            <a:pPr lvl="1"/>
             <a:r>
               <a:rPr lang="en-US" dirty="0"/>
-              <a:t>A4 Insecure Direct Object References</a:t>
-            </a:r>
-          </a:p>
-          <a:p>
-            <a:r>
-              <a:rPr lang="en-US" dirty="0"/>
-              <a:t>A6 Sensitive Data Exposure</a:t>
-            </a:r>
-          </a:p>
-          <a:p>
-            <a:r>
-              <a:rPr lang="en-US" dirty="0"/>
-              <a:t>A7 Missing Function Level Access Control</a:t>
-            </a:r>
-          </a:p>
-          <a:p>
-            <a:r>
-              <a:rPr lang="en-US" dirty="0"/>
-              <a:t>A8 Cross-Site Request Forgery (CSRF)</a:t>
+              <a:t>Task to implement prevention of the attack</a:t>
             </a:r>
             <a:endParaRPr lang="sr-Latn-CS" dirty="0"/>
           </a:p>
@@ -13090,7 +13100,7 @@
     </p:spTree>
     <p:extLst>
       <p:ext uri="{BB962C8B-B14F-4D97-AF65-F5344CB8AC3E}">
-        <p14:creationId xmlns:p14="http://schemas.microsoft.com/office/powerpoint/2010/main" val="3182549279"/>
+        <p14:creationId xmlns:p14="http://schemas.microsoft.com/office/powerpoint/2010/main" val="1465883230"/>
       </p:ext>
     </p:extLst>
   </p:cSld>
@@ -13133,6 +13143,133 @@
           <a:lstStyle/>
           <a:p>
             <a:r>
+              <a:rPr lang="en-US" dirty="0" err="1"/>
+              <a:t>TopicS</a:t>
+            </a:r>
+            <a:r>
+              <a:rPr lang="en-US" dirty="0"/>
+              <a:t> covered</a:t>
+            </a:r>
+            <a:endParaRPr lang="sr-Latn-CS" dirty="0"/>
+          </a:p>
+        </p:txBody>
+      </p:sp>
+      <p:sp>
+        <p:nvSpPr>
+          <p:cNvPr id="3" name="Content Placeholder 2"/>
+          <p:cNvSpPr>
+            <a:spLocks noGrp="1"/>
+          </p:cNvSpPr>
+          <p:nvPr>
+            <p:ph idx="1"/>
+          </p:nvPr>
+        </p:nvSpPr>
+        <p:spPr>
+          <a:xfrm>
+            <a:off x="1141412" y="1845726"/>
+            <a:ext cx="9905999" cy="3541714"/>
+          </a:xfrm>
+        </p:spPr>
+        <p:txBody>
+          <a:bodyPr/>
+          <a:lstStyle/>
+          <a:p>
+            <a:r>
+              <a:rPr lang="en-US" dirty="0"/>
+              <a:t>Introduction to security</a:t>
+            </a:r>
+          </a:p>
+          <a:p>
+            <a:r>
+              <a:rPr lang="en-US" dirty="0"/>
+              <a:t>A1 Injection</a:t>
+            </a:r>
+          </a:p>
+          <a:p>
+            <a:r>
+              <a:rPr lang="en-US" dirty="0"/>
+              <a:t>A2 Broken Authentication and Session Management</a:t>
+            </a:r>
+          </a:p>
+          <a:p>
+            <a:r>
+              <a:rPr lang="en-US" dirty="0"/>
+              <a:t>A3 Cross-Site Scripting (XSS)</a:t>
+            </a:r>
+          </a:p>
+          <a:p>
+            <a:r>
+              <a:rPr lang="en-US" dirty="0"/>
+              <a:t>A4 Insecure Direct Object References</a:t>
+            </a:r>
+          </a:p>
+          <a:p>
+            <a:r>
+              <a:rPr lang="en-US" dirty="0"/>
+              <a:t>A6 Sensitive Data Exposure</a:t>
+            </a:r>
+          </a:p>
+          <a:p>
+            <a:r>
+              <a:rPr lang="en-US" dirty="0"/>
+              <a:t>A7 Missing Function Level Access Control</a:t>
+            </a:r>
+          </a:p>
+          <a:p>
+            <a:r>
+              <a:rPr lang="en-US" dirty="0"/>
+              <a:t>A8 Cross-Site Request Forgery (CSRF)</a:t>
+            </a:r>
+            <a:endParaRPr lang="sr-Latn-CS" dirty="0"/>
+          </a:p>
+        </p:txBody>
+      </p:sp>
+    </p:spTree>
+    <p:extLst>
+      <p:ext uri="{BB962C8B-B14F-4D97-AF65-F5344CB8AC3E}">
+        <p14:creationId xmlns:p14="http://schemas.microsoft.com/office/powerpoint/2010/main" val="3182549279"/>
+      </p:ext>
+    </p:extLst>
+  </p:cSld>
+  <p:clrMapOvr>
+    <a:masterClrMapping/>
+  </p:clrMapOvr>
+</p:sld>
+</file>
+
+<file path=ppt/slides/slide8.xml><?xml version="1.0" encoding="utf-8"?>
+<p:sld xmlns:a="http://schemas.openxmlformats.org/drawingml/2006/main" xmlns:r="http://schemas.openxmlformats.org/officeDocument/2006/relationships" xmlns:p="http://schemas.openxmlformats.org/presentationml/2006/main">
+  <p:cSld>
+    <p:spTree>
+      <p:nvGrpSpPr>
+        <p:cNvPr id="1" name=""/>
+        <p:cNvGrpSpPr/>
+        <p:nvPr/>
+      </p:nvGrpSpPr>
+      <p:grpSpPr>
+        <a:xfrm>
+          <a:off x="0" y="0"/>
+          <a:ext cx="0" cy="0"/>
+          <a:chOff x="0" y="0"/>
+          <a:chExt cx="0" cy="0"/>
+        </a:xfrm>
+      </p:grpSpPr>
+      <p:sp>
+        <p:nvSpPr>
+          <p:cNvPr id="2" name="Title 1"/>
+          <p:cNvSpPr>
+            <a:spLocks noGrp="1"/>
+          </p:cNvSpPr>
+          <p:nvPr>
+            <p:ph type="title"/>
+          </p:nvPr>
+        </p:nvSpPr>
+        <p:spPr/>
+        <p:txBody>
+          <a:bodyPr/>
+          <a:lstStyle/>
+          <a:p>
+            <a:r>
               <a:rPr lang="en-US" dirty="0"/>
               <a:t>Contact</a:t>
             </a:r>
@@ -13204,7 +13341,7 @@
 </p:sld>
 </file>
 
-<file path=ppt/slides/slide8.xml><?xml version="1.0" encoding="utf-8"?>
+<file path=ppt/slides/slide9.xml><?xml version="1.0" encoding="utf-8"?>
 <p:sld xmlns:a="http://schemas.openxmlformats.org/drawingml/2006/main" xmlns:r="http://schemas.openxmlformats.org/officeDocument/2006/relationships" xmlns:p="http://schemas.openxmlformats.org/presentationml/2006/main">
   <p:cSld>
     <p:spTree>

</xml_diff>

<commit_message>
Changed running tutorial for insecure .net web app
</commit_message>
<xml_diff>
--- a/security/00-Introduction/Introduction.pptx
+++ b/security/00-Introduction/Introduction.pptx
@@ -170,7 +170,7 @@
           <a:noFill/>
           <a:extLst>
             <a:ext uri="{909E8E84-426E-40dd-AFC4-6F175D3DCCD1}">
-              <a14:hiddenFill xmlns="" xmlns:a14="http://schemas.microsoft.com/office/drawing/2010/main">
+              <a14:hiddenFill xmlns:a14="http://schemas.microsoft.com/office/drawing/2010/main" xmlns="">
                 <a:solidFill>
                   <a:srgbClr val="FFFFFF"/>
                 </a:solidFill>
@@ -230,7 +230,7 @@
             </a:ln>
             <a:extLst>
               <a:ext uri="{91240B29-F687-4f45-9708-019B960494DF}">
-                <a14:hiddenLine xmlns="" xmlns:a14="http://schemas.microsoft.com/office/drawing/2010/main" w="9525">
+                <a14:hiddenLine xmlns:a14="http://schemas.microsoft.com/office/drawing/2010/main" xmlns="" w="9525">
                   <a:solidFill>
                     <a:srgbClr val="000000"/>
                   </a:solidFill>
@@ -320,7 +320,7 @@
             </a:ln>
             <a:extLst>
               <a:ext uri="{91240B29-F687-4f45-9708-019B960494DF}">
-                <a14:hiddenLine xmlns="" xmlns:a14="http://schemas.microsoft.com/office/drawing/2010/main" w="9525">
+                <a14:hiddenLine xmlns:a14="http://schemas.microsoft.com/office/drawing/2010/main" xmlns="" w="9525">
                   <a:solidFill>
                     <a:srgbClr val="000000"/>
                   </a:solidFill>
@@ -410,7 +410,7 @@
             </a:ln>
             <a:extLst>
               <a:ext uri="{91240B29-F687-4f45-9708-019B960494DF}">
-                <a14:hiddenLine xmlns="" xmlns:a14="http://schemas.microsoft.com/office/drawing/2010/main" w="9525">
+                <a14:hiddenLine xmlns:a14="http://schemas.microsoft.com/office/drawing/2010/main" xmlns="" w="9525">
                   <a:solidFill>
                     <a:srgbClr val="000000"/>
                   </a:solidFill>
@@ -444,7 +444,7 @@
             </a:ln>
             <a:extLst>
               <a:ext uri="{91240B29-F687-4f45-9708-019B960494DF}">
-                <a14:hiddenLine xmlns="" xmlns:a14="http://schemas.microsoft.com/office/drawing/2010/main" w="9525">
+                <a14:hiddenLine xmlns:a14="http://schemas.microsoft.com/office/drawing/2010/main" xmlns="" w="9525">
                   <a:solidFill>
                     <a:srgbClr val="000000"/>
                   </a:solidFill>
@@ -534,7 +534,7 @@
             </a:ln>
             <a:extLst>
               <a:ext uri="{91240B29-F687-4f45-9708-019B960494DF}">
-                <a14:hiddenLine xmlns="" xmlns:a14="http://schemas.microsoft.com/office/drawing/2010/main" w="9525">
+                <a14:hiddenLine xmlns:a14="http://schemas.microsoft.com/office/drawing/2010/main" xmlns="" w="9525">
                   <a:solidFill>
                     <a:srgbClr val="000000"/>
                   </a:solidFill>
@@ -596,7 +596,7 @@
             </a:ln>
             <a:extLst>
               <a:ext uri="{91240B29-F687-4f45-9708-019B960494DF}">
-                <a14:hiddenLine xmlns="" xmlns:a14="http://schemas.microsoft.com/office/drawing/2010/main" w="9525">
+                <a14:hiddenLine xmlns:a14="http://schemas.microsoft.com/office/drawing/2010/main" xmlns="" w="9525">
                   <a:solidFill>
                     <a:srgbClr val="000000"/>
                   </a:solidFill>
@@ -658,7 +658,7 @@
             </a:ln>
             <a:extLst>
               <a:ext uri="{91240B29-F687-4f45-9708-019B960494DF}">
-                <a14:hiddenLine xmlns="" xmlns:a14="http://schemas.microsoft.com/office/drawing/2010/main" w="9525">
+                <a14:hiddenLine xmlns:a14="http://schemas.microsoft.com/office/drawing/2010/main" xmlns="" w="9525">
                   <a:solidFill>
                     <a:srgbClr val="000000"/>
                   </a:solidFill>
@@ -748,7 +748,7 @@
             </a:ln>
             <a:extLst>
               <a:ext uri="{91240B29-F687-4f45-9708-019B960494DF}">
-                <a14:hiddenLine xmlns="" xmlns:a14="http://schemas.microsoft.com/office/drawing/2010/main" w="9525">
+                <a14:hiddenLine xmlns:a14="http://schemas.microsoft.com/office/drawing/2010/main" xmlns="" w="9525">
                   <a:solidFill>
                     <a:srgbClr val="000000"/>
                   </a:solidFill>
@@ -810,7 +810,7 @@
             </a:ln>
             <a:extLst>
               <a:ext uri="{91240B29-F687-4f45-9708-019B960494DF}">
-                <a14:hiddenLine xmlns="" xmlns:a14="http://schemas.microsoft.com/office/drawing/2010/main" w="9525">
+                <a14:hiddenLine xmlns:a14="http://schemas.microsoft.com/office/drawing/2010/main" xmlns="" w="9525">
                   <a:solidFill>
                     <a:srgbClr val="000000"/>
                   </a:solidFill>
@@ -872,7 +872,7 @@
             </a:ln>
             <a:extLst>
               <a:ext uri="{91240B29-F687-4f45-9708-019B960494DF}">
-                <a14:hiddenLine xmlns="" xmlns:a14="http://schemas.microsoft.com/office/drawing/2010/main" w="9525">
+                <a14:hiddenLine xmlns:a14="http://schemas.microsoft.com/office/drawing/2010/main" xmlns="" w="9525">
                   <a:solidFill>
                     <a:srgbClr val="000000"/>
                   </a:solidFill>
@@ -962,7 +962,7 @@
             </a:ln>
             <a:extLst>
               <a:ext uri="{91240B29-F687-4f45-9708-019B960494DF}">
-                <a14:hiddenLine xmlns="" xmlns:a14="http://schemas.microsoft.com/office/drawing/2010/main" w="9525">
+                <a14:hiddenLine xmlns:a14="http://schemas.microsoft.com/office/drawing/2010/main" xmlns="" w="9525">
                   <a:solidFill>
                     <a:srgbClr val="000000"/>
                   </a:solidFill>
@@ -1052,7 +1052,7 @@
             </a:ln>
             <a:extLst>
               <a:ext uri="{91240B29-F687-4f45-9708-019B960494DF}">
-                <a14:hiddenLine xmlns="" xmlns:a14="http://schemas.microsoft.com/office/drawing/2010/main" w="9525">
+                <a14:hiddenLine xmlns:a14="http://schemas.microsoft.com/office/drawing/2010/main" xmlns="" w="9525">
                   <a:solidFill>
                     <a:srgbClr val="000000"/>
                   </a:solidFill>
@@ -1114,7 +1114,7 @@
             </a:ln>
             <a:extLst>
               <a:ext uri="{91240B29-F687-4f45-9708-019B960494DF}">
-                <a14:hiddenLine xmlns="" xmlns:a14="http://schemas.microsoft.com/office/drawing/2010/main" w="9525">
+                <a14:hiddenLine xmlns:a14="http://schemas.microsoft.com/office/drawing/2010/main" xmlns="" w="9525">
                   <a:solidFill>
                     <a:srgbClr val="000000"/>
                   </a:solidFill>
@@ -1224,7 +1224,7 @@
             </a:ln>
             <a:extLst>
               <a:ext uri="{91240B29-F687-4f45-9708-019B960494DF}">
-                <a14:hiddenLine xmlns="" xmlns:a14="http://schemas.microsoft.com/office/drawing/2010/main" w="9525">
+                <a14:hiddenLine xmlns:a14="http://schemas.microsoft.com/office/drawing/2010/main" xmlns="" w="9525">
                   <a:solidFill>
                     <a:srgbClr val="000000"/>
                   </a:solidFill>
@@ -1286,7 +1286,7 @@
             </a:ln>
             <a:extLst>
               <a:ext uri="{91240B29-F687-4f45-9708-019B960494DF}">
-                <a14:hiddenLine xmlns="" xmlns:a14="http://schemas.microsoft.com/office/drawing/2010/main" w="9525">
+                <a14:hiddenLine xmlns:a14="http://schemas.microsoft.com/office/drawing/2010/main" xmlns="" w="9525">
                   <a:solidFill>
                     <a:srgbClr val="000000"/>
                   </a:solidFill>
@@ -1376,7 +1376,7 @@
             </a:ln>
             <a:extLst>
               <a:ext uri="{91240B29-F687-4f45-9708-019B960494DF}">
-                <a14:hiddenLine xmlns="" xmlns:a14="http://schemas.microsoft.com/office/drawing/2010/main" w="9525">
+                <a14:hiddenLine xmlns:a14="http://schemas.microsoft.com/office/drawing/2010/main" xmlns="" w="9525">
                   <a:solidFill>
                     <a:srgbClr val="000000"/>
                   </a:solidFill>
@@ -1466,7 +1466,7 @@
             </a:ln>
             <a:extLst>
               <a:ext uri="{91240B29-F687-4f45-9708-019B960494DF}">
-                <a14:hiddenLine xmlns="" xmlns:a14="http://schemas.microsoft.com/office/drawing/2010/main" w="9525">
+                <a14:hiddenLine xmlns:a14="http://schemas.microsoft.com/office/drawing/2010/main" xmlns="" w="9525">
                   <a:solidFill>
                     <a:srgbClr val="000000"/>
                   </a:solidFill>
@@ -1528,7 +1528,7 @@
             </a:ln>
             <a:extLst>
               <a:ext uri="{91240B29-F687-4f45-9708-019B960494DF}">
-                <a14:hiddenLine xmlns="" xmlns:a14="http://schemas.microsoft.com/office/drawing/2010/main" w="9525">
+                <a14:hiddenLine xmlns:a14="http://schemas.microsoft.com/office/drawing/2010/main" xmlns="" w="9525">
                   <a:solidFill>
                     <a:srgbClr val="000000"/>
                   </a:solidFill>
@@ -1618,7 +1618,7 @@
             </a:ln>
             <a:extLst>
               <a:ext uri="{91240B29-F687-4f45-9708-019B960494DF}">
-                <a14:hiddenLine xmlns="" xmlns:a14="http://schemas.microsoft.com/office/drawing/2010/main" w="9525">
+                <a14:hiddenLine xmlns:a14="http://schemas.microsoft.com/office/drawing/2010/main" xmlns="" w="9525">
                   <a:solidFill>
                     <a:srgbClr val="000000"/>
                   </a:solidFill>
@@ -1708,7 +1708,7 @@
             </a:ln>
             <a:extLst>
               <a:ext uri="{91240B29-F687-4f45-9708-019B960494DF}">
-                <a14:hiddenLine xmlns="" xmlns:a14="http://schemas.microsoft.com/office/drawing/2010/main" w="9525">
+                <a14:hiddenLine xmlns:a14="http://schemas.microsoft.com/office/drawing/2010/main" xmlns="" w="9525">
                   <a:solidFill>
                     <a:srgbClr val="000000"/>
                   </a:solidFill>
@@ -1764,7 +1764,7 @@
             </a:ln>
             <a:extLst>
               <a:ext uri="{91240B29-F687-4f45-9708-019B960494DF}">
-                <a14:hiddenLine xmlns="" xmlns:a14="http://schemas.microsoft.com/office/drawing/2010/main" w="9525">
+                <a14:hiddenLine xmlns:a14="http://schemas.microsoft.com/office/drawing/2010/main" xmlns="" w="9525">
                   <a:solidFill>
                     <a:srgbClr val="000000"/>
                   </a:solidFill>
@@ -1854,7 +1854,7 @@
             </a:ln>
             <a:extLst>
               <a:ext uri="{91240B29-F687-4f45-9708-019B960494DF}">
-                <a14:hiddenLine xmlns="" xmlns:a14="http://schemas.microsoft.com/office/drawing/2010/main" w="9525">
+                <a14:hiddenLine xmlns:a14="http://schemas.microsoft.com/office/drawing/2010/main" xmlns="" w="9525">
                   <a:solidFill>
                     <a:srgbClr val="000000"/>
                   </a:solidFill>
@@ -1910,7 +1910,7 @@
             </a:ln>
             <a:extLst>
               <a:ext uri="{91240B29-F687-4f45-9708-019B960494DF}">
-                <a14:hiddenLine xmlns="" xmlns:a14="http://schemas.microsoft.com/office/drawing/2010/main" w="9525">
+                <a14:hiddenLine xmlns:a14="http://schemas.microsoft.com/office/drawing/2010/main" xmlns="" w="9525">
                   <a:solidFill>
                     <a:srgbClr val="000000"/>
                   </a:solidFill>
@@ -2000,7 +2000,7 @@
             </a:ln>
             <a:extLst>
               <a:ext uri="{91240B29-F687-4f45-9708-019B960494DF}">
-                <a14:hiddenLine xmlns="" xmlns:a14="http://schemas.microsoft.com/office/drawing/2010/main" w="9525">
+                <a14:hiddenLine xmlns:a14="http://schemas.microsoft.com/office/drawing/2010/main" xmlns="" w="9525">
                   <a:solidFill>
                     <a:srgbClr val="000000"/>
                   </a:solidFill>
@@ -2068,7 +2068,7 @@
             </a:ln>
             <a:extLst>
               <a:ext uri="{91240B29-F687-4f45-9708-019B960494DF}">
-                <a14:hiddenLine xmlns="" xmlns:a14="http://schemas.microsoft.com/office/drawing/2010/main" w="9525">
+                <a14:hiddenLine xmlns:a14="http://schemas.microsoft.com/office/drawing/2010/main" xmlns="" w="9525">
                   <a:solidFill>
                     <a:srgbClr val="000000"/>
                   </a:solidFill>
@@ -2158,7 +2158,7 @@
             </a:ln>
             <a:extLst>
               <a:ext uri="{91240B29-F687-4f45-9708-019B960494DF}">
-                <a14:hiddenLine xmlns="" xmlns:a14="http://schemas.microsoft.com/office/drawing/2010/main" w="9525">
+                <a14:hiddenLine xmlns:a14="http://schemas.microsoft.com/office/drawing/2010/main" xmlns="" w="9525">
                   <a:solidFill>
                     <a:srgbClr val="000000"/>
                   </a:solidFill>
@@ -2226,7 +2226,7 @@
             </a:ln>
             <a:extLst>
               <a:ext uri="{91240B29-F687-4f45-9708-019B960494DF}">
-                <a14:hiddenLine xmlns="" xmlns:a14="http://schemas.microsoft.com/office/drawing/2010/main" w="9525">
+                <a14:hiddenLine xmlns:a14="http://schemas.microsoft.com/office/drawing/2010/main" xmlns="" w="9525">
                   <a:solidFill>
                     <a:srgbClr val="000000"/>
                   </a:solidFill>
@@ -2316,7 +2316,7 @@
             </a:ln>
             <a:extLst>
               <a:ext uri="{91240B29-F687-4f45-9708-019B960494DF}">
-                <a14:hiddenLine xmlns="" xmlns:a14="http://schemas.microsoft.com/office/drawing/2010/main" w="9525">
+                <a14:hiddenLine xmlns:a14="http://schemas.microsoft.com/office/drawing/2010/main" xmlns="" w="9525">
                   <a:solidFill>
                     <a:srgbClr val="000000"/>
                   </a:solidFill>
@@ -2350,7 +2350,7 @@
             </a:ln>
             <a:extLst>
               <a:ext uri="{91240B29-F687-4f45-9708-019B960494DF}">
-                <a14:hiddenLine xmlns="" xmlns:a14="http://schemas.microsoft.com/office/drawing/2010/main" w="9525">
+                <a14:hiddenLine xmlns:a14="http://schemas.microsoft.com/office/drawing/2010/main" xmlns="" w="9525">
                   <a:solidFill>
                     <a:srgbClr val="000000"/>
                   </a:solidFill>
@@ -2440,7 +2440,7 @@
             </a:ln>
             <a:extLst>
               <a:ext uri="{91240B29-F687-4f45-9708-019B960494DF}">
-                <a14:hiddenLine xmlns="" xmlns:a14="http://schemas.microsoft.com/office/drawing/2010/main" w="9525">
+                <a14:hiddenLine xmlns:a14="http://schemas.microsoft.com/office/drawing/2010/main" xmlns="" w="9525">
                   <a:solidFill>
                     <a:srgbClr val="000000"/>
                   </a:solidFill>
@@ -2502,7 +2502,7 @@
             </a:ln>
             <a:extLst>
               <a:ext uri="{91240B29-F687-4f45-9708-019B960494DF}">
-                <a14:hiddenLine xmlns="" xmlns:a14="http://schemas.microsoft.com/office/drawing/2010/main" w="9525">
+                <a14:hiddenLine xmlns:a14="http://schemas.microsoft.com/office/drawing/2010/main" xmlns="" w="9525">
                   <a:solidFill>
                     <a:srgbClr val="000000"/>
                   </a:solidFill>
@@ -2564,7 +2564,7 @@
             </a:ln>
             <a:extLst>
               <a:ext uri="{91240B29-F687-4f45-9708-019B960494DF}">
-                <a14:hiddenLine xmlns="" xmlns:a14="http://schemas.microsoft.com/office/drawing/2010/main" w="9525">
+                <a14:hiddenLine xmlns:a14="http://schemas.microsoft.com/office/drawing/2010/main" xmlns="" w="9525">
                   <a:solidFill>
                     <a:srgbClr val="000000"/>
                   </a:solidFill>
@@ -2654,7 +2654,7 @@
             </a:ln>
             <a:extLst>
               <a:ext uri="{91240B29-F687-4f45-9708-019B960494DF}">
-                <a14:hiddenLine xmlns="" xmlns:a14="http://schemas.microsoft.com/office/drawing/2010/main" w="9525">
+                <a14:hiddenLine xmlns:a14="http://schemas.microsoft.com/office/drawing/2010/main" xmlns="" w="9525">
                   <a:solidFill>
                     <a:srgbClr val="000000"/>
                   </a:solidFill>
@@ -2722,7 +2722,7 @@
             </a:ln>
             <a:extLst>
               <a:ext uri="{91240B29-F687-4f45-9708-019B960494DF}">
-                <a14:hiddenLine xmlns="" xmlns:a14="http://schemas.microsoft.com/office/drawing/2010/main" w="9525">
+                <a14:hiddenLine xmlns:a14="http://schemas.microsoft.com/office/drawing/2010/main" xmlns="" w="9525">
                   <a:solidFill>
                     <a:srgbClr val="000000"/>
                   </a:solidFill>
@@ -2784,7 +2784,7 @@
             </a:ln>
             <a:extLst>
               <a:ext uri="{91240B29-F687-4f45-9708-019B960494DF}">
-                <a14:hiddenLine xmlns="" xmlns:a14="http://schemas.microsoft.com/office/drawing/2010/main" w="9525">
+                <a14:hiddenLine xmlns:a14="http://schemas.microsoft.com/office/drawing/2010/main" xmlns="" w="9525">
                   <a:solidFill>
                     <a:srgbClr val="000000"/>
                   </a:solidFill>
@@ -2874,7 +2874,7 @@
             </a:ln>
             <a:extLst>
               <a:ext uri="{91240B29-F687-4f45-9708-019B960494DF}">
-                <a14:hiddenLine xmlns="" xmlns:a14="http://schemas.microsoft.com/office/drawing/2010/main" w="9525">
+                <a14:hiddenLine xmlns:a14="http://schemas.microsoft.com/office/drawing/2010/main" xmlns="" w="9525">
                   <a:solidFill>
                     <a:srgbClr val="000000"/>
                   </a:solidFill>
@@ -2936,7 +2936,7 @@
             </a:ln>
             <a:extLst>
               <a:ext uri="{91240B29-F687-4f45-9708-019B960494DF}">
-                <a14:hiddenLine xmlns="" xmlns:a14="http://schemas.microsoft.com/office/drawing/2010/main" w="9525">
+                <a14:hiddenLine xmlns:a14="http://schemas.microsoft.com/office/drawing/2010/main" xmlns="" w="9525">
                   <a:solidFill>
                     <a:srgbClr val="000000"/>
                   </a:solidFill>
@@ -3026,7 +3026,7 @@
             </a:ln>
             <a:extLst>
               <a:ext uri="{91240B29-F687-4f45-9708-019B960494DF}">
-                <a14:hiddenLine xmlns="" xmlns:a14="http://schemas.microsoft.com/office/drawing/2010/main" w="9525">
+                <a14:hiddenLine xmlns:a14="http://schemas.microsoft.com/office/drawing/2010/main" xmlns="" w="9525">
                   <a:solidFill>
                     <a:srgbClr val="000000"/>
                   </a:solidFill>
@@ -3088,7 +3088,7 @@
             </a:ln>
             <a:extLst>
               <a:ext uri="{91240B29-F687-4f45-9708-019B960494DF}">
-                <a14:hiddenLine xmlns="" xmlns:a14="http://schemas.microsoft.com/office/drawing/2010/main" w="9525">
+                <a14:hiddenLine xmlns:a14="http://schemas.microsoft.com/office/drawing/2010/main" xmlns="" w="9525">
                   <a:solidFill>
                     <a:srgbClr val="000000"/>
                   </a:solidFill>
@@ -3178,7 +3178,7 @@
             </a:ln>
             <a:extLst>
               <a:ext uri="{91240B29-F687-4f45-9708-019B960494DF}">
-                <a14:hiddenLine xmlns="" xmlns:a14="http://schemas.microsoft.com/office/drawing/2010/main" w="9525">
+                <a14:hiddenLine xmlns:a14="http://schemas.microsoft.com/office/drawing/2010/main" xmlns="" w="9525">
                   <a:solidFill>
                     <a:srgbClr val="000000"/>
                   </a:solidFill>
@@ -3212,7 +3212,7 @@
             </a:ln>
             <a:extLst>
               <a:ext uri="{91240B29-F687-4f45-9708-019B960494DF}">
-                <a14:hiddenLine xmlns="" xmlns:a14="http://schemas.microsoft.com/office/drawing/2010/main" w="9525">
+                <a14:hiddenLine xmlns:a14="http://schemas.microsoft.com/office/drawing/2010/main" xmlns="" w="9525">
                   <a:solidFill>
                     <a:srgbClr val="000000"/>
                   </a:solidFill>
@@ -3277,7 +3277,7 @@
             </a:ln>
             <a:extLst>
               <a:ext uri="{91240B29-F687-4f45-9708-019B960494DF}">
-                <a14:hiddenLine xmlns="" xmlns:a14="http://schemas.microsoft.com/office/drawing/2010/main" w="9525">
+                <a14:hiddenLine xmlns:a14="http://schemas.microsoft.com/office/drawing/2010/main" xmlns="" w="9525">
                   <a:solidFill>
                     <a:srgbClr val="000000"/>
                   </a:solidFill>
@@ -3367,7 +3367,7 @@
             </a:ln>
             <a:extLst>
               <a:ext uri="{91240B29-F687-4f45-9708-019B960494DF}">
-                <a14:hiddenLine xmlns="" xmlns:a14="http://schemas.microsoft.com/office/drawing/2010/main" w="9525">
+                <a14:hiddenLine xmlns:a14="http://schemas.microsoft.com/office/drawing/2010/main" xmlns="" w="9525">
                   <a:solidFill>
                     <a:srgbClr val="000000"/>
                   </a:solidFill>
@@ -3429,7 +3429,7 @@
             </a:ln>
             <a:extLst>
               <a:ext uri="{91240B29-F687-4f45-9708-019B960494DF}">
-                <a14:hiddenLine xmlns="" xmlns:a14="http://schemas.microsoft.com/office/drawing/2010/main" w="9525">
+                <a14:hiddenLine xmlns:a14="http://schemas.microsoft.com/office/drawing/2010/main" xmlns="" w="9525">
                   <a:solidFill>
                     <a:srgbClr val="000000"/>
                   </a:solidFill>
@@ -3519,7 +3519,7 @@
             </a:ln>
             <a:extLst>
               <a:ext uri="{91240B29-F687-4f45-9708-019B960494DF}">
-                <a14:hiddenLine xmlns="" xmlns:a14="http://schemas.microsoft.com/office/drawing/2010/main" w="9525">
+                <a14:hiddenLine xmlns:a14="http://schemas.microsoft.com/office/drawing/2010/main" xmlns="" w="9525">
                   <a:solidFill>
                     <a:srgbClr val="000000"/>
                   </a:solidFill>
@@ -3609,7 +3609,7 @@
             </a:ln>
             <a:extLst>
               <a:ext uri="{91240B29-F687-4f45-9708-019B960494DF}">
-                <a14:hiddenLine xmlns="" xmlns:a14="http://schemas.microsoft.com/office/drawing/2010/main" w="9525">
+                <a14:hiddenLine xmlns:a14="http://schemas.microsoft.com/office/drawing/2010/main" xmlns="" w="9525">
                   <a:solidFill>
                     <a:srgbClr val="000000"/>
                   </a:solidFill>
@@ -3674,7 +3674,7 @@
             </a:ln>
             <a:extLst>
               <a:ext uri="{91240B29-F687-4f45-9708-019B960494DF}">
-                <a14:hiddenLine xmlns="" xmlns:a14="http://schemas.microsoft.com/office/drawing/2010/main" w="9525">
+                <a14:hiddenLine xmlns:a14="http://schemas.microsoft.com/office/drawing/2010/main" xmlns="" w="9525">
                   <a:solidFill>
                     <a:srgbClr val="000000"/>
                   </a:solidFill>
@@ -3736,7 +3736,7 @@
             </a:ln>
             <a:extLst>
               <a:ext uri="{91240B29-F687-4f45-9708-019B960494DF}">
-                <a14:hiddenLine xmlns="" xmlns:a14="http://schemas.microsoft.com/office/drawing/2010/main" w="9525">
+                <a14:hiddenLine xmlns:a14="http://schemas.microsoft.com/office/drawing/2010/main" xmlns="" w="9525">
                   <a:solidFill>
                     <a:srgbClr val="000000"/>
                   </a:solidFill>
@@ -3826,7 +3826,7 @@
             </a:ln>
             <a:extLst>
               <a:ext uri="{91240B29-F687-4f45-9708-019B960494DF}">
-                <a14:hiddenLine xmlns="" xmlns:a14="http://schemas.microsoft.com/office/drawing/2010/main" w="9525">
+                <a14:hiddenLine xmlns:a14="http://schemas.microsoft.com/office/drawing/2010/main" xmlns="" w="9525">
                   <a:solidFill>
                     <a:srgbClr val="000000"/>
                   </a:solidFill>
@@ -3916,7 +3916,7 @@
             </a:ln>
             <a:extLst>
               <a:ext uri="{91240B29-F687-4f45-9708-019B960494DF}">
-                <a14:hiddenLine xmlns="" xmlns:a14="http://schemas.microsoft.com/office/drawing/2010/main" w="9525">
+                <a14:hiddenLine xmlns:a14="http://schemas.microsoft.com/office/drawing/2010/main" xmlns="" w="9525">
                   <a:solidFill>
                     <a:srgbClr val="000000"/>
                   </a:solidFill>
@@ -3978,7 +3978,7 @@
             </a:ln>
             <a:extLst>
               <a:ext uri="{91240B29-F687-4f45-9708-019B960494DF}">
-                <a14:hiddenLine xmlns="" xmlns:a14="http://schemas.microsoft.com/office/drawing/2010/main" w="9525">
+                <a14:hiddenLine xmlns:a14="http://schemas.microsoft.com/office/drawing/2010/main" xmlns="" w="9525">
                   <a:solidFill>
                     <a:srgbClr val="000000"/>
                   </a:solidFill>
@@ -4098,7 +4098,7 @@
             </a:ln>
             <a:extLst>
               <a:ext uri="{91240B29-F687-4f45-9708-019B960494DF}">
-                <a14:hiddenLine xmlns="" xmlns:a14="http://schemas.microsoft.com/office/drawing/2010/main" w="9525">
+                <a14:hiddenLine xmlns:a14="http://schemas.microsoft.com/office/drawing/2010/main" xmlns="" w="9525">
                   <a:solidFill>
                     <a:srgbClr val="000000"/>
                   </a:solidFill>
@@ -4166,7 +4166,7 @@
             </a:ln>
             <a:extLst>
               <a:ext uri="{91240B29-F687-4f45-9708-019B960494DF}">
-                <a14:hiddenLine xmlns="" xmlns:a14="http://schemas.microsoft.com/office/drawing/2010/main" w="9525">
+                <a14:hiddenLine xmlns:a14="http://schemas.microsoft.com/office/drawing/2010/main" xmlns="" w="9525">
                   <a:solidFill>
                     <a:srgbClr val="000000"/>
                   </a:solidFill>
@@ -4256,7 +4256,7 @@
             </a:ln>
             <a:extLst>
               <a:ext uri="{91240B29-F687-4f45-9708-019B960494DF}">
-                <a14:hiddenLine xmlns="" xmlns:a14="http://schemas.microsoft.com/office/drawing/2010/main" w="9525">
+                <a14:hiddenLine xmlns:a14="http://schemas.microsoft.com/office/drawing/2010/main" xmlns="" w="9525">
                   <a:solidFill>
                     <a:srgbClr val="000000"/>
                   </a:solidFill>
@@ -4396,7 +4396,7 @@
           <a:p>
             <a:fld id="{B9BA6063-779C-4BB6-8BC7-C5993206073F}" type="datetimeFigureOut">
               <a:rPr lang="sr-Latn-CS" smtClean="0"/>
-              <a:t>14.5.2018.</a:t>
+              <a:t>12.6.2018.</a:t>
             </a:fld>
             <a:endParaRPr lang="sr-Latn-CS"/>
           </a:p>
@@ -4663,7 +4663,7 @@
           <a:p>
             <a:fld id="{B9BA6063-779C-4BB6-8BC7-C5993206073F}" type="datetimeFigureOut">
               <a:rPr lang="sr-Latn-CS" smtClean="0"/>
-              <a:t>14.5.2018.</a:t>
+              <a:t>12.6.2018.</a:t>
             </a:fld>
             <a:endParaRPr lang="sr-Latn-CS"/>
           </a:p>
@@ -4859,7 +4859,7 @@
           <a:p>
             <a:fld id="{B9BA6063-779C-4BB6-8BC7-C5993206073F}" type="datetimeFigureOut">
               <a:rPr lang="sr-Latn-CS" smtClean="0"/>
-              <a:t>14.5.2018.</a:t>
+              <a:t>12.6.2018.</a:t>
             </a:fld>
             <a:endParaRPr lang="sr-Latn-CS"/>
           </a:p>
@@ -5122,7 +5122,7 @@
           <a:p>
             <a:fld id="{B9BA6063-779C-4BB6-8BC7-C5993206073F}" type="datetimeFigureOut">
               <a:rPr lang="sr-Latn-CS" smtClean="0"/>
-              <a:t>14.5.2018.</a:t>
+              <a:t>12.6.2018.</a:t>
             </a:fld>
             <a:endParaRPr lang="sr-Latn-CS"/>
           </a:p>
@@ -5556,7 +5556,7 @@
           <a:p>
             <a:fld id="{B9BA6063-779C-4BB6-8BC7-C5993206073F}" type="datetimeFigureOut">
               <a:rPr lang="sr-Latn-CS" smtClean="0"/>
-              <a:t>14.5.2018.</a:t>
+              <a:t>12.6.2018.</a:t>
             </a:fld>
             <a:endParaRPr lang="sr-Latn-CS"/>
           </a:p>
@@ -6102,7 +6102,7 @@
           <a:p>
             <a:fld id="{B9BA6063-779C-4BB6-8BC7-C5993206073F}" type="datetimeFigureOut">
               <a:rPr lang="sr-Latn-CS" smtClean="0"/>
-              <a:t>14.5.2018.</a:t>
+              <a:t>12.6.2018.</a:t>
             </a:fld>
             <a:endParaRPr lang="sr-Latn-CS"/>
           </a:p>
@@ -6822,7 +6822,7 @@
           <a:p>
             <a:fld id="{B9BA6063-779C-4BB6-8BC7-C5993206073F}" type="datetimeFigureOut">
               <a:rPr lang="sr-Latn-CS" smtClean="0"/>
-              <a:t>14.5.2018.</a:t>
+              <a:t>12.6.2018.</a:t>
             </a:fld>
             <a:endParaRPr lang="sr-Latn-CS"/>
           </a:p>
@@ -6992,7 +6992,7 @@
           <a:p>
             <a:fld id="{B9BA6063-779C-4BB6-8BC7-C5993206073F}" type="datetimeFigureOut">
               <a:rPr lang="sr-Latn-CS" smtClean="0"/>
-              <a:t>14.5.2018.</a:t>
+              <a:t>12.6.2018.</a:t>
             </a:fld>
             <a:endParaRPr lang="sr-Latn-CS"/>
           </a:p>
@@ -7172,7 +7172,7 @@
           <a:p>
             <a:fld id="{B9BA6063-779C-4BB6-8BC7-C5993206073F}" type="datetimeFigureOut">
               <a:rPr lang="sr-Latn-CS" smtClean="0"/>
-              <a:t>14.5.2018.</a:t>
+              <a:t>12.6.2018.</a:t>
             </a:fld>
             <a:endParaRPr lang="sr-Latn-CS"/>
           </a:p>
@@ -7342,7 +7342,7 @@
           <a:p>
             <a:fld id="{B9BA6063-779C-4BB6-8BC7-C5993206073F}" type="datetimeFigureOut">
               <a:rPr lang="sr-Latn-CS" smtClean="0"/>
-              <a:t>14.5.2018.</a:t>
+              <a:t>12.6.2018.</a:t>
             </a:fld>
             <a:endParaRPr lang="sr-Latn-CS"/>
           </a:p>
@@ -7592,7 +7592,7 @@
           <a:p>
             <a:fld id="{B9BA6063-779C-4BB6-8BC7-C5993206073F}" type="datetimeFigureOut">
               <a:rPr lang="sr-Latn-CS" smtClean="0"/>
-              <a:t>14.5.2018.</a:t>
+              <a:t>12.6.2018.</a:t>
             </a:fld>
             <a:endParaRPr lang="sr-Latn-CS"/>
           </a:p>
@@ -7824,7 +7824,7 @@
           <a:p>
             <a:fld id="{B9BA6063-779C-4BB6-8BC7-C5993206073F}" type="datetimeFigureOut">
               <a:rPr lang="sr-Latn-CS" smtClean="0"/>
-              <a:t>14.5.2018.</a:t>
+              <a:t>12.6.2018.</a:t>
             </a:fld>
             <a:endParaRPr lang="sr-Latn-CS"/>
           </a:p>
@@ -8205,7 +8205,7 @@
           <a:p>
             <a:fld id="{B9BA6063-779C-4BB6-8BC7-C5993206073F}" type="datetimeFigureOut">
               <a:rPr lang="sr-Latn-CS" smtClean="0"/>
-              <a:t>14.5.2018.</a:t>
+              <a:t>12.6.2018.</a:t>
             </a:fld>
             <a:endParaRPr lang="sr-Latn-CS"/>
           </a:p>
@@ -8323,7 +8323,7 @@
           <a:p>
             <a:fld id="{B9BA6063-779C-4BB6-8BC7-C5993206073F}" type="datetimeFigureOut">
               <a:rPr lang="sr-Latn-CS" smtClean="0"/>
-              <a:t>14.5.2018.</a:t>
+              <a:t>12.6.2018.</a:t>
             </a:fld>
             <a:endParaRPr lang="sr-Latn-CS"/>
           </a:p>
@@ -8418,7 +8418,7 @@
           <a:p>
             <a:fld id="{B9BA6063-779C-4BB6-8BC7-C5993206073F}" type="datetimeFigureOut">
               <a:rPr lang="sr-Latn-CS" smtClean="0"/>
-              <a:t>14.5.2018.</a:t>
+              <a:t>12.6.2018.</a:t>
             </a:fld>
             <a:endParaRPr lang="sr-Latn-CS"/>
           </a:p>
@@ -8667,7 +8667,7 @@
           <a:p>
             <a:fld id="{B9BA6063-779C-4BB6-8BC7-C5993206073F}" type="datetimeFigureOut">
               <a:rPr lang="sr-Latn-CS" smtClean="0"/>
-              <a:t>14.5.2018.</a:t>
+              <a:t>12.6.2018.</a:t>
             </a:fld>
             <a:endParaRPr lang="sr-Latn-CS"/>
           </a:p>
@@ -8947,7 +8947,7 @@
           <a:p>
             <a:fld id="{B9BA6063-779C-4BB6-8BC7-C5993206073F}" type="datetimeFigureOut">
               <a:rPr lang="sr-Latn-CS" smtClean="0"/>
-              <a:t>14.5.2018.</a:t>
+              <a:t>12.6.2018.</a:t>
             </a:fld>
             <a:endParaRPr lang="sr-Latn-CS"/>
           </a:p>
@@ -9063,7 +9063,7 @@
           <a:noFill/>
           <a:extLst>
             <a:ext uri="{909E8E84-426E-40dd-AFC4-6F175D3DCCD1}">
-              <a14:hiddenFill xmlns="" xmlns:a14="http://schemas.microsoft.com/office/drawing/2010/main">
+              <a14:hiddenFill xmlns:a14="http://schemas.microsoft.com/office/drawing/2010/main" xmlns="">
                 <a:solidFill>
                   <a:srgbClr val="FFFFFF"/>
                 </a:solidFill>
@@ -9137,7 +9137,7 @@
               </a:ln>
               <a:extLst>
                 <a:ext uri="{91240B29-F687-4f45-9708-019B960494DF}">
-                  <a14:hiddenLine xmlns="" xmlns:a14="http://schemas.microsoft.com/office/drawing/2010/main" w="9525">
+                  <a14:hiddenLine xmlns:a14="http://schemas.microsoft.com/office/drawing/2010/main" xmlns="" w="9525">
                     <a:solidFill>
                       <a:srgbClr val="000000"/>
                     </a:solidFill>
@@ -9227,7 +9227,7 @@
               </a:ln>
               <a:extLst>
                 <a:ext uri="{91240B29-F687-4f45-9708-019B960494DF}">
-                  <a14:hiddenLine xmlns="" xmlns:a14="http://schemas.microsoft.com/office/drawing/2010/main" w="9525">
+                  <a14:hiddenLine xmlns:a14="http://schemas.microsoft.com/office/drawing/2010/main" xmlns="" w="9525">
                     <a:solidFill>
                       <a:srgbClr val="000000"/>
                     </a:solidFill>
@@ -9317,7 +9317,7 @@
               </a:ln>
               <a:extLst>
                 <a:ext uri="{91240B29-F687-4f45-9708-019B960494DF}">
-                  <a14:hiddenLine xmlns="" xmlns:a14="http://schemas.microsoft.com/office/drawing/2010/main" w="9525">
+                  <a14:hiddenLine xmlns:a14="http://schemas.microsoft.com/office/drawing/2010/main" xmlns="" w="9525">
                     <a:solidFill>
                       <a:srgbClr val="000000"/>
                     </a:solidFill>
@@ -9379,7 +9379,7 @@
               </a:ln>
               <a:extLst>
                 <a:ext uri="{91240B29-F687-4f45-9708-019B960494DF}">
-                  <a14:hiddenLine xmlns="" xmlns:a14="http://schemas.microsoft.com/office/drawing/2010/main" w="9525">
+                  <a14:hiddenLine xmlns:a14="http://schemas.microsoft.com/office/drawing/2010/main" xmlns="" w="9525">
                     <a:solidFill>
                       <a:srgbClr val="000000"/>
                     </a:solidFill>
@@ -9469,7 +9469,7 @@
               </a:ln>
               <a:extLst>
                 <a:ext uri="{91240B29-F687-4f45-9708-019B960494DF}">
-                  <a14:hiddenLine xmlns="" xmlns:a14="http://schemas.microsoft.com/office/drawing/2010/main" w="9525">
+                  <a14:hiddenLine xmlns:a14="http://schemas.microsoft.com/office/drawing/2010/main" xmlns="" w="9525">
                     <a:solidFill>
                       <a:srgbClr val="000000"/>
                     </a:solidFill>
@@ -9531,7 +9531,7 @@
               </a:ln>
               <a:extLst>
                 <a:ext uri="{91240B29-F687-4f45-9708-019B960494DF}">
-                  <a14:hiddenLine xmlns="" xmlns:a14="http://schemas.microsoft.com/office/drawing/2010/main" w="9525">
+                  <a14:hiddenLine xmlns:a14="http://schemas.microsoft.com/office/drawing/2010/main" xmlns="" w="9525">
                     <a:solidFill>
                       <a:srgbClr val="000000"/>
                     </a:solidFill>
@@ -9593,7 +9593,7 @@
               </a:ln>
               <a:extLst>
                 <a:ext uri="{91240B29-F687-4f45-9708-019B960494DF}">
-                  <a14:hiddenLine xmlns="" xmlns:a14="http://schemas.microsoft.com/office/drawing/2010/main" w="9525">
+                  <a14:hiddenLine xmlns:a14="http://schemas.microsoft.com/office/drawing/2010/main" xmlns="" w="9525">
                     <a:solidFill>
                       <a:srgbClr val="000000"/>
                     </a:solidFill>
@@ -9683,7 +9683,7 @@
               </a:ln>
               <a:extLst>
                 <a:ext uri="{91240B29-F687-4f45-9708-019B960494DF}">
-                  <a14:hiddenLine xmlns="" xmlns:a14="http://schemas.microsoft.com/office/drawing/2010/main" w="9525">
+                  <a14:hiddenLine xmlns:a14="http://schemas.microsoft.com/office/drawing/2010/main" xmlns="" w="9525">
                     <a:solidFill>
                       <a:srgbClr val="000000"/>
                     </a:solidFill>
@@ -9773,7 +9773,7 @@
               </a:ln>
               <a:extLst>
                 <a:ext uri="{91240B29-F687-4f45-9708-019B960494DF}">
-                  <a14:hiddenLine xmlns="" xmlns:a14="http://schemas.microsoft.com/office/drawing/2010/main" w="9525">
+                  <a14:hiddenLine xmlns:a14="http://schemas.microsoft.com/office/drawing/2010/main" xmlns="" w="9525">
                     <a:solidFill>
                       <a:srgbClr val="000000"/>
                     </a:solidFill>
@@ -9835,7 +9835,7 @@
               </a:ln>
               <a:extLst>
                 <a:ext uri="{91240B29-F687-4f45-9708-019B960494DF}">
-                  <a14:hiddenLine xmlns="" xmlns:a14="http://schemas.microsoft.com/office/drawing/2010/main" w="9525">
+                  <a14:hiddenLine xmlns:a14="http://schemas.microsoft.com/office/drawing/2010/main" xmlns="" w="9525">
                     <a:solidFill>
                       <a:srgbClr val="000000"/>
                     </a:solidFill>
@@ -9945,7 +9945,7 @@
               </a:ln>
               <a:extLst>
                 <a:ext uri="{91240B29-F687-4f45-9708-019B960494DF}">
-                  <a14:hiddenLine xmlns="" xmlns:a14="http://schemas.microsoft.com/office/drawing/2010/main" w="9525">
+                  <a14:hiddenLine xmlns:a14="http://schemas.microsoft.com/office/drawing/2010/main" xmlns="" w="9525">
                     <a:solidFill>
                       <a:srgbClr val="000000"/>
                     </a:solidFill>
@@ -10029,7 +10029,7 @@
               </a:ln>
               <a:extLst>
                 <a:ext uri="{91240B29-F687-4f45-9708-019B960494DF}">
-                  <a14:hiddenLine xmlns="" xmlns:a14="http://schemas.microsoft.com/office/drawing/2010/main" w="9525">
+                  <a14:hiddenLine xmlns:a14="http://schemas.microsoft.com/office/drawing/2010/main" xmlns="" w="9525">
                     <a:solidFill>
                       <a:srgbClr val="000000"/>
                     </a:solidFill>
@@ -10091,7 +10091,7 @@
               </a:ln>
               <a:extLst>
                 <a:ext uri="{91240B29-F687-4f45-9708-019B960494DF}">
-                  <a14:hiddenLine xmlns="" xmlns:a14="http://schemas.microsoft.com/office/drawing/2010/main" w="9525">
+                  <a14:hiddenLine xmlns:a14="http://schemas.microsoft.com/office/drawing/2010/main" xmlns="" w="9525">
                     <a:solidFill>
                       <a:srgbClr val="000000"/>
                     </a:solidFill>
@@ -10153,7 +10153,7 @@
               </a:ln>
               <a:extLst>
                 <a:ext uri="{91240B29-F687-4f45-9708-019B960494DF}">
-                  <a14:hiddenLine xmlns="" xmlns:a14="http://schemas.microsoft.com/office/drawing/2010/main" w="9525">
+                  <a14:hiddenLine xmlns:a14="http://schemas.microsoft.com/office/drawing/2010/main" xmlns="" w="9525">
                     <a:solidFill>
                       <a:srgbClr val="000000"/>
                     </a:solidFill>
@@ -10243,7 +10243,7 @@
               </a:ln>
               <a:extLst>
                 <a:ext uri="{91240B29-F687-4f45-9708-019B960494DF}">
-                  <a14:hiddenLine xmlns="" xmlns:a14="http://schemas.microsoft.com/office/drawing/2010/main" w="9525">
+                  <a14:hiddenLine xmlns:a14="http://schemas.microsoft.com/office/drawing/2010/main" xmlns="" w="9525">
                     <a:solidFill>
                       <a:srgbClr val="000000"/>
                     </a:solidFill>
@@ -10277,7 +10277,7 @@
               </a:ln>
               <a:extLst>
                 <a:ext uri="{91240B29-F687-4f45-9708-019B960494DF}">
-                  <a14:hiddenLine xmlns="" xmlns:a14="http://schemas.microsoft.com/office/drawing/2010/main" w="9525">
+                  <a14:hiddenLine xmlns:a14="http://schemas.microsoft.com/office/drawing/2010/main" xmlns="" w="9525">
                     <a:solidFill>
                       <a:srgbClr val="000000"/>
                     </a:solidFill>
@@ -10342,7 +10342,7 @@
               </a:ln>
               <a:extLst>
                 <a:ext uri="{91240B29-F687-4f45-9708-019B960494DF}">
-                  <a14:hiddenLine xmlns="" xmlns:a14="http://schemas.microsoft.com/office/drawing/2010/main" w="9525">
+                  <a14:hiddenLine xmlns:a14="http://schemas.microsoft.com/office/drawing/2010/main" xmlns="" w="9525">
                     <a:solidFill>
                       <a:srgbClr val="000000"/>
                     </a:solidFill>
@@ -10432,7 +10432,7 @@
               </a:ln>
               <a:extLst>
                 <a:ext uri="{91240B29-F687-4f45-9708-019B960494DF}">
-                  <a14:hiddenLine xmlns="" xmlns:a14="http://schemas.microsoft.com/office/drawing/2010/main" w="9525">
+                  <a14:hiddenLine xmlns:a14="http://schemas.microsoft.com/office/drawing/2010/main" xmlns="" w="9525">
                     <a:solidFill>
                       <a:srgbClr val="000000"/>
                     </a:solidFill>
@@ -10494,7 +10494,7 @@
               </a:ln>
               <a:extLst>
                 <a:ext uri="{91240B29-F687-4f45-9708-019B960494DF}">
-                  <a14:hiddenLine xmlns="" xmlns:a14="http://schemas.microsoft.com/office/drawing/2010/main" w="9525">
+                  <a14:hiddenLine xmlns:a14="http://schemas.microsoft.com/office/drawing/2010/main" xmlns="" w="9525">
                     <a:solidFill>
                       <a:srgbClr val="000000"/>
                     </a:solidFill>
@@ -10584,7 +10584,7 @@
               </a:ln>
               <a:extLst>
                 <a:ext uri="{91240B29-F687-4f45-9708-019B960494DF}">
-                  <a14:hiddenLine xmlns="" xmlns:a14="http://schemas.microsoft.com/office/drawing/2010/main" w="9525">
+                  <a14:hiddenLine xmlns:a14="http://schemas.microsoft.com/office/drawing/2010/main" xmlns="" w="9525">
                     <a:solidFill>
                       <a:srgbClr val="000000"/>
                     </a:solidFill>
@@ -10649,7 +10649,7 @@
               </a:ln>
               <a:extLst>
                 <a:ext uri="{91240B29-F687-4f45-9708-019B960494DF}">
-                  <a14:hiddenLine xmlns="" xmlns:a14="http://schemas.microsoft.com/office/drawing/2010/main" w="9525">
+                  <a14:hiddenLine xmlns:a14="http://schemas.microsoft.com/office/drawing/2010/main" xmlns="" w="9525">
                     <a:solidFill>
                       <a:srgbClr val="000000"/>
                     </a:solidFill>
@@ -10711,7 +10711,7 @@
               </a:ln>
               <a:extLst>
                 <a:ext uri="{91240B29-F687-4f45-9708-019B960494DF}">
-                  <a14:hiddenLine xmlns="" xmlns:a14="http://schemas.microsoft.com/office/drawing/2010/main" w="9525">
+                  <a14:hiddenLine xmlns:a14="http://schemas.microsoft.com/office/drawing/2010/main" xmlns="" w="9525">
                     <a:solidFill>
                       <a:srgbClr val="000000"/>
                     </a:solidFill>
@@ -10801,7 +10801,7 @@
               </a:ln>
               <a:extLst>
                 <a:ext uri="{91240B29-F687-4f45-9708-019B960494DF}">
-                  <a14:hiddenLine xmlns="" xmlns:a14="http://schemas.microsoft.com/office/drawing/2010/main" w="9525">
+                  <a14:hiddenLine xmlns:a14="http://schemas.microsoft.com/office/drawing/2010/main" xmlns="" w="9525">
                     <a:solidFill>
                       <a:srgbClr val="000000"/>
                     </a:solidFill>
@@ -10891,7 +10891,7 @@
               </a:ln>
               <a:extLst>
                 <a:ext uri="{91240B29-F687-4f45-9708-019B960494DF}">
-                  <a14:hiddenLine xmlns="" xmlns:a14="http://schemas.microsoft.com/office/drawing/2010/main" w="9525">
+                  <a14:hiddenLine xmlns:a14="http://schemas.microsoft.com/office/drawing/2010/main" xmlns="" w="9525">
                     <a:solidFill>
                       <a:srgbClr val="000000"/>
                     </a:solidFill>
@@ -10956,7 +10956,7 @@
               </a:ln>
               <a:extLst>
                 <a:ext uri="{91240B29-F687-4f45-9708-019B960494DF}">
-                  <a14:hiddenLine xmlns="" xmlns:a14="http://schemas.microsoft.com/office/drawing/2010/main" w="9525">
+                  <a14:hiddenLine xmlns:a14="http://schemas.microsoft.com/office/drawing/2010/main" xmlns="" w="9525">
                     <a:solidFill>
                       <a:srgbClr val="000000"/>
                     </a:solidFill>
@@ -11076,7 +11076,7 @@
               </a:ln>
               <a:extLst>
                 <a:ext uri="{91240B29-F687-4f45-9708-019B960494DF}">
-                  <a14:hiddenLine xmlns="" xmlns:a14="http://schemas.microsoft.com/office/drawing/2010/main" w="9525">
+                  <a14:hiddenLine xmlns:a14="http://schemas.microsoft.com/office/drawing/2010/main" xmlns="" w="9525">
                     <a:solidFill>
                       <a:srgbClr val="000000"/>
                     </a:solidFill>
@@ -11174,7 +11174,7 @@
               </a:ln>
               <a:extLst>
                 <a:ext uri="{91240B29-F687-4f45-9708-019B960494DF}">
-                  <a14:hiddenLine xmlns="" xmlns:a14="http://schemas.microsoft.com/office/drawing/2010/main" w="9525">
+                  <a14:hiddenLine xmlns:a14="http://schemas.microsoft.com/office/drawing/2010/main" xmlns="" w="9525">
                     <a:solidFill>
                       <a:srgbClr val="000000"/>
                     </a:solidFill>
@@ -11289,7 +11289,7 @@
               </a:ln>
               <a:extLst>
                 <a:ext uri="{91240B29-F687-4f45-9708-019B960494DF}">
-                  <a14:hiddenLine xmlns="" xmlns:a14="http://schemas.microsoft.com/office/drawing/2010/main" w="9525">
+                  <a14:hiddenLine xmlns:a14="http://schemas.microsoft.com/office/drawing/2010/main" xmlns="" w="9525">
                     <a:solidFill>
                       <a:srgbClr val="000000"/>
                     </a:solidFill>
@@ -11379,7 +11379,7 @@
               </a:ln>
               <a:extLst>
                 <a:ext uri="{91240B29-F687-4f45-9708-019B960494DF}">
-                  <a14:hiddenLine xmlns="" xmlns:a14="http://schemas.microsoft.com/office/drawing/2010/main" w="9525">
+                  <a14:hiddenLine xmlns:a14="http://schemas.microsoft.com/office/drawing/2010/main" xmlns="" w="9525">
                     <a:solidFill>
                       <a:srgbClr val="000000"/>
                     </a:solidFill>
@@ -11444,7 +11444,7 @@
               </a:ln>
               <a:extLst>
                 <a:ext uri="{91240B29-F687-4f45-9708-019B960494DF}">
-                  <a14:hiddenLine xmlns="" xmlns:a14="http://schemas.microsoft.com/office/drawing/2010/main" w="9525">
+                  <a14:hiddenLine xmlns:a14="http://schemas.microsoft.com/office/drawing/2010/main" xmlns="" w="9525">
                     <a:solidFill>
                       <a:srgbClr val="000000"/>
                     </a:solidFill>
@@ -11534,7 +11534,7 @@
               </a:ln>
               <a:extLst>
                 <a:ext uri="{91240B29-F687-4f45-9708-019B960494DF}">
-                  <a14:hiddenLine xmlns="" xmlns:a14="http://schemas.microsoft.com/office/drawing/2010/main" w="9525">
+                  <a14:hiddenLine xmlns:a14="http://schemas.microsoft.com/office/drawing/2010/main" xmlns="" w="9525">
                     <a:solidFill>
                       <a:srgbClr val="000000"/>
                     </a:solidFill>
@@ -11602,7 +11602,7 @@
               </a:ln>
               <a:extLst>
                 <a:ext uri="{91240B29-F687-4f45-9708-019B960494DF}">
-                  <a14:hiddenLine xmlns="" xmlns:a14="http://schemas.microsoft.com/office/drawing/2010/main" w="9525">
+                  <a14:hiddenLine xmlns:a14="http://schemas.microsoft.com/office/drawing/2010/main" xmlns="" w="9525">
                     <a:solidFill>
                       <a:srgbClr val="000000"/>
                     </a:solidFill>
@@ -11692,7 +11692,7 @@
               </a:ln>
               <a:extLst>
                 <a:ext uri="{91240B29-F687-4f45-9708-019B960494DF}">
-                  <a14:hiddenLine xmlns="" xmlns:a14="http://schemas.microsoft.com/office/drawing/2010/main" w="9525">
+                  <a14:hiddenLine xmlns:a14="http://schemas.microsoft.com/office/drawing/2010/main" xmlns="" w="9525">
                     <a:solidFill>
                       <a:srgbClr val="000000"/>
                     </a:solidFill>
@@ -11760,7 +11760,7 @@
               </a:ln>
               <a:extLst>
                 <a:ext uri="{91240B29-F687-4f45-9708-019B960494DF}">
-                  <a14:hiddenLine xmlns="" xmlns:a14="http://schemas.microsoft.com/office/drawing/2010/main" w="9525">
+                  <a14:hiddenLine xmlns:a14="http://schemas.microsoft.com/office/drawing/2010/main" xmlns="" w="9525">
                     <a:solidFill>
                       <a:srgbClr val="000000"/>
                     </a:solidFill>
@@ -11850,7 +11850,7 @@
               </a:ln>
               <a:extLst>
                 <a:ext uri="{91240B29-F687-4f45-9708-019B960494DF}">
-                  <a14:hiddenLine xmlns="" xmlns:a14="http://schemas.microsoft.com/office/drawing/2010/main" w="9525">
+                  <a14:hiddenLine xmlns:a14="http://schemas.microsoft.com/office/drawing/2010/main" xmlns="" w="9525">
                     <a:solidFill>
                       <a:srgbClr val="000000"/>
                     </a:solidFill>
@@ -11884,7 +11884,7 @@
               </a:ln>
               <a:extLst>
                 <a:ext uri="{91240B29-F687-4f45-9708-019B960494DF}">
-                  <a14:hiddenLine xmlns="" xmlns:a14="http://schemas.microsoft.com/office/drawing/2010/main" w="9525">
+                  <a14:hiddenLine xmlns:a14="http://schemas.microsoft.com/office/drawing/2010/main" xmlns="" w="9525">
                     <a:solidFill>
                       <a:srgbClr val="000000"/>
                     </a:solidFill>
@@ -12024,7 +12024,7 @@
           <a:p>
             <a:fld id="{B9BA6063-779C-4BB6-8BC7-C5993206073F}" type="datetimeFigureOut">
               <a:rPr lang="sr-Latn-CS" smtClean="0"/>
-              <a:t>14.5.2018.</a:t>
+              <a:t>12.6.2018.</a:t>
             </a:fld>
             <a:endParaRPr lang="sr-Latn-CS"/>
           </a:p>
@@ -12975,7 +12975,7 @@
           <a:p>
             <a:r>
               <a:rPr lang="en-US" dirty="0"/>
-              <a:t>Run the application by opening the solution in </a:t>
+              <a:t>Run the application by calling “</a:t>
             </a:r>
             <a:r>
               <a:rPr lang="en-US" b="1" dirty="0" err="1"/>
@@ -12983,11 +12983,19 @@
             </a:r>
             <a:r>
               <a:rPr lang="en-US" b="1" dirty="0"/>
-              <a:t>\task</a:t>
+              <a:t>\task\</a:t>
+            </a:r>
+            <a:r>
+              <a:rPr lang="en-US" b="1" dirty="0" err="1"/>
+              <a:t>SecurityApp</a:t>
+            </a:r>
+            <a:r>
+              <a:rPr lang="en-US" b="1" dirty="0"/>
+              <a:t>\run.bat</a:t>
             </a:r>
             <a:r>
               <a:rPr lang="en-US" dirty="0"/>
-              <a:t> and running it</a:t>
+              <a:t>”</a:t>
             </a:r>
             <a:endParaRPr lang="en-US" b="1" dirty="0"/>
           </a:p>

</xml_diff>